<commit_message>
Updating slides of the project.
</commit_message>
<xml_diff>
--- a/00_Relazione/Modello e identificazione di un motore DC/Modello e identificazione di un motore DC.pptx
+++ b/00_Relazione/Modello e identificazione di un motore DC/Modello e identificazione di un motore DC.pptx
@@ -5,15 +5,16 @@
     <p:sldMasterId id="2147483648" r:id="rId1"/>
   </p:sldMasterIdLst>
   <p:notesMasterIdLst>
-    <p:notesMasterId r:id="rId8"/>
+    <p:notesMasterId r:id="rId9"/>
   </p:notesMasterIdLst>
   <p:sldIdLst>
     <p:sldId id="269" r:id="rId2"/>
     <p:sldId id="268" r:id="rId3"/>
     <p:sldId id="270" r:id="rId4"/>
     <p:sldId id="272" r:id="rId5"/>
-    <p:sldId id="273" r:id="rId6"/>
-    <p:sldId id="275" r:id="rId7"/>
+    <p:sldId id="276" r:id="rId6"/>
+    <p:sldId id="273" r:id="rId7"/>
+    <p:sldId id="275" r:id="rId8"/>
   </p:sldIdLst>
   <p:sldSz cx="12192000" cy="6858000"/>
   <p:notesSz cx="6858000" cy="9144000"/>
@@ -112,6 +113,11 @@
       </a:defRPr>
     </a:lvl9pPr>
   </p:defaultTextStyle>
+  <p:extLst>
+    <p:ext uri="{EFAFB233-063F-42B5-8137-9DF3F51BA10A}">
+      <p15:sldGuideLst xmlns:p15="http://schemas.microsoft.com/office/powerpoint/2012/main"/>
+    </p:ext>
+  </p:extLst>
 </p:presentation>
 </file>
 
@@ -197,7 +203,7 @@
           <a:p>
             <a:fld id="{2D1A64A2-7D86-439A-A8BC-7FA7B1DBF38C}" type="datetimeFigureOut">
               <a:rPr lang="it-IT" smtClean="0"/>
-              <a:t>15/01/2020</a:t>
+              <a:t>16/01/2020</a:t>
             </a:fld>
             <a:endParaRPr lang="it-IT"/>
           </a:p>
@@ -909,7 +915,7 @@
     </p:spTree>
     <p:extLst>
       <p:ext uri="{BB962C8B-B14F-4D97-AF65-F5344CB8AC3E}">
-        <p14:creationId xmlns:p14="http://schemas.microsoft.com/office/powerpoint/2010/main" val="644965668"/>
+        <p14:creationId xmlns:p14="http://schemas.microsoft.com/office/powerpoint/2010/main" val="3081663292"/>
       </p:ext>
     </p:extLst>
   </p:cSld>
@@ -992,6 +998,97 @@
               <a:rPr lang="it-IT" smtClean="0"/>
               <a:pPr rtl="0"/>
               <a:t>6</a:t>
+            </a:fld>
+            <a:endParaRPr lang="it-IT" dirty="0"/>
+          </a:p>
+        </p:txBody>
+      </p:sp>
+    </p:spTree>
+    <p:extLst>
+      <p:ext uri="{BB962C8B-B14F-4D97-AF65-F5344CB8AC3E}">
+        <p14:creationId xmlns:p14="http://schemas.microsoft.com/office/powerpoint/2010/main" val="644965668"/>
+      </p:ext>
+    </p:extLst>
+  </p:cSld>
+  <p:clrMapOvr>
+    <a:masterClrMapping/>
+  </p:clrMapOvr>
+</p:notes>
+</file>
+
+<file path=ppt/notesSlides/notesSlide7.xml><?xml version="1.0" encoding="utf-8"?>
+<p:notes xmlns:a="http://schemas.openxmlformats.org/drawingml/2006/main" xmlns:r="http://schemas.openxmlformats.org/officeDocument/2006/relationships" xmlns:p="http://schemas.openxmlformats.org/presentationml/2006/main">
+  <p:cSld>
+    <p:spTree>
+      <p:nvGrpSpPr>
+        <p:cNvPr id="1" name=""/>
+        <p:cNvGrpSpPr/>
+        <p:nvPr/>
+      </p:nvGrpSpPr>
+      <p:grpSpPr>
+        <a:xfrm>
+          <a:off x="0" y="0"/>
+          <a:ext cx="0" cy="0"/>
+          <a:chOff x="0" y="0"/>
+          <a:chExt cx="0" cy="0"/>
+        </a:xfrm>
+      </p:grpSpPr>
+      <p:sp>
+        <p:nvSpPr>
+          <p:cNvPr id="2" name="Segnaposto immagine diapositiva 1"/>
+          <p:cNvSpPr>
+            <a:spLocks noGrp="1" noRot="1" noChangeAspect="1"/>
+          </p:cNvSpPr>
+          <p:nvPr>
+            <p:ph type="sldImg"/>
+          </p:nvPr>
+        </p:nvSpPr>
+        <p:spPr>
+          <a:xfrm>
+            <a:off x="381000" y="685800"/>
+            <a:ext cx="6096000" cy="3429000"/>
+          </a:xfrm>
+        </p:spPr>
+      </p:sp>
+      <p:sp>
+        <p:nvSpPr>
+          <p:cNvPr id="3" name="Segnaposto note 2"/>
+          <p:cNvSpPr>
+            <a:spLocks noGrp="1"/>
+          </p:cNvSpPr>
+          <p:nvPr>
+            <p:ph type="body" idx="1"/>
+          </p:nvPr>
+        </p:nvSpPr>
+        <p:spPr/>
+        <p:txBody>
+          <a:bodyPr/>
+          <a:lstStyle/>
+          <a:p>
+            <a:endParaRPr lang="it-IT"/>
+          </a:p>
+        </p:txBody>
+      </p:sp>
+      <p:sp>
+        <p:nvSpPr>
+          <p:cNvPr id="4" name="Segnaposto numero diapositiva 3"/>
+          <p:cNvSpPr>
+            <a:spLocks noGrp="1"/>
+          </p:cNvSpPr>
+          <p:nvPr>
+            <p:ph type="sldNum" sz="quarter" idx="10"/>
+          </p:nvPr>
+        </p:nvSpPr>
+        <p:spPr/>
+        <p:txBody>
+          <a:bodyPr/>
+          <a:lstStyle/>
+          <a:p>
+            <a:pPr rtl="0"/>
+            <a:fld id="{841221E5-7225-48EB-A4EE-420E7BFCF705}" type="slidenum">
+              <a:rPr lang="it-IT" smtClean="0"/>
+              <a:pPr rtl="0"/>
+              <a:t>7</a:t>
             </a:fld>
             <a:endParaRPr lang="it-IT" dirty="0"/>
           </a:p>
@@ -1073,7 +1170,7 @@
             <a:fld id="{DA63B92F-6927-4909-8675-8FB028AE3CD8}" type="datetime1">
               <a:rPr lang="it-IT" smtClean="0"/>
               <a:pPr/>
-              <a:t>15/01/2020</a:t>
+              <a:t>16/01/2020</a:t>
             </a:fld>
             <a:endParaRPr lang="it-IT" dirty="0"/>
           </a:p>
@@ -1136,13 +1233,13 @@
   <p:clrMapOvr>
     <a:masterClrMapping/>
   </p:clrMapOvr>
-  <mc:AlternateContent xmlns:mc="http://schemas.openxmlformats.org/markup-compatibility/2006">
-    <mc:Choice xmlns:p14="http://schemas.microsoft.com/office/powerpoint/2010/main" Requires="p14">
+  <mc:AlternateContent xmlns:mc="http://schemas.openxmlformats.org/markup-compatibility/2006" xmlns:p14="http://schemas.microsoft.com/office/powerpoint/2010/main">
+    <mc:Choice Requires="p14">
       <p:transition spd="med" p14:dur="700">
         <p:fade/>
       </p:transition>
     </mc:Choice>
-    <mc:Fallback>
+    <mc:Fallback xmlns="">
       <p:transition spd="med">
         <p:fade/>
       </p:transition>
@@ -1532,7 +1629,7 @@
             <a:fld id="{E89D5404-FB42-4B9E-BE7A-7821366B0BBC}" type="datetime1">
               <a:rPr lang="it-IT" smtClean="0"/>
               <a:pPr/>
-              <a:t>15/01/2020</a:t>
+              <a:t>16/01/2020</a:t>
             </a:fld>
             <a:endParaRPr lang="it-IT" dirty="0"/>
           </a:p>
@@ -1595,13 +1692,13 @@
   <p:clrMapOvr>
     <a:masterClrMapping/>
   </p:clrMapOvr>
-  <mc:AlternateContent xmlns:mc="http://schemas.openxmlformats.org/markup-compatibility/2006">
-    <mc:Choice xmlns:p14="http://schemas.microsoft.com/office/powerpoint/2010/main" Requires="p14">
+  <mc:AlternateContent xmlns:mc="http://schemas.openxmlformats.org/markup-compatibility/2006" xmlns:p14="http://schemas.microsoft.com/office/powerpoint/2010/main">
+    <mc:Choice Requires="p14">
       <p:transition spd="med" p14:dur="700">
         <p:fade/>
       </p:transition>
     </mc:Choice>
-    <mc:Fallback>
+    <mc:Fallback xmlns="">
       <p:transition spd="med">
         <p:fade/>
       </p:transition>
@@ -2529,7 +2626,7 @@
             <a:fld id="{982DBDC9-B003-41F0-B8B2-2F0AA2C1B651}" type="datetime1">
               <a:rPr lang="it-IT" smtClean="0"/>
               <a:pPr/>
-              <a:t>15/01/2020</a:t>
+              <a:t>16/01/2020</a:t>
             </a:fld>
             <a:endParaRPr lang="it-IT" dirty="0"/>
           </a:p>
@@ -2614,13 +2711,13 @@
   <p:clrMapOvr>
     <a:masterClrMapping/>
   </p:clrMapOvr>
-  <mc:AlternateContent xmlns:mc="http://schemas.openxmlformats.org/markup-compatibility/2006">
-    <mc:Choice xmlns:p14="http://schemas.microsoft.com/office/powerpoint/2010/main" Requires="p14">
+  <mc:AlternateContent xmlns:mc="http://schemas.openxmlformats.org/markup-compatibility/2006" xmlns:p14="http://schemas.microsoft.com/office/powerpoint/2010/main">
+    <mc:Choice Requires="p14">
       <p:transition spd="med" p14:dur="700">
         <p:fade/>
       </p:transition>
     </mc:Choice>
-    <mc:Fallback>
+    <mc:Fallback xmlns="">
       <p:transition spd="med">
         <p:fade/>
       </p:transition>
@@ -2760,7 +2857,7 @@
             <a:fld id="{07EF584B-7CE1-48A1-AB7A-1EEAB5F615CD}" type="datetime1">
               <a:rPr lang="it-IT" smtClean="0"/>
               <a:pPr/>
-              <a:t>15/01/2020</a:t>
+              <a:t>16/01/2020</a:t>
             </a:fld>
             <a:endParaRPr lang="it-IT" dirty="0"/>
           </a:p>
@@ -2823,13 +2920,13 @@
   <p:clrMapOvr>
     <a:masterClrMapping/>
   </p:clrMapOvr>
-  <mc:AlternateContent xmlns:mc="http://schemas.openxmlformats.org/markup-compatibility/2006">
-    <mc:Choice xmlns:p14="http://schemas.microsoft.com/office/powerpoint/2010/main" Requires="p14">
+  <mc:AlternateContent xmlns:mc="http://schemas.openxmlformats.org/markup-compatibility/2006" xmlns:p14="http://schemas.microsoft.com/office/powerpoint/2010/main">
+    <mc:Choice Requires="p14">
       <p:transition spd="med" p14:dur="700">
         <p:fade/>
       </p:transition>
     </mc:Choice>
-    <mc:Fallback>
+    <mc:Fallback xmlns="">
       <p:transition spd="med">
         <p:fade/>
       </p:transition>
@@ -3611,7 +3708,7 @@
             <a:fld id="{62DE71F0-C68A-46D7-94E0-C7A236B6AC63}" type="datetime1">
               <a:rPr lang="it-IT" smtClean="0"/>
               <a:pPr/>
-              <a:t>15/01/2020</a:t>
+              <a:t>16/01/2020</a:t>
             </a:fld>
             <a:endParaRPr lang="it-IT" dirty="0"/>
           </a:p>
@@ -3711,13 +3808,13 @@
     <p:sldLayoutId id="2147483649" r:id="rId3"/>
     <p:sldLayoutId id="2147483650" r:id="rId4"/>
   </p:sldLayoutIdLst>
-  <mc:AlternateContent xmlns:mc="http://schemas.openxmlformats.org/markup-compatibility/2006">
-    <mc:Choice xmlns:p14="http://schemas.microsoft.com/office/powerpoint/2010/main" Requires="p14">
+  <mc:AlternateContent xmlns:mc="http://schemas.openxmlformats.org/markup-compatibility/2006" xmlns:p14="http://schemas.microsoft.com/office/powerpoint/2010/main">
+    <mc:Choice Requires="p14">
       <p:transition spd="med" p14:dur="700">
         <p:fade/>
       </p:transition>
     </mc:Choice>
-    <mc:Fallback>
+    <mc:Fallback xmlns="">
       <p:transition spd="med">
         <p:fade/>
       </p:transition>
@@ -4101,13 +4198,13 @@
   <p:clrMapOvr>
     <a:masterClrMapping/>
   </p:clrMapOvr>
-  <mc:AlternateContent xmlns:mc="http://schemas.openxmlformats.org/markup-compatibility/2006">
-    <mc:Choice xmlns:p14="http://schemas.microsoft.com/office/powerpoint/2010/main" Requires="p14">
+  <mc:AlternateContent xmlns:mc="http://schemas.openxmlformats.org/markup-compatibility/2006" xmlns:p14="http://schemas.microsoft.com/office/powerpoint/2010/main">
+    <mc:Choice Requires="p14">
       <p:transition spd="med" p14:dur="700">
         <p:fade/>
       </p:transition>
     </mc:Choice>
-    <mc:Fallback>
+    <mc:Fallback xmlns="">
       <p:transition spd="med">
         <p:fade/>
       </p:transition>
@@ -4163,8 +4260,8 @@
           </a:p>
         </p:txBody>
       </p:sp>
-      <mc:AlternateContent xmlns:mc="http://schemas.openxmlformats.org/markup-compatibility/2006">
-        <mc:Choice xmlns:a14="http://schemas.microsoft.com/office/drawing/2010/main" Requires="a14">
+      <mc:AlternateContent xmlns:mc="http://schemas.openxmlformats.org/markup-compatibility/2006" xmlns:a14="http://schemas.microsoft.com/office/drawing/2010/main">
+        <mc:Choice Requires="a14">
           <p:sp>
             <p:nvSpPr>
               <p:cNvPr id="14" name="Segnaposto contenuto 13"/>
@@ -4267,7 +4364,7 @@
             </p:txBody>
           </p:sp>
         </mc:Choice>
-        <mc:Fallback>
+        <mc:Fallback xmlns="">
           <p:sp>
             <p:nvSpPr>
               <p:cNvPr id="14" name="Segnaposto contenuto 13"/>
@@ -4377,8 +4474,8 @@
           </a:prstGeom>
         </p:spPr>
       </p:pic>
-      <mc:AlternateContent xmlns:mc="http://schemas.openxmlformats.org/markup-compatibility/2006">
-        <mc:Choice xmlns:a14="http://schemas.microsoft.com/office/drawing/2010/main" Requires="a14">
+      <mc:AlternateContent xmlns:mc="http://schemas.openxmlformats.org/markup-compatibility/2006" xmlns:a14="http://schemas.microsoft.com/office/drawing/2010/main">
+        <mc:Choice Requires="a14">
           <p:sp>
             <p:nvSpPr>
               <p:cNvPr id="8" name="CasellaDiTesto 7">
@@ -4442,7 +4539,7 @@
             </p:txBody>
           </p:sp>
         </mc:Choice>
-        <mc:Fallback>
+        <mc:Fallback xmlns="">
           <p:sp>
             <p:nvSpPr>
               <p:cNvPr id="8" name="CasellaDiTesto 7">
@@ -4497,13 +4594,13 @@
   <p:clrMapOvr>
     <a:masterClrMapping/>
   </p:clrMapOvr>
-  <mc:AlternateContent xmlns:mc="http://schemas.openxmlformats.org/markup-compatibility/2006">
-    <mc:Choice xmlns:p14="http://schemas.microsoft.com/office/powerpoint/2010/main" Requires="p14">
+  <mc:AlternateContent xmlns:mc="http://schemas.openxmlformats.org/markup-compatibility/2006" xmlns:p14="http://schemas.microsoft.com/office/powerpoint/2010/main">
+    <mc:Choice Requires="p14">
       <p:transition spd="med" p14:dur="700">
         <p:fade/>
       </p:transition>
     </mc:Choice>
-    <mc:Fallback>
+    <mc:Fallback xmlns="">
       <p:transition spd="med">
         <p:fade/>
       </p:transition>
@@ -4646,13 +4743,13 @@
   <p:clrMapOvr>
     <a:masterClrMapping/>
   </p:clrMapOvr>
-  <mc:AlternateContent xmlns:mc="http://schemas.openxmlformats.org/markup-compatibility/2006">
-    <mc:Choice xmlns:p14="http://schemas.microsoft.com/office/powerpoint/2010/main" Requires="p14">
+  <mc:AlternateContent xmlns:mc="http://schemas.openxmlformats.org/markup-compatibility/2006" xmlns:p14="http://schemas.microsoft.com/office/powerpoint/2010/main">
+    <mc:Choice Requires="p14">
       <p:transition spd="med" p14:dur="700">
         <p:fade/>
       </p:transition>
     </mc:Choice>
-    <mc:Fallback>
+    <mc:Fallback xmlns="">
       <p:transition spd="med">
         <p:fade/>
       </p:transition>
@@ -4716,7 +4813,7 @@
         <p:spPr>
           <a:xfrm>
             <a:off x="1593852" y="1417638"/>
-            <a:ext cx="9785349" cy="400110"/>
+            <a:ext cx="10280096" cy="1631216"/>
           </a:xfrm>
           <a:prstGeom prst="rect">
             <a:avLst/>
@@ -4731,7 +4828,273 @@
           <a:p>
             <a:r>
               <a:rPr lang="it-IT" sz="2000" dirty="0"/>
-              <a:t>Il motore può essere descritto da una serie di equazioni differenziali</a:t>
+              <a:t>Il motore può essere descritto da una serie di equazioni, che riguardano sia aspetti elettro-magnetici che meccanici.</a:t>
+            </a:r>
+          </a:p>
+          <a:p>
+            <a:r>
+              <a:rPr lang="it-IT" sz="2000" dirty="0"/>
+              <a:t>Partendo dallo schema più generale per un motore, con uno statore elettro-attuato (</a:t>
+            </a:r>
+            <a:r>
+              <a:rPr lang="it-IT" sz="2000" b="1" dirty="0"/>
+              <a:t>non</a:t>
+            </a:r>
+            <a:r>
+              <a:rPr lang="it-IT" sz="2000" dirty="0"/>
+              <a:t> un magnete permanente), otteniamo le seguenti equazioni:</a:t>
+            </a:r>
+          </a:p>
+          <a:p>
+            <a:endParaRPr lang="it-IT" sz="2000" u="sng" dirty="0"/>
+          </a:p>
+        </p:txBody>
+      </p:sp>
+      <p:pic>
+        <p:nvPicPr>
+          <p:cNvPr id="5" name="Immagine 4" descr="Immagine che contiene orologio&#10;&#10;Descrizione generata automaticamente">
+            <a:extLst>
+              <a:ext uri="{FF2B5EF4-FFF2-40B4-BE49-F238E27FC236}">
+                <a16:creationId xmlns:a16="http://schemas.microsoft.com/office/drawing/2014/main" id="{80FFB062-B4EF-45FC-955E-58B0884D388F}"/>
+              </a:ext>
+            </a:extLst>
+          </p:cNvPr>
+          <p:cNvPicPr>
+            <a:picLocks noChangeAspect="1"/>
+          </p:cNvPicPr>
+          <p:nvPr/>
+        </p:nvPicPr>
+        <p:blipFill>
+          <a:blip r:embed="rId3">
+            <a:extLst>
+              <a:ext uri="{28A0092B-C50C-407E-A947-70E740481C1C}">
+                <a14:useLocalDpi xmlns:a14="http://schemas.microsoft.com/office/drawing/2010/main" val="0"/>
+              </a:ext>
+            </a:extLst>
+          </a:blip>
+          <a:stretch>
+            <a:fillRect/>
+          </a:stretch>
+        </p:blipFill>
+        <p:spPr>
+          <a:xfrm>
+            <a:off x="1593851" y="2756007"/>
+            <a:ext cx="4859957" cy="2269362"/>
+          </a:xfrm>
+          <a:prstGeom prst="rect">
+            <a:avLst/>
+          </a:prstGeom>
+        </p:spPr>
+      </p:pic>
+      <p:pic>
+        <p:nvPicPr>
+          <p:cNvPr id="6" name="Immagine 5" descr="Immagine che contiene orologio&#10;&#10;Descrizione generata automaticamente">
+            <a:extLst>
+              <a:ext uri="{FF2B5EF4-FFF2-40B4-BE49-F238E27FC236}">
+                <a16:creationId xmlns:a16="http://schemas.microsoft.com/office/drawing/2014/main" id="{0D9BE4EE-9B0A-4C11-9186-141ADD9584D1}"/>
+              </a:ext>
+            </a:extLst>
+          </p:cNvPr>
+          <p:cNvPicPr>
+            <a:picLocks noChangeAspect="1"/>
+          </p:cNvPicPr>
+          <p:nvPr/>
+        </p:nvPicPr>
+        <p:blipFill>
+          <a:blip r:embed="rId4">
+            <a:extLst>
+              <a:ext uri="{28A0092B-C50C-407E-A947-70E740481C1C}">
+                <a14:useLocalDpi xmlns:a14="http://schemas.microsoft.com/office/drawing/2010/main" val="0"/>
+              </a:ext>
+            </a:extLst>
+          </a:blip>
+          <a:stretch>
+            <a:fillRect/>
+          </a:stretch>
+        </p:blipFill>
+        <p:spPr>
+          <a:xfrm>
+            <a:off x="6795141" y="2756007"/>
+            <a:ext cx="5396860" cy="2560638"/>
+          </a:xfrm>
+          <a:prstGeom prst="rect">
+            <a:avLst/>
+          </a:prstGeom>
+        </p:spPr>
+      </p:pic>
+      <p:pic>
+        <p:nvPicPr>
+          <p:cNvPr id="8" name="Immagine 7" descr="Immagine che contiene screenshot, monitor, schermo, rosso&#10;&#10;Descrizione generata automaticamente">
+            <a:extLst>
+              <a:ext uri="{FF2B5EF4-FFF2-40B4-BE49-F238E27FC236}">
+                <a16:creationId xmlns:a16="http://schemas.microsoft.com/office/drawing/2014/main" id="{242C2194-6A46-4C7E-91E8-215BF46156F1}"/>
+              </a:ext>
+            </a:extLst>
+          </p:cNvPr>
+          <p:cNvPicPr>
+            <a:picLocks noChangeAspect="1"/>
+          </p:cNvPicPr>
+          <p:nvPr/>
+        </p:nvPicPr>
+        <p:blipFill>
+          <a:blip r:embed="rId5">
+            <a:extLst>
+              <a:ext uri="{28A0092B-C50C-407E-A947-70E740481C1C}">
+                <a14:useLocalDpi xmlns:a14="http://schemas.microsoft.com/office/drawing/2010/main" val="0"/>
+              </a:ext>
+            </a:extLst>
+          </a:blip>
+          <a:stretch>
+            <a:fillRect/>
+          </a:stretch>
+        </p:blipFill>
+        <p:spPr>
+          <a:xfrm>
+            <a:off x="1593851" y="5223425"/>
+            <a:ext cx="8106740" cy="1634575"/>
+          </a:xfrm>
+          <a:prstGeom prst="rect">
+            <a:avLst/>
+          </a:prstGeom>
+        </p:spPr>
+      </p:pic>
+      <p:cxnSp>
+        <p:nvCxnSpPr>
+          <p:cNvPr id="10" name="Connettore diritto 9">
+            <a:extLst>
+              <a:ext uri="{FF2B5EF4-FFF2-40B4-BE49-F238E27FC236}">
+                <a16:creationId xmlns:a16="http://schemas.microsoft.com/office/drawing/2014/main" id="{265BE979-DD19-41C5-BFA8-EAA10B347E31}"/>
+              </a:ext>
+            </a:extLst>
+          </p:cNvPr>
+          <p:cNvCxnSpPr>
+            <a:cxnSpLocks/>
+          </p:cNvCxnSpPr>
+          <p:nvPr/>
+        </p:nvCxnSpPr>
+        <p:spPr>
+          <a:xfrm>
+            <a:off x="1855304" y="6241773"/>
+            <a:ext cx="2438400" cy="0"/>
+          </a:xfrm>
+          <a:prstGeom prst="line">
+            <a:avLst/>
+          </a:prstGeom>
+          <a:ln w="38100">
+            <a:solidFill>
+              <a:srgbClr val="CC3300"/>
+            </a:solidFill>
+          </a:ln>
+        </p:spPr>
+        <p:style>
+          <a:lnRef idx="1">
+            <a:schemeClr val="accent1"/>
+          </a:lnRef>
+          <a:fillRef idx="0">
+            <a:schemeClr val="accent1"/>
+          </a:fillRef>
+          <a:effectRef idx="0">
+            <a:schemeClr val="accent1"/>
+          </a:effectRef>
+          <a:fontRef idx="minor">
+            <a:schemeClr val="tx1"/>
+          </a:fontRef>
+        </p:style>
+      </p:cxnSp>
+      <p:cxnSp>
+        <p:nvCxnSpPr>
+          <p:cNvPr id="13" name="Connettore diritto 12">
+            <a:extLst>
+              <a:ext uri="{FF2B5EF4-FFF2-40B4-BE49-F238E27FC236}">
+                <a16:creationId xmlns:a16="http://schemas.microsoft.com/office/drawing/2014/main" id="{9B625F05-B17B-4B6D-A149-F6E8E8817863}"/>
+              </a:ext>
+            </a:extLst>
+          </p:cNvPr>
+          <p:cNvCxnSpPr>
+            <a:cxnSpLocks/>
+          </p:cNvCxnSpPr>
+          <p:nvPr/>
+        </p:nvCxnSpPr>
+        <p:spPr>
+          <a:xfrm>
+            <a:off x="1855304" y="6765234"/>
+            <a:ext cx="2438400" cy="0"/>
+          </a:xfrm>
+          <a:prstGeom prst="line">
+            <a:avLst/>
+          </a:prstGeom>
+          <a:ln w="38100">
+            <a:solidFill>
+              <a:srgbClr val="CC3300"/>
+            </a:solidFill>
+          </a:ln>
+        </p:spPr>
+        <p:style>
+          <a:lnRef idx="1">
+            <a:schemeClr val="accent1"/>
+          </a:lnRef>
+          <a:fillRef idx="0">
+            <a:schemeClr val="accent1"/>
+          </a:fillRef>
+          <a:effectRef idx="0">
+            <a:schemeClr val="accent1"/>
+          </a:effectRef>
+          <a:fontRef idx="minor">
+            <a:schemeClr val="tx1"/>
+          </a:fontRef>
+        </p:style>
+      </p:cxnSp>
+      <p:sp>
+        <p:nvSpPr>
+          <p:cNvPr id="14" name="CasellaDiTesto 13">
+            <a:extLst>
+              <a:ext uri="{FF2B5EF4-FFF2-40B4-BE49-F238E27FC236}">
+                <a16:creationId xmlns:a16="http://schemas.microsoft.com/office/drawing/2014/main" id="{58914ED1-F66C-454A-B052-EE4653FB051B}"/>
+              </a:ext>
+            </a:extLst>
+          </p:cNvPr>
+          <p:cNvSpPr txBox="1"/>
+          <p:nvPr/>
+        </p:nvSpPr>
+        <p:spPr>
+          <a:xfrm>
+            <a:off x="7421217" y="6310867"/>
+            <a:ext cx="4452731" cy="369332"/>
+          </a:xfrm>
+          <a:prstGeom prst="rect">
+            <a:avLst/>
+          </a:prstGeom>
+          <a:solidFill>
+            <a:srgbClr val="CC3300">
+              <a:alpha val="50196"/>
+            </a:srgbClr>
+          </a:solidFill>
+        </p:spPr>
+        <p:txBody>
+          <a:bodyPr wrap="square" rtlCol="0">
+            <a:spAutoFit/>
+          </a:bodyPr>
+          <a:lstStyle/>
+          <a:p>
+            <a:r>
+              <a:rPr lang="it-IT" b="1" dirty="0"/>
+              <a:t>N.B.: questi due termini </a:t>
+            </a:r>
+            <a:r>
+              <a:rPr lang="it-IT" b="1" u="sng" dirty="0"/>
+              <a:t>non</a:t>
+            </a:r>
+            <a:r>
+              <a:rPr lang="it-IT" b="1" dirty="0"/>
+              <a:t> sono </a:t>
+            </a:r>
+            <a:r>
+              <a:rPr lang="it-IT" b="1" u="sng" dirty="0"/>
+              <a:t>lineari</a:t>
+            </a:r>
+            <a:r>
+              <a:rPr lang="it-IT" dirty="0"/>
+              <a:t>.</a:t>
             </a:r>
           </a:p>
         </p:txBody>
@@ -4746,13 +5109,13 @@
   <p:clrMapOvr>
     <a:masterClrMapping/>
   </p:clrMapOvr>
-  <mc:AlternateContent xmlns:mc="http://schemas.openxmlformats.org/markup-compatibility/2006">
-    <mc:Choice xmlns:p14="http://schemas.microsoft.com/office/powerpoint/2010/main" Requires="p14">
+  <mc:AlternateContent xmlns:mc="http://schemas.openxmlformats.org/markup-compatibility/2006" xmlns:p14="http://schemas.microsoft.com/office/powerpoint/2010/main">
+    <mc:Choice Requires="p14">
       <p:transition spd="med" p14:dur="700">
         <p:fade/>
       </p:transition>
     </mc:Choice>
-    <mc:Fallback>
+    <mc:Fallback xmlns="">
       <p:transition spd="med">
         <p:fade/>
       </p:transition>
@@ -4815,8 +5178,8 @@
         </p:nvSpPr>
         <p:spPr>
           <a:xfrm>
-            <a:off x="1712686" y="1417638"/>
-            <a:ext cx="7286171" cy="369332"/>
+            <a:off x="1712687" y="1417638"/>
+            <a:ext cx="4502150" cy="1015663"/>
           </a:xfrm>
           <a:prstGeom prst="rect">
             <a:avLst/>
@@ -4829,16 +5192,19 @@
           </a:bodyPr>
           <a:lstStyle/>
           <a:p>
-            <a:endParaRPr lang="it-IT" dirty="0"/>
+            <a:r>
+              <a:rPr lang="it-IT" sz="2000" dirty="0"/>
+              <a:t>Si ottiene pertanto un sistema di equazioni differenziali sulle tensioni delle due maglie del circuito:</a:t>
+            </a:r>
           </a:p>
         </p:txBody>
       </p:sp>
       <p:pic>
         <p:nvPicPr>
-          <p:cNvPr id="7" name="Immagine 6" descr="Immagine che contiene screenshot, televisione, schermo, sedendo&#10;&#10;Descrizione generata automaticamente">
+          <p:cNvPr id="5" name="Immagine 4" descr="Immagine che contiene computer&#10;&#10;Descrizione generata automaticamente">
             <a:extLst>
               <a:ext uri="{FF2B5EF4-FFF2-40B4-BE49-F238E27FC236}">
-                <a16:creationId xmlns:a16="http://schemas.microsoft.com/office/drawing/2014/main" id="{AD050262-18C1-46CD-975E-3EC62B91FE64}"/>
+                <a16:creationId xmlns:a16="http://schemas.microsoft.com/office/drawing/2014/main" id="{C41855EE-C36F-4225-BE9A-E3F868DF6AF6}"/>
               </a:ext>
             </a:extLst>
           </p:cNvPr>
@@ -4861,31 +5227,641 @@
         </p:blipFill>
         <p:spPr>
           <a:xfrm>
-            <a:off x="1194016" y="4359705"/>
-            <a:ext cx="10693184" cy="2498295"/>
+            <a:off x="6486526" y="1417637"/>
+            <a:ext cx="5164364" cy="1849921"/>
           </a:xfrm>
           <a:prstGeom prst="rect">
             <a:avLst/>
           </a:prstGeom>
         </p:spPr>
       </p:pic>
+      <p:pic>
+        <p:nvPicPr>
+          <p:cNvPr id="8" name="Immagine 7" descr="Immagine che contiene orologio&#10;&#10;Descrizione generata automaticamente">
+            <a:extLst>
+              <a:ext uri="{FF2B5EF4-FFF2-40B4-BE49-F238E27FC236}">
+                <a16:creationId xmlns:a16="http://schemas.microsoft.com/office/drawing/2014/main" id="{A766C5D3-A897-4B58-8C68-B762DD1A6174}"/>
+              </a:ext>
+            </a:extLst>
+          </p:cNvPr>
+          <p:cNvPicPr>
+            <a:picLocks noChangeAspect="1"/>
+          </p:cNvPicPr>
+          <p:nvPr/>
+        </p:nvPicPr>
+        <p:blipFill>
+          <a:blip r:embed="rId4">
+            <a:extLst>
+              <a:ext uri="{28A0092B-C50C-407E-A947-70E740481C1C}">
+                <a14:useLocalDpi xmlns:a14="http://schemas.microsoft.com/office/drawing/2010/main" val="0"/>
+              </a:ext>
+            </a:extLst>
+          </a:blip>
+          <a:stretch>
+            <a:fillRect/>
+          </a:stretch>
+        </p:blipFill>
+        <p:spPr>
+          <a:xfrm>
+            <a:off x="1593852" y="2340968"/>
+            <a:ext cx="3760026" cy="1852766"/>
+          </a:xfrm>
+          <a:prstGeom prst="rect">
+            <a:avLst/>
+          </a:prstGeom>
+        </p:spPr>
+      </p:pic>
+      <mc:AlternateContent xmlns:mc="http://schemas.openxmlformats.org/markup-compatibility/2006">
+        <mc:Choice xmlns:a14="http://schemas.microsoft.com/office/drawing/2010/main" Requires="a14">
+          <p:sp>
+            <p:nvSpPr>
+              <p:cNvPr id="9" name="CasellaDiTesto 8">
+                <a:extLst>
+                  <a:ext uri="{FF2B5EF4-FFF2-40B4-BE49-F238E27FC236}">
+                    <a16:creationId xmlns:a16="http://schemas.microsoft.com/office/drawing/2014/main" id="{CE420E0A-C133-4A6F-8697-69281E6DACDD}"/>
+                  </a:ext>
+                </a:extLst>
+              </p:cNvPr>
+              <p:cNvSpPr txBox="1"/>
+              <p:nvPr/>
+            </p:nvSpPr>
+            <p:spPr>
+              <a:xfrm>
+                <a:off x="1712686" y="4193734"/>
+                <a:ext cx="9938203" cy="1015663"/>
+              </a:xfrm>
+              <a:prstGeom prst="rect">
+                <a:avLst/>
+              </a:prstGeom>
+              <a:noFill/>
+            </p:spPr>
+            <p:txBody>
+              <a:bodyPr wrap="square" rtlCol="0">
+                <a:spAutoFit/>
+              </a:bodyPr>
+              <a:lstStyle/>
+              <a:p>
+                <a:r>
+                  <a:rPr lang="it-IT" sz="2000" dirty="0"/>
+                  <a:t>La </a:t>
+                </a:r>
+                <a:r>
+                  <a:rPr lang="it-IT" sz="2000" i="1" dirty="0" err="1"/>
+                  <a:t>f.c.e.m</a:t>
+                </a:r>
+                <a:r>
+                  <a:rPr lang="it-IT" sz="2000" i="1" dirty="0"/>
+                  <a:t>.</a:t>
+                </a:r>
+                <a:r>
+                  <a:rPr lang="it-IT" sz="2000" dirty="0"/>
+                  <a:t> è ancora un termine non lineare; tuttavia, se si impiegano magneti </a:t>
+                </a:r>
+                <a:r>
+                  <a:rPr lang="it-IT" sz="2000" b="1" dirty="0"/>
+                  <a:t>permanenti</a:t>
+                </a:r>
+                <a:r>
+                  <a:rPr lang="it-IT" sz="2000" dirty="0"/>
+                  <a:t>, o la </a:t>
+                </a:r>
+                <a14:m>
+                  <m:oMath xmlns:m="http://schemas.openxmlformats.org/officeDocument/2006/math">
+                    <m:sSub>
+                      <m:sSubPr>
+                        <m:ctrlPr>
+                          <a:rPr lang="it-IT" sz="2000" b="1" i="1" smtClean="0">
+                            <a:latin typeface="Cambria Math" panose="02040503050406030204" pitchFamily="18" charset="0"/>
+                          </a:rPr>
+                        </m:ctrlPr>
+                      </m:sSubPr>
+                      <m:e>
+                        <m:r>
+                          <a:rPr lang="it-IT" sz="2000" b="1" i="1" smtClean="0">
+                            <a:latin typeface="Cambria Math" panose="02040503050406030204" pitchFamily="18" charset="0"/>
+                          </a:rPr>
+                          <m:t>𝒊</m:t>
+                        </m:r>
+                      </m:e>
+                      <m:sub>
+                        <m:r>
+                          <a:rPr lang="it-IT" sz="2000" b="1" i="1" smtClean="0">
+                            <a:latin typeface="Cambria Math" panose="02040503050406030204" pitchFamily="18" charset="0"/>
+                          </a:rPr>
+                          <m:t>𝒆</m:t>
+                        </m:r>
+                      </m:sub>
+                    </m:sSub>
+                    <m:r>
+                      <a:rPr lang="it-IT" sz="2000" b="1" i="1" smtClean="0">
+                        <a:latin typeface="Cambria Math" panose="02040503050406030204" pitchFamily="18" charset="0"/>
+                      </a:rPr>
+                      <m:t> </m:t>
+                    </m:r>
+                  </m:oMath>
+                </a14:m>
+                <a:r>
+                  <a:rPr lang="it-IT" sz="2000" dirty="0"/>
+                  <a:t>è </a:t>
+                </a:r>
+                <a:r>
+                  <a:rPr lang="it-IT" sz="2000" b="1" dirty="0"/>
+                  <a:t>costante</a:t>
+                </a:r>
+                <a:r>
+                  <a:rPr lang="it-IT" sz="2000" dirty="0"/>
+                  <a:t> </a:t>
+                </a:r>
+                <a14:m>
+                  <m:oMath xmlns:m="http://schemas.openxmlformats.org/officeDocument/2006/math">
+                    <m:r>
+                      <a:rPr lang="it-IT" sz="2000" b="1" i="1">
+                        <a:latin typeface="Cambria Math" panose="02040503050406030204" pitchFamily="18" charset="0"/>
+                      </a:rPr>
+                      <m:t>⟹ </m:t>
+                    </m:r>
+                    <m:sSub>
+                      <m:sSubPr>
+                        <m:ctrlPr>
+                          <a:rPr lang="it-IT" sz="2000" b="1" dirty="0" smtClean="0">
+                            <a:latin typeface="Cambria Math" panose="02040503050406030204" pitchFamily="18" charset="0"/>
+                          </a:rPr>
+                        </m:ctrlPr>
+                      </m:sSubPr>
+                      <m:e>
+                        <m:r>
+                          <a:rPr lang="it-IT" sz="2000" b="1" i="1" dirty="0" smtClean="0">
+                            <a:latin typeface="Cambria Math" panose="02040503050406030204" pitchFamily="18" charset="0"/>
+                          </a:rPr>
+                          <m:t>𝜱</m:t>
+                        </m:r>
+                      </m:e>
+                      <m:sub>
+                        <m:r>
+                          <a:rPr lang="it-IT" sz="2000" b="1" i="1" dirty="0" smtClean="0">
+                            <a:latin typeface="Cambria Math" panose="02040503050406030204" pitchFamily="18" charset="0"/>
+                          </a:rPr>
+                          <m:t>𝒆</m:t>
+                        </m:r>
+                      </m:sub>
+                    </m:sSub>
+                    <m:r>
+                      <a:rPr lang="it-IT" sz="2000" b="1" i="0" dirty="0" smtClean="0">
+                        <a:latin typeface="Cambria Math" panose="02040503050406030204" pitchFamily="18" charset="0"/>
+                      </a:rPr>
+                      <m:t>=</m:t>
+                    </m:r>
+                    <m:r>
+                      <a:rPr lang="it-IT" sz="2000" b="1" i="0" dirty="0" smtClean="0">
+                        <a:latin typeface="Cambria Math" panose="02040503050406030204" pitchFamily="18" charset="0"/>
+                      </a:rPr>
+                      <m:t>𝐜𝐨𝐬𝐭𝐚𝐧𝐭𝐞</m:t>
+                    </m:r>
+                    <m:r>
+                      <a:rPr lang="it-IT" sz="2000" b="1" i="1" smtClean="0">
+                        <a:latin typeface="Cambria Math" panose="02040503050406030204" pitchFamily="18" charset="0"/>
+                      </a:rPr>
+                      <m:t>⟹</m:t>
+                    </m:r>
+                  </m:oMath>
+                </a14:m>
+                <a:r>
+                  <a:rPr lang="it-IT" sz="2000" dirty="0"/>
+                  <a:t> </a:t>
+                </a:r>
+                <a14:m>
+                  <m:oMath xmlns:m="http://schemas.openxmlformats.org/officeDocument/2006/math">
+                    <m:sSub>
+                      <m:sSubPr>
+                        <m:ctrlPr>
+                          <a:rPr lang="it-IT" sz="2000" b="1" i="1" dirty="0" smtClean="0">
+                            <a:latin typeface="Cambria Math" panose="02040503050406030204" pitchFamily="18" charset="0"/>
+                          </a:rPr>
+                        </m:ctrlPr>
+                      </m:sSubPr>
+                      <m:e>
+                        <m:r>
+                          <a:rPr lang="it-IT" sz="2000" b="1" i="1" dirty="0" smtClean="0">
+                            <a:latin typeface="Cambria Math" panose="02040503050406030204" pitchFamily="18" charset="0"/>
+                          </a:rPr>
+                          <m:t>𝑲</m:t>
+                        </m:r>
+                      </m:e>
+                      <m:sub>
+                        <m:r>
+                          <a:rPr lang="it-IT" sz="2000" b="1" i="1" dirty="0" smtClean="0">
+                            <a:latin typeface="Cambria Math" panose="02040503050406030204" pitchFamily="18" charset="0"/>
+                          </a:rPr>
+                          <m:t>𝒎</m:t>
+                        </m:r>
+                      </m:sub>
+                    </m:sSub>
+                    <m:r>
+                      <a:rPr lang="it-IT" sz="2000" b="1" i="1" dirty="0" smtClean="0">
+                        <a:latin typeface="Cambria Math" panose="02040503050406030204" pitchFamily="18" charset="0"/>
+                      </a:rPr>
+                      <m:t>=</m:t>
+                    </m:r>
+                    <m:sSub>
+                      <m:sSubPr>
+                        <m:ctrlPr>
+                          <a:rPr lang="it-IT" sz="2000" b="1" i="1" dirty="0">
+                            <a:latin typeface="Cambria Math" panose="02040503050406030204" pitchFamily="18" charset="0"/>
+                          </a:rPr>
+                        </m:ctrlPr>
+                      </m:sSubPr>
+                      <m:e>
+                        <m:r>
+                          <a:rPr lang="it-IT" sz="2000" b="1" i="1" dirty="0" smtClean="0">
+                            <a:latin typeface="Cambria Math" panose="02040503050406030204" pitchFamily="18" charset="0"/>
+                          </a:rPr>
+                          <m:t>𝑲</m:t>
+                        </m:r>
+                      </m:e>
+                      <m:sub>
+                        <m:r>
+                          <a:rPr lang="it-IT" sz="2000" b="1" i="1" dirty="0" smtClean="0">
+                            <a:latin typeface="Cambria Math" panose="02040503050406030204" pitchFamily="18" charset="0"/>
+                          </a:rPr>
+                          <m:t>𝒆</m:t>
+                        </m:r>
+                      </m:sub>
+                    </m:sSub>
+                    <m:r>
+                      <a:rPr lang="it-IT" sz="2000" b="1" i="1" dirty="0" smtClean="0">
+                        <a:latin typeface="Cambria Math" panose="02040503050406030204" pitchFamily="18" charset="0"/>
+                        <a:ea typeface="Cambria Math" panose="02040503050406030204" pitchFamily="18" charset="0"/>
+                      </a:rPr>
+                      <m:t>∙</m:t>
+                    </m:r>
+                    <m:sSub>
+                      <m:sSubPr>
+                        <m:ctrlPr>
+                          <a:rPr lang="it-IT" sz="2000" b="1" i="1" dirty="0">
+                            <a:latin typeface="Cambria Math" panose="02040503050406030204" pitchFamily="18" charset="0"/>
+                          </a:rPr>
+                        </m:ctrlPr>
+                      </m:sSubPr>
+                      <m:e>
+                        <m:r>
+                          <a:rPr lang="it-IT" sz="2000" b="1" i="1" dirty="0" smtClean="0">
+                            <a:latin typeface="Cambria Math" panose="02040503050406030204" pitchFamily="18" charset="0"/>
+                          </a:rPr>
+                          <m:t>𝒊</m:t>
+                        </m:r>
+                      </m:e>
+                      <m:sub>
+                        <m:r>
+                          <a:rPr lang="it-IT" sz="2000" b="1" i="1" dirty="0" smtClean="0">
+                            <a:latin typeface="Cambria Math" panose="02040503050406030204" pitchFamily="18" charset="0"/>
+                          </a:rPr>
+                          <m:t>𝒆</m:t>
+                        </m:r>
+                      </m:sub>
+                    </m:sSub>
+                    <m:r>
+                      <a:rPr lang="it-IT" sz="2000" b="1" i="1" dirty="0" smtClean="0">
+                        <a:latin typeface="Cambria Math" panose="02040503050406030204" pitchFamily="18" charset="0"/>
+                        <a:ea typeface="Cambria Math" panose="02040503050406030204" pitchFamily="18" charset="0"/>
+                      </a:rPr>
+                      <m:t>∙</m:t>
+                    </m:r>
+                    <m:sSub>
+                      <m:sSubPr>
+                        <m:ctrlPr>
+                          <a:rPr lang="it-IT" sz="2000" b="1" i="1" dirty="0">
+                            <a:latin typeface="Cambria Math" panose="02040503050406030204" pitchFamily="18" charset="0"/>
+                          </a:rPr>
+                        </m:ctrlPr>
+                      </m:sSubPr>
+                      <m:e>
+                        <m:r>
+                          <a:rPr lang="it-IT" sz="2000" b="1" i="1" dirty="0" smtClean="0">
+                            <a:latin typeface="Cambria Math" panose="02040503050406030204" pitchFamily="18" charset="0"/>
+                          </a:rPr>
+                          <m:t>𝑲</m:t>
+                        </m:r>
+                      </m:e>
+                      <m:sub>
+                        <m:r>
+                          <a:rPr lang="it-IT" sz="2000" b="1" i="1" dirty="0" smtClean="0">
+                            <a:latin typeface="Cambria Math" panose="02040503050406030204" pitchFamily="18" charset="0"/>
+                          </a:rPr>
+                          <m:t>𝒂</m:t>
+                        </m:r>
+                      </m:sub>
+                    </m:sSub>
+                    <m:r>
+                      <a:rPr lang="it-IT" sz="2000" i="1" dirty="0">
+                        <a:latin typeface="Cambria Math" panose="02040503050406030204" pitchFamily="18" charset="0"/>
+                      </a:rPr>
+                      <m:t> </m:t>
+                    </m:r>
+                  </m:oMath>
+                </a14:m>
+                <a:r>
+                  <a:rPr lang="it-IT" sz="2000" dirty="0"/>
+                  <a:t>le equazioni diventano </a:t>
+                </a:r>
+                <a:r>
+                  <a:rPr lang="it-IT" sz="2000" b="1" dirty="0">
+                    <a:solidFill>
+                      <a:srgbClr val="0070C0"/>
+                    </a:solidFill>
+                  </a:rPr>
+                  <a:t>lineari. </a:t>
+                </a:r>
+                <a:r>
+                  <a:rPr lang="it-IT" sz="2000" dirty="0"/>
+                  <a:t>Sostituendo nella seconda equazione, otteniamo:</a:t>
+                </a:r>
+              </a:p>
+            </p:txBody>
+          </p:sp>
+        </mc:Choice>
+        <mc:Fallback>
+          <p:sp>
+            <p:nvSpPr>
+              <p:cNvPr id="9" name="CasellaDiTesto 8">
+                <a:extLst>
+                  <a:ext uri="{FF2B5EF4-FFF2-40B4-BE49-F238E27FC236}">
+                    <a16:creationId xmlns:a16="http://schemas.microsoft.com/office/drawing/2014/main" id="{CE420E0A-C133-4A6F-8697-69281E6DACDD}"/>
+                  </a:ext>
+                </a:extLst>
+              </p:cNvPr>
+              <p:cNvSpPr txBox="1">
+                <a:spLocks noRot="1" noChangeAspect="1" noMove="1" noResize="1" noEditPoints="1" noAdjustHandles="1" noChangeArrowheads="1" noChangeShapeType="1" noTextEdit="1"/>
+              </p:cNvSpPr>
+              <p:nvPr/>
+            </p:nvSpPr>
+            <p:spPr>
+              <a:xfrm>
+                <a:off x="1712686" y="4193734"/>
+                <a:ext cx="9938203" cy="1015663"/>
+              </a:xfrm>
+              <a:prstGeom prst="rect">
+                <a:avLst/>
+              </a:prstGeom>
+              <a:blipFill>
+                <a:blip r:embed="rId5"/>
+                <a:stretch>
+                  <a:fillRect l="-675" t="-3593" b="-9581"/>
+                </a:stretch>
+              </a:blipFill>
+            </p:spPr>
+            <p:txBody>
+              <a:bodyPr/>
+              <a:lstStyle/>
+              <a:p>
+                <a:r>
+                  <a:rPr lang="it-IT">
+                    <a:noFill/>
+                  </a:rPr>
+                  <a:t> </a:t>
+                </a:r>
+              </a:p>
+            </p:txBody>
+          </p:sp>
+        </mc:Fallback>
+      </mc:AlternateContent>
+      <p:pic>
+        <p:nvPicPr>
+          <p:cNvPr id="13" name="Immagine 12">
+            <a:extLst>
+              <a:ext uri="{FF2B5EF4-FFF2-40B4-BE49-F238E27FC236}">
+                <a16:creationId xmlns:a16="http://schemas.microsoft.com/office/drawing/2014/main" id="{C85CE8AF-82B0-4564-AB9D-B24CEAC6FC51}"/>
+              </a:ext>
+            </a:extLst>
+          </p:cNvPr>
+          <p:cNvPicPr>
+            <a:picLocks noChangeAspect="1"/>
+          </p:cNvPicPr>
+          <p:nvPr/>
+        </p:nvPicPr>
+        <p:blipFill>
+          <a:blip r:embed="rId6">
+            <a:extLst>
+              <a:ext uri="{28A0092B-C50C-407E-A947-70E740481C1C}">
+                <a14:useLocalDpi xmlns:a14="http://schemas.microsoft.com/office/drawing/2010/main" val="0"/>
+              </a:ext>
+            </a:extLst>
+          </a:blip>
+          <a:stretch>
+            <a:fillRect/>
+          </a:stretch>
+        </p:blipFill>
+        <p:spPr>
+          <a:xfrm>
+            <a:off x="1712686" y="5209397"/>
+            <a:ext cx="6342875" cy="923330"/>
+          </a:xfrm>
+          <a:prstGeom prst="rect">
+            <a:avLst/>
+          </a:prstGeom>
+        </p:spPr>
+      </p:pic>
+      <mc:AlternateContent xmlns:mc="http://schemas.openxmlformats.org/markup-compatibility/2006">
+        <mc:Choice xmlns:a14="http://schemas.microsoft.com/office/drawing/2010/main" Requires="a14">
+          <p:sp>
+            <p:nvSpPr>
+              <p:cNvPr id="14" name="CasellaDiTesto 13">
+                <a:extLst>
+                  <a:ext uri="{FF2B5EF4-FFF2-40B4-BE49-F238E27FC236}">
+                    <a16:creationId xmlns:a16="http://schemas.microsoft.com/office/drawing/2014/main" id="{578E188E-3C71-4A05-BAAF-B7BF02E942D1}"/>
+                  </a:ext>
+                </a:extLst>
+              </p:cNvPr>
+              <p:cNvSpPr txBox="1"/>
+              <p:nvPr/>
+            </p:nvSpPr>
+            <p:spPr>
+              <a:xfrm>
+                <a:off x="8229833" y="5317119"/>
+                <a:ext cx="3246783" cy="707886"/>
+              </a:xfrm>
+              <a:prstGeom prst="rect">
+                <a:avLst/>
+              </a:prstGeom>
+              <a:noFill/>
+            </p:spPr>
+            <p:txBody>
+              <a:bodyPr wrap="square" rtlCol="0">
+                <a:spAutoFit/>
+              </a:bodyPr>
+              <a:lstStyle/>
+              <a:p>
+                <a:r>
+                  <a:rPr lang="it-IT" sz="2000" dirty="0"/>
+                  <a:t>Dove </a:t>
+                </a:r>
+                <a14:m>
+                  <m:oMath xmlns:m="http://schemas.openxmlformats.org/officeDocument/2006/math">
+                    <m:r>
+                      <a:rPr lang="it-IT" sz="2000" b="1" i="1" smtClean="0">
+                        <a:latin typeface="Cambria Math" panose="02040503050406030204" pitchFamily="18" charset="0"/>
+                        <a:ea typeface="Cambria Math" panose="02040503050406030204" pitchFamily="18" charset="0"/>
+                      </a:rPr>
+                      <m:t>𝝎</m:t>
+                    </m:r>
+                  </m:oMath>
+                </a14:m>
+                <a:r>
+                  <a:rPr lang="it-IT" sz="2000" dirty="0"/>
+                  <a:t> è la velocità angolare del rotore</a:t>
+                </a:r>
+                <a:endParaRPr lang="it-IT" sz="2000" b="1" dirty="0"/>
+              </a:p>
+            </p:txBody>
+          </p:sp>
+        </mc:Choice>
+        <mc:Fallback>
+          <p:sp>
+            <p:nvSpPr>
+              <p:cNvPr id="14" name="CasellaDiTesto 13">
+                <a:extLst>
+                  <a:ext uri="{FF2B5EF4-FFF2-40B4-BE49-F238E27FC236}">
+                    <a16:creationId xmlns:a16="http://schemas.microsoft.com/office/drawing/2014/main" id="{578E188E-3C71-4A05-BAAF-B7BF02E942D1}"/>
+                  </a:ext>
+                </a:extLst>
+              </p:cNvPr>
+              <p:cNvSpPr txBox="1">
+                <a:spLocks noRot="1" noChangeAspect="1" noMove="1" noResize="1" noEditPoints="1" noAdjustHandles="1" noChangeArrowheads="1" noChangeShapeType="1" noTextEdit="1"/>
+              </p:cNvSpPr>
+              <p:nvPr/>
+            </p:nvSpPr>
+            <p:spPr>
+              <a:xfrm>
+                <a:off x="8229833" y="5317119"/>
+                <a:ext cx="3246783" cy="707886"/>
+              </a:xfrm>
+              <a:prstGeom prst="rect">
+                <a:avLst/>
+              </a:prstGeom>
+              <a:blipFill>
+                <a:blip r:embed="rId7"/>
+                <a:stretch>
+                  <a:fillRect l="-1876" t="-5172" b="-14655"/>
+                </a:stretch>
+              </a:blipFill>
+            </p:spPr>
+            <p:txBody>
+              <a:bodyPr/>
+              <a:lstStyle/>
+              <a:p>
+                <a:r>
+                  <a:rPr lang="it-IT">
+                    <a:noFill/>
+                  </a:rPr>
+                  <a:t> </a:t>
+                </a:r>
+              </a:p>
+            </p:txBody>
+          </p:sp>
+        </mc:Fallback>
+      </mc:AlternateContent>
+      <p:cxnSp>
+        <p:nvCxnSpPr>
+          <p:cNvPr id="16" name="Connettore diritto 15">
+            <a:extLst>
+              <a:ext uri="{FF2B5EF4-FFF2-40B4-BE49-F238E27FC236}">
+                <a16:creationId xmlns:a16="http://schemas.microsoft.com/office/drawing/2014/main" id="{F21A8DA8-FB7B-43A5-AF8B-D09CBE9CEB24}"/>
+              </a:ext>
+            </a:extLst>
+          </p:cNvPr>
+          <p:cNvCxnSpPr>
+            <a:cxnSpLocks/>
+          </p:cNvCxnSpPr>
+          <p:nvPr/>
+        </p:nvCxnSpPr>
+        <p:spPr>
+          <a:xfrm>
+            <a:off x="1805451" y="5897218"/>
+            <a:ext cx="328149" cy="0"/>
+          </a:xfrm>
+          <a:prstGeom prst="line">
+            <a:avLst/>
+          </a:prstGeom>
+          <a:ln w="38100">
+            <a:solidFill>
+              <a:srgbClr val="CC3300"/>
+            </a:solidFill>
+          </a:ln>
+        </p:spPr>
+        <p:style>
+          <a:lnRef idx="1">
+            <a:schemeClr val="accent4"/>
+          </a:lnRef>
+          <a:fillRef idx="0">
+            <a:schemeClr val="accent4"/>
+          </a:fillRef>
+          <a:effectRef idx="0">
+            <a:schemeClr val="accent4"/>
+          </a:effectRef>
+          <a:fontRef idx="minor">
+            <a:schemeClr val="tx1"/>
+          </a:fontRef>
+        </p:style>
+      </p:cxnSp>
+      <p:cxnSp>
+        <p:nvCxnSpPr>
+          <p:cNvPr id="17" name="Connettore diritto 16">
+            <a:extLst>
+              <a:ext uri="{FF2B5EF4-FFF2-40B4-BE49-F238E27FC236}">
+                <a16:creationId xmlns:a16="http://schemas.microsoft.com/office/drawing/2014/main" id="{986F6A49-D205-4431-85D0-0AEE1024E1BD}"/>
+              </a:ext>
+            </a:extLst>
+          </p:cNvPr>
+          <p:cNvCxnSpPr>
+            <a:cxnSpLocks/>
+          </p:cNvCxnSpPr>
+          <p:nvPr/>
+        </p:nvCxnSpPr>
+        <p:spPr>
+          <a:xfrm>
+            <a:off x="5439395" y="6121367"/>
+            <a:ext cx="2484783" cy="0"/>
+          </a:xfrm>
+          <a:prstGeom prst="line">
+            <a:avLst/>
+          </a:prstGeom>
+          <a:ln w="38100">
+            <a:solidFill>
+              <a:srgbClr val="CC3300"/>
+            </a:solidFill>
+          </a:ln>
+        </p:spPr>
+        <p:style>
+          <a:lnRef idx="1">
+            <a:schemeClr val="accent4"/>
+          </a:lnRef>
+          <a:fillRef idx="0">
+            <a:schemeClr val="accent4"/>
+          </a:fillRef>
+          <a:effectRef idx="0">
+            <a:schemeClr val="accent4"/>
+          </a:effectRef>
+          <a:fontRef idx="minor">
+            <a:schemeClr val="tx1"/>
+          </a:fontRef>
+        </p:style>
+      </p:cxnSp>
     </p:spTree>
     <p:extLst>
       <p:ext uri="{BB962C8B-B14F-4D97-AF65-F5344CB8AC3E}">
-        <p14:creationId xmlns:p14="http://schemas.microsoft.com/office/powerpoint/2010/main" val="3550039489"/>
+        <p14:creationId xmlns:p14="http://schemas.microsoft.com/office/powerpoint/2010/main" val="1393350966"/>
       </p:ext>
     </p:extLst>
   </p:cSld>
   <p:clrMapOvr>
     <a:masterClrMapping/>
   </p:clrMapOvr>
-  <mc:AlternateContent xmlns:mc="http://schemas.openxmlformats.org/markup-compatibility/2006">
-    <mc:Choice xmlns:p14="http://schemas.microsoft.com/office/powerpoint/2010/main" Requires="p14">
+  <mc:AlternateContent xmlns:mc="http://schemas.openxmlformats.org/markup-compatibility/2006" xmlns:p14="http://schemas.microsoft.com/office/powerpoint/2010/main">
+    <mc:Choice Requires="p14">
       <p:transition spd="med" p14:dur="700">
         <p:fade/>
       </p:transition>
     </mc:Choice>
-    <mc:Fallback>
+    <mc:Fallback xmlns="">
       <p:transition spd="med">
         <p:fade/>
       </p:transition>
@@ -4926,6 +5902,618 @@
           <a:bodyPr rtlCol="0"/>
           <a:lstStyle/>
           <a:p>
+            <a:pPr rtl="0"/>
+            <a:r>
+              <a:rPr lang="it-IT" dirty="0"/>
+              <a:t>Modello Teorico Motore DC</a:t>
+            </a:r>
+          </a:p>
+        </p:txBody>
+      </p:sp>
+      <p:sp>
+        <p:nvSpPr>
+          <p:cNvPr id="3" name="CasellaDiTesto 2">
+            <a:extLst>
+              <a:ext uri="{FF2B5EF4-FFF2-40B4-BE49-F238E27FC236}">
+                <a16:creationId xmlns:a16="http://schemas.microsoft.com/office/drawing/2014/main" id="{EC708D63-B6B0-424C-8DCB-3EDC4EAE614A}"/>
+              </a:ext>
+            </a:extLst>
+          </p:cNvPr>
+          <p:cNvSpPr txBox="1"/>
+          <p:nvPr/>
+        </p:nvSpPr>
+        <p:spPr>
+          <a:xfrm>
+            <a:off x="1712686" y="1417638"/>
+            <a:ext cx="7286171" cy="369332"/>
+          </a:xfrm>
+          <a:prstGeom prst="rect">
+            <a:avLst/>
+          </a:prstGeom>
+          <a:noFill/>
+        </p:spPr>
+        <p:txBody>
+          <a:bodyPr wrap="square" rtlCol="0">
+            <a:spAutoFit/>
+          </a:bodyPr>
+          <a:lstStyle/>
+          <a:p>
+            <a:endParaRPr lang="it-IT" dirty="0"/>
+          </a:p>
+        </p:txBody>
+      </p:sp>
+      <p:sp>
+        <p:nvSpPr>
+          <p:cNvPr id="5" name="CasellaDiTesto 4">
+            <a:extLst>
+              <a:ext uri="{FF2B5EF4-FFF2-40B4-BE49-F238E27FC236}">
+                <a16:creationId xmlns:a16="http://schemas.microsoft.com/office/drawing/2014/main" id="{3ABE5F18-798C-4D71-A917-08D397D07558}"/>
+              </a:ext>
+            </a:extLst>
+          </p:cNvPr>
+          <p:cNvSpPr txBox="1"/>
+          <p:nvPr/>
+        </p:nvSpPr>
+        <p:spPr>
+          <a:xfrm>
+            <a:off x="1712686" y="1417638"/>
+            <a:ext cx="5271210" cy="1015663"/>
+          </a:xfrm>
+          <a:prstGeom prst="rect">
+            <a:avLst/>
+          </a:prstGeom>
+          <a:noFill/>
+        </p:spPr>
+        <p:txBody>
+          <a:bodyPr wrap="square" rtlCol="0">
+            <a:spAutoFit/>
+          </a:bodyPr>
+          <a:lstStyle/>
+          <a:p>
+            <a:r>
+              <a:rPr lang="it-IT" sz="2000" dirty="0"/>
+              <a:t>Applicando la Trasformata di Laplace all’equazione precedente, ed esprimendola in funzione della corrente, essa diventa:</a:t>
+            </a:r>
+          </a:p>
+        </p:txBody>
+      </p:sp>
+      <p:pic>
+        <p:nvPicPr>
+          <p:cNvPr id="8" name="Immagine 7" descr="Immagine che contiene oggetto, orologio&#10;&#10;Descrizione generata automaticamente">
+            <a:extLst>
+              <a:ext uri="{FF2B5EF4-FFF2-40B4-BE49-F238E27FC236}">
+                <a16:creationId xmlns:a16="http://schemas.microsoft.com/office/drawing/2014/main" id="{AC535646-B3F6-480C-81AA-CA1B3388FC7E}"/>
+              </a:ext>
+            </a:extLst>
+          </p:cNvPr>
+          <p:cNvPicPr>
+            <a:picLocks noChangeAspect="1"/>
+          </p:cNvPicPr>
+          <p:nvPr/>
+        </p:nvPicPr>
+        <p:blipFill>
+          <a:blip r:embed="rId3">
+            <a:extLst>
+              <a:ext uri="{28A0092B-C50C-407E-A947-70E740481C1C}">
+                <a14:useLocalDpi xmlns:a14="http://schemas.microsoft.com/office/drawing/2010/main" val="0"/>
+              </a:ext>
+            </a:extLst>
+          </a:blip>
+          <a:stretch>
+            <a:fillRect/>
+          </a:stretch>
+        </p:blipFill>
+        <p:spPr>
+          <a:xfrm>
+            <a:off x="7239211" y="1417638"/>
+            <a:ext cx="4383314" cy="946398"/>
+          </a:xfrm>
+          <a:prstGeom prst="rect">
+            <a:avLst/>
+          </a:prstGeom>
+        </p:spPr>
+      </p:pic>
+      <p:sp>
+        <p:nvSpPr>
+          <p:cNvPr id="9" name="CasellaDiTesto 8">
+            <a:extLst>
+              <a:ext uri="{FF2B5EF4-FFF2-40B4-BE49-F238E27FC236}">
+                <a16:creationId xmlns:a16="http://schemas.microsoft.com/office/drawing/2014/main" id="{CAE3BDCD-207D-49CA-BD69-BCACAEEC0016}"/>
+              </a:ext>
+            </a:extLst>
+          </p:cNvPr>
+          <p:cNvSpPr txBox="1"/>
+          <p:nvPr/>
+        </p:nvSpPr>
+        <p:spPr>
+          <a:xfrm>
+            <a:off x="1712686" y="2500387"/>
+            <a:ext cx="4820636" cy="400110"/>
+          </a:xfrm>
+          <a:prstGeom prst="rect">
+            <a:avLst/>
+          </a:prstGeom>
+          <a:noFill/>
+        </p:spPr>
+        <p:txBody>
+          <a:bodyPr wrap="square" rtlCol="0">
+            <a:spAutoFit/>
+          </a:bodyPr>
+          <a:lstStyle/>
+          <a:p>
+            <a:r>
+              <a:rPr lang="it-IT" sz="2000" dirty="0"/>
+              <a:t>Mentre la </a:t>
+            </a:r>
+            <a:r>
+              <a:rPr lang="it-IT" sz="2000" b="1" dirty="0"/>
+              <a:t>coppia </a:t>
+            </a:r>
+            <a:r>
+              <a:rPr lang="it-IT" sz="2000" dirty="0"/>
+              <a:t>erogata dal motore è:</a:t>
+            </a:r>
+          </a:p>
+        </p:txBody>
+      </p:sp>
+      <p:pic>
+        <p:nvPicPr>
+          <p:cNvPr id="11" name="Immagine 10" descr="Immagine che contiene tavolo, orologio&#10;&#10;Descrizione generata automaticamente">
+            <a:extLst>
+              <a:ext uri="{FF2B5EF4-FFF2-40B4-BE49-F238E27FC236}">
+                <a16:creationId xmlns:a16="http://schemas.microsoft.com/office/drawing/2014/main" id="{E2AE27D3-DB2E-4AFA-834B-BABA46D76BA0}"/>
+              </a:ext>
+            </a:extLst>
+          </p:cNvPr>
+          <p:cNvPicPr>
+            <a:picLocks noChangeAspect="1"/>
+          </p:cNvPicPr>
+          <p:nvPr/>
+        </p:nvPicPr>
+        <p:blipFill>
+          <a:blip r:embed="rId4">
+            <a:extLst>
+              <a:ext uri="{28A0092B-C50C-407E-A947-70E740481C1C}">
+                <a14:useLocalDpi xmlns:a14="http://schemas.microsoft.com/office/drawing/2010/main" val="0"/>
+              </a:ext>
+            </a:extLst>
+          </a:blip>
+          <a:stretch>
+            <a:fillRect/>
+          </a:stretch>
+        </p:blipFill>
+        <p:spPr>
+          <a:xfrm>
+            <a:off x="8217611" y="2432211"/>
+            <a:ext cx="2354974" cy="536461"/>
+          </a:xfrm>
+          <a:prstGeom prst="rect">
+            <a:avLst/>
+          </a:prstGeom>
+        </p:spPr>
+      </p:pic>
+      <p:pic>
+        <p:nvPicPr>
+          <p:cNvPr id="13" name="Immagine 12" descr="Immagine che contiene disegnando&#10;&#10;Descrizione generata automaticamente">
+            <a:extLst>
+              <a:ext uri="{FF2B5EF4-FFF2-40B4-BE49-F238E27FC236}">
+                <a16:creationId xmlns:a16="http://schemas.microsoft.com/office/drawing/2014/main" id="{AD76B367-FA16-4E10-8684-B413DACB7BE6}"/>
+              </a:ext>
+            </a:extLst>
+          </p:cNvPr>
+          <p:cNvPicPr>
+            <a:picLocks noChangeAspect="1"/>
+          </p:cNvPicPr>
+          <p:nvPr/>
+        </p:nvPicPr>
+        <p:blipFill>
+          <a:blip r:embed="rId5">
+            <a:extLst>
+              <a:ext uri="{28A0092B-C50C-407E-A947-70E740481C1C}">
+                <a14:useLocalDpi xmlns:a14="http://schemas.microsoft.com/office/drawing/2010/main" val="0"/>
+              </a:ext>
+            </a:extLst>
+          </a:blip>
+          <a:stretch>
+            <a:fillRect/>
+          </a:stretch>
+        </p:blipFill>
+        <p:spPr>
+          <a:xfrm>
+            <a:off x="6689198" y="3265542"/>
+            <a:ext cx="2741671" cy="450951"/>
+          </a:xfrm>
+          <a:prstGeom prst="rect">
+            <a:avLst/>
+          </a:prstGeom>
+        </p:spPr>
+      </p:pic>
+      <mc:AlternateContent xmlns:mc="http://schemas.openxmlformats.org/markup-compatibility/2006">
+        <mc:Choice xmlns:a14="http://schemas.microsoft.com/office/drawing/2010/main" Requires="a14">
+          <p:sp>
+            <p:nvSpPr>
+              <p:cNvPr id="15" name="CasellaDiTesto 14">
+                <a:extLst>
+                  <a:ext uri="{FF2B5EF4-FFF2-40B4-BE49-F238E27FC236}">
+                    <a16:creationId xmlns:a16="http://schemas.microsoft.com/office/drawing/2014/main" id="{700C1220-2E45-44AE-9D4A-94A619E4D533}"/>
+                  </a:ext>
+                </a:extLst>
+              </p:cNvPr>
+              <p:cNvSpPr txBox="1"/>
+              <p:nvPr/>
+            </p:nvSpPr>
+            <p:spPr>
+              <a:xfrm>
+                <a:off x="1712686" y="2983187"/>
+                <a:ext cx="4820636" cy="1015663"/>
+              </a:xfrm>
+              <a:prstGeom prst="rect">
+                <a:avLst/>
+              </a:prstGeom>
+              <a:noFill/>
+            </p:spPr>
+            <p:txBody>
+              <a:bodyPr wrap="square" rtlCol="0">
+                <a:spAutoFit/>
+              </a:bodyPr>
+              <a:lstStyle/>
+              <a:p>
+                <a:r>
+                  <a:rPr lang="it-IT" sz="2000" dirty="0"/>
+                  <a:t>Collegando un carico al motore di inerzia </a:t>
+                </a:r>
+                <a14:m>
+                  <m:oMath xmlns:m="http://schemas.openxmlformats.org/officeDocument/2006/math">
+                    <m:r>
+                      <a:rPr lang="it-IT" sz="2000" b="1" i="1" smtClean="0">
+                        <a:latin typeface="Cambria Math" panose="02040503050406030204" pitchFamily="18" charset="0"/>
+                      </a:rPr>
+                      <m:t>𝑱</m:t>
+                    </m:r>
+                  </m:oMath>
+                </a14:m>
+                <a:r>
+                  <a:rPr lang="it-IT" sz="2000" dirty="0"/>
+                  <a:t> ed attrito </a:t>
+                </a:r>
+                <a14:m>
+                  <m:oMath xmlns:m="http://schemas.openxmlformats.org/officeDocument/2006/math">
+                    <m:r>
+                      <a:rPr lang="it-IT" sz="2000" b="1" i="1" smtClean="0">
+                        <a:latin typeface="Cambria Math" panose="02040503050406030204" pitchFamily="18" charset="0"/>
+                      </a:rPr>
+                      <m:t>𝑫</m:t>
+                    </m:r>
+                  </m:oMath>
+                </a14:m>
+                <a:r>
+                  <a:rPr lang="it-IT" sz="2000" dirty="0"/>
+                  <a:t>, e trasformando la sua equazione con Laplace:</a:t>
+                </a:r>
+                <a:endParaRPr lang="it-IT" sz="2000" b="1" dirty="0"/>
+              </a:p>
+            </p:txBody>
+          </p:sp>
+        </mc:Choice>
+        <mc:Fallback>
+          <p:sp>
+            <p:nvSpPr>
+              <p:cNvPr id="15" name="CasellaDiTesto 14">
+                <a:extLst>
+                  <a:ext uri="{FF2B5EF4-FFF2-40B4-BE49-F238E27FC236}">
+                    <a16:creationId xmlns:a16="http://schemas.microsoft.com/office/drawing/2014/main" id="{700C1220-2E45-44AE-9D4A-94A619E4D533}"/>
+                  </a:ext>
+                </a:extLst>
+              </p:cNvPr>
+              <p:cNvSpPr txBox="1">
+                <a:spLocks noRot="1" noChangeAspect="1" noMove="1" noResize="1" noEditPoints="1" noAdjustHandles="1" noChangeArrowheads="1" noChangeShapeType="1" noTextEdit="1"/>
+              </p:cNvSpPr>
+              <p:nvPr/>
+            </p:nvSpPr>
+            <p:spPr>
+              <a:xfrm>
+                <a:off x="1712686" y="2983187"/>
+                <a:ext cx="4820636" cy="1015663"/>
+              </a:xfrm>
+              <a:prstGeom prst="rect">
+                <a:avLst/>
+              </a:prstGeom>
+              <a:blipFill>
+                <a:blip r:embed="rId6"/>
+                <a:stretch>
+                  <a:fillRect l="-1391" t="-2994" r="-2023" b="-9581"/>
+                </a:stretch>
+              </a:blipFill>
+            </p:spPr>
+            <p:txBody>
+              <a:bodyPr/>
+              <a:lstStyle/>
+              <a:p>
+                <a:r>
+                  <a:rPr lang="it-IT">
+                    <a:noFill/>
+                  </a:rPr>
+                  <a:t> </a:t>
+                </a:r>
+              </a:p>
+            </p:txBody>
+          </p:sp>
+        </mc:Fallback>
+      </mc:AlternateContent>
+      <p:pic>
+        <p:nvPicPr>
+          <p:cNvPr id="17" name="Immagine 16" descr="Immagine che contiene maglietta&#10;&#10;Descrizione generata automaticamente">
+            <a:extLst>
+              <a:ext uri="{FF2B5EF4-FFF2-40B4-BE49-F238E27FC236}">
+                <a16:creationId xmlns:a16="http://schemas.microsoft.com/office/drawing/2014/main" id="{4C936EF0-F549-43F7-879F-070441456AE5}"/>
+              </a:ext>
+            </a:extLst>
+          </p:cNvPr>
+          <p:cNvPicPr>
+            <a:picLocks noChangeAspect="1"/>
+          </p:cNvPicPr>
+          <p:nvPr/>
+        </p:nvPicPr>
+        <p:blipFill>
+          <a:blip r:embed="rId7">
+            <a:extLst>
+              <a:ext uri="{28A0092B-C50C-407E-A947-70E740481C1C}">
+                <a14:useLocalDpi xmlns:a14="http://schemas.microsoft.com/office/drawing/2010/main" val="0"/>
+              </a:ext>
+            </a:extLst>
+          </a:blip>
+          <a:stretch>
+            <a:fillRect/>
+          </a:stretch>
+        </p:blipFill>
+        <p:spPr>
+          <a:xfrm>
+            <a:off x="9942345" y="3139265"/>
+            <a:ext cx="1918351" cy="703504"/>
+          </a:xfrm>
+          <a:prstGeom prst="rect">
+            <a:avLst/>
+          </a:prstGeom>
+        </p:spPr>
+      </p:pic>
+      <p:cxnSp>
+        <p:nvCxnSpPr>
+          <p:cNvPr id="20" name="Connettore 2 19">
+            <a:extLst>
+              <a:ext uri="{FF2B5EF4-FFF2-40B4-BE49-F238E27FC236}">
+                <a16:creationId xmlns:a16="http://schemas.microsoft.com/office/drawing/2014/main" id="{6A33DA66-67A0-4A55-B064-1103A851C23F}"/>
+              </a:ext>
+            </a:extLst>
+          </p:cNvPr>
+          <p:cNvCxnSpPr>
+            <a:cxnSpLocks/>
+            <a:stCxn id="13" idx="3"/>
+          </p:cNvCxnSpPr>
+          <p:nvPr/>
+        </p:nvCxnSpPr>
+        <p:spPr>
+          <a:xfrm>
+            <a:off x="9430869" y="3491018"/>
+            <a:ext cx="401487" cy="0"/>
+          </a:xfrm>
+          <a:prstGeom prst="straightConnector1">
+            <a:avLst/>
+          </a:prstGeom>
+          <a:ln>
+            <a:tailEnd type="triangle"/>
+          </a:ln>
+        </p:spPr>
+        <p:style>
+          <a:lnRef idx="3">
+            <a:schemeClr val="dk1"/>
+          </a:lnRef>
+          <a:fillRef idx="0">
+            <a:schemeClr val="dk1"/>
+          </a:fillRef>
+          <a:effectRef idx="2">
+            <a:schemeClr val="dk1"/>
+          </a:effectRef>
+          <a:fontRef idx="minor">
+            <a:schemeClr val="tx1"/>
+          </a:fontRef>
+        </p:style>
+      </p:cxnSp>
+      <p:pic>
+        <p:nvPicPr>
+          <p:cNvPr id="25" name="Immagine 24" descr="Immagine che contiene disegnando&#10;&#10;Descrizione generata automaticamente">
+            <a:extLst>
+              <a:ext uri="{FF2B5EF4-FFF2-40B4-BE49-F238E27FC236}">
+                <a16:creationId xmlns:a16="http://schemas.microsoft.com/office/drawing/2014/main" id="{FE280162-679A-4A04-8AA4-27A773E4F621}"/>
+              </a:ext>
+            </a:extLst>
+          </p:cNvPr>
+          <p:cNvPicPr>
+            <a:picLocks noChangeAspect="1"/>
+          </p:cNvPicPr>
+          <p:nvPr/>
+        </p:nvPicPr>
+        <p:blipFill>
+          <a:blip r:embed="rId8">
+            <a:extLst>
+              <a:ext uri="{28A0092B-C50C-407E-A947-70E740481C1C}">
+                <a14:useLocalDpi xmlns:a14="http://schemas.microsoft.com/office/drawing/2010/main" val="0"/>
+              </a:ext>
+            </a:extLst>
+          </a:blip>
+          <a:stretch>
+            <a:fillRect/>
+          </a:stretch>
+        </p:blipFill>
+        <p:spPr>
+          <a:xfrm>
+            <a:off x="9430868" y="3292970"/>
+            <a:ext cx="401487" cy="148023"/>
+          </a:xfrm>
+          <a:prstGeom prst="rect">
+            <a:avLst/>
+          </a:prstGeom>
+        </p:spPr>
+      </p:pic>
+      <p:pic>
+        <p:nvPicPr>
+          <p:cNvPr id="27" name="Immagine 26" descr="Immagine che contiene tabellonesegnapunti, testo, monitor, schermo&#10;&#10;Descrizione generata automaticamente">
+            <a:extLst>
+              <a:ext uri="{FF2B5EF4-FFF2-40B4-BE49-F238E27FC236}">
+                <a16:creationId xmlns:a16="http://schemas.microsoft.com/office/drawing/2014/main" id="{81BCFC15-C3AA-412D-81DB-9314E9586653}"/>
+              </a:ext>
+            </a:extLst>
+          </p:cNvPr>
+          <p:cNvPicPr>
+            <a:picLocks noChangeAspect="1"/>
+          </p:cNvPicPr>
+          <p:nvPr/>
+        </p:nvPicPr>
+        <p:blipFill>
+          <a:blip r:embed="rId9">
+            <a:extLst>
+              <a:ext uri="{28A0092B-C50C-407E-A947-70E740481C1C}">
+                <a14:useLocalDpi xmlns:a14="http://schemas.microsoft.com/office/drawing/2010/main" val="0"/>
+              </a:ext>
+            </a:extLst>
+          </a:blip>
+          <a:stretch>
+            <a:fillRect/>
+          </a:stretch>
+        </p:blipFill>
+        <p:spPr>
+          <a:xfrm>
+            <a:off x="4863548" y="4384874"/>
+            <a:ext cx="6997148" cy="2158406"/>
+          </a:xfrm>
+          <a:prstGeom prst="rect">
+            <a:avLst/>
+          </a:prstGeom>
+        </p:spPr>
+      </p:pic>
+      <p:sp>
+        <p:nvSpPr>
+          <p:cNvPr id="28" name="CasellaDiTesto 27">
+            <a:extLst>
+              <a:ext uri="{FF2B5EF4-FFF2-40B4-BE49-F238E27FC236}">
+                <a16:creationId xmlns:a16="http://schemas.microsoft.com/office/drawing/2014/main" id="{FEA1CD1B-AA33-4122-9755-E6255E74AA04}"/>
+              </a:ext>
+            </a:extLst>
+          </p:cNvPr>
+          <p:cNvSpPr txBox="1"/>
+          <p:nvPr/>
+        </p:nvSpPr>
+        <p:spPr>
+          <a:xfrm>
+            <a:off x="5638800" y="2981739"/>
+            <a:ext cx="914400" cy="914400"/>
+          </a:xfrm>
+          <a:prstGeom prst="rect">
+            <a:avLst/>
+          </a:prstGeom>
+          <a:noFill/>
+        </p:spPr>
+        <p:txBody>
+          <a:bodyPr wrap="square" rtlCol="0">
+            <a:spAutoFit/>
+          </a:bodyPr>
+          <a:lstStyle/>
+          <a:p>
+            <a:endParaRPr lang="it-IT" dirty="0"/>
+          </a:p>
+        </p:txBody>
+      </p:sp>
+      <p:sp>
+        <p:nvSpPr>
+          <p:cNvPr id="29" name="CasellaDiTesto 28">
+            <a:extLst>
+              <a:ext uri="{FF2B5EF4-FFF2-40B4-BE49-F238E27FC236}">
+                <a16:creationId xmlns:a16="http://schemas.microsoft.com/office/drawing/2014/main" id="{A0663CA9-28AE-439F-B07A-0397507D61B3}"/>
+              </a:ext>
+            </a:extLst>
+          </p:cNvPr>
+          <p:cNvSpPr txBox="1"/>
+          <p:nvPr/>
+        </p:nvSpPr>
+        <p:spPr>
+          <a:xfrm>
+            <a:off x="1712686" y="4186804"/>
+            <a:ext cx="3044845" cy="2554545"/>
+          </a:xfrm>
+          <a:prstGeom prst="rect">
+            <a:avLst/>
+          </a:prstGeom>
+          <a:noFill/>
+        </p:spPr>
+        <p:txBody>
+          <a:bodyPr wrap="square" rtlCol="0">
+            <a:spAutoFit/>
+          </a:bodyPr>
+          <a:lstStyle/>
+          <a:p>
+            <a:r>
+              <a:rPr lang="it-IT" sz="2000" dirty="0"/>
+              <a:t>Otteniamo così uno schema del nostro sistema motore-carico, che controllato in tensione raggiunge una velocità angolare limite (ed eventualmente un angolo desiderato)</a:t>
+            </a:r>
+          </a:p>
+        </p:txBody>
+      </p:sp>
+    </p:spTree>
+    <p:extLst>
+      <p:ext uri="{BB962C8B-B14F-4D97-AF65-F5344CB8AC3E}">
+        <p14:creationId xmlns:p14="http://schemas.microsoft.com/office/powerpoint/2010/main" val="3550039489"/>
+      </p:ext>
+    </p:extLst>
+  </p:cSld>
+  <p:clrMapOvr>
+    <a:masterClrMapping/>
+  </p:clrMapOvr>
+  <mc:AlternateContent xmlns:mc="http://schemas.openxmlformats.org/markup-compatibility/2006" xmlns:p14="http://schemas.microsoft.com/office/powerpoint/2010/main">
+    <mc:Choice Requires="p14">
+      <p:transition spd="med" p14:dur="700">
+        <p:fade/>
+      </p:transition>
+    </mc:Choice>
+    <mc:Fallback xmlns="">
+      <p:transition spd="med">
+        <p:fade/>
+      </p:transition>
+    </mc:Fallback>
+  </mc:AlternateContent>
+</p:sld>
+</file>
+
+<file path=ppt/slides/slide7.xml><?xml version="1.0" encoding="utf-8"?>
+<p:sld xmlns:a="http://schemas.openxmlformats.org/drawingml/2006/main" xmlns:r="http://schemas.openxmlformats.org/officeDocument/2006/relationships" xmlns:p="http://schemas.openxmlformats.org/presentationml/2006/main">
+  <p:cSld>
+    <p:spTree>
+      <p:nvGrpSpPr>
+        <p:cNvPr id="1" name=""/>
+        <p:cNvGrpSpPr/>
+        <p:nvPr/>
+      </p:nvGrpSpPr>
+      <p:grpSpPr>
+        <a:xfrm>
+          <a:off x="0" y="0"/>
+          <a:ext cx="0" cy="0"/>
+          <a:chOff x="0" y="0"/>
+          <a:chExt cx="0" cy="0"/>
+        </a:xfrm>
+      </p:grpSpPr>
+      <p:sp>
+        <p:nvSpPr>
+          <p:cNvPr id="2" name="Titolo 1"/>
+          <p:cNvSpPr>
+            <a:spLocks noGrp="1"/>
+          </p:cNvSpPr>
+          <p:nvPr>
+            <p:ph type="title"/>
+          </p:nvPr>
+        </p:nvSpPr>
+        <p:spPr/>
+        <p:txBody>
+          <a:bodyPr rtlCol="0"/>
+          <a:lstStyle/>
+          <a:p>
             <a:r>
               <a:rPr lang="it-IT" dirty="0"/>
               <a:t>Modello Teorico Motore DC [3]</a:t>
@@ -4948,7 +6536,7 @@
         <p:spPr>
           <a:xfrm>
             <a:off x="1593852" y="1417638"/>
-            <a:ext cx="8331200" cy="1200329"/>
+            <a:ext cx="8331200" cy="2585323"/>
           </a:xfrm>
           <a:prstGeom prst="rect">
             <a:avLst/>
@@ -4963,7 +6551,20 @@
           <a:p>
             <a:r>
               <a:rPr lang="it-IT" dirty="0"/>
-              <a:t>Perché il motore è considerato con un modello del primo ordine invece? Perché il polo elettrico è molto veloce, ha una dinamica di due ordini maggiore rispetto a quella meccanica, quindi si può invece assumere come se fosse una </a:t>
+              <a:t>Abbiamo visto nello schema finale come lo schema motore-carico sia un sistema del secondo ordine, con due poli semplici convergenti ad un valore limite calcolabile con il </a:t>
+            </a:r>
+            <a:r>
+              <a:rPr lang="it-IT" b="1" dirty="0"/>
+              <a:t>teorema del valor finale. </a:t>
+            </a:r>
+          </a:p>
+          <a:p>
+            <a:endParaRPr lang="it-IT" b="1" dirty="0"/>
+          </a:p>
+          <a:p>
+            <a:r>
+              <a:rPr lang="it-IT" dirty="0"/>
+              <a:t>Come mai allora il motore è approssimato - con un’ottima stima – ad un modello del primo ordine? Perché il polo elettrico è molto veloce, ha una dinamica di due ordini maggiore rispetto a quella meccanica, quindi si può invece assumere come se fosse una </a:t>
             </a:r>
             <a:r>
               <a:rPr lang="it-IT" b="1" dirty="0"/>
@@ -4971,13 +6572,8 @@
             </a:r>
             <a:r>
               <a:rPr lang="it-IT" dirty="0"/>
-              <a:t>, semplificando l’analisi </a:t>
-            </a:r>
-            <a:r>
-              <a:rPr lang="it-IT"/>
-              <a:t>del modello.</a:t>
-            </a:r>
-            <a:endParaRPr lang="it-IT" dirty="0"/>
+              <a:t>, semplificando l’analisi del modello.</a:t>
+            </a:r>
           </a:p>
         </p:txBody>
       </p:sp>
@@ -4991,13 +6587,13 @@
   <p:clrMapOvr>
     <a:masterClrMapping/>
   </p:clrMapOvr>
-  <mc:AlternateContent xmlns:mc="http://schemas.openxmlformats.org/markup-compatibility/2006">
-    <mc:Choice xmlns:p14="http://schemas.microsoft.com/office/powerpoint/2010/main" Requires="p14">
+  <mc:AlternateContent xmlns:mc="http://schemas.openxmlformats.org/markup-compatibility/2006" xmlns:p14="http://schemas.microsoft.com/office/powerpoint/2010/main">
+    <mc:Choice Requires="p14">
       <p:transition spd="med" p14:dur="700">
         <p:fade/>
       </p:transition>
     </mc:Choice>
-    <mc:Fallback>
+    <mc:Fallback xmlns="">
       <p:transition spd="med">
         <p:fade/>
       </p:transition>

</xml_diff>

<commit_message>
Here we go again.
</commit_message>
<xml_diff>
--- a/00_Relazione/Modello e identificazione di un motore DC/Modello e identificazione di un motore DC.pptx
+++ b/00_Relazione/Modello e identificazione di un motore DC/Modello e identificazione di un motore DC.pptx
@@ -5,7 +5,7 @@
     <p:sldMasterId id="2147483648" r:id="rId1"/>
   </p:sldMasterIdLst>
   <p:notesMasterIdLst>
-    <p:notesMasterId r:id="rId14"/>
+    <p:notesMasterId r:id="rId15"/>
   </p:notesMasterIdLst>
   <p:sldIdLst>
     <p:sldId id="269" r:id="rId2"/>
@@ -17,9 +17,10 @@
     <p:sldId id="275" r:id="rId8"/>
     <p:sldId id="261" r:id="rId9"/>
     <p:sldId id="277" r:id="rId10"/>
-    <p:sldId id="278" r:id="rId11"/>
-    <p:sldId id="279" r:id="rId12"/>
-    <p:sldId id="280" r:id="rId13"/>
+    <p:sldId id="281" r:id="rId11"/>
+    <p:sldId id="278" r:id="rId12"/>
+    <p:sldId id="279" r:id="rId13"/>
+    <p:sldId id="280" r:id="rId14"/>
   </p:sldIdLst>
   <p:sldSz cx="12192000" cy="6858000"/>
   <p:notesSz cx="6858000" cy="9144000"/>
@@ -208,7 +209,7 @@
           <a:p>
             <a:fld id="{2D1A64A2-7D86-439A-A8BC-7FA7B1DBF38C}" type="datetimeFigureOut">
               <a:rPr lang="it-IT" smtClean="0"/>
-              <a:t>17/01/2020</a:t>
+              <a:t>31/01/2020</a:t>
             </a:fld>
             <a:endParaRPr lang="it-IT"/>
           </a:p>
@@ -642,7 +643,7 @@
     </p:spTree>
     <p:extLst>
       <p:ext uri="{BB962C8B-B14F-4D97-AF65-F5344CB8AC3E}">
-        <p14:creationId xmlns:p14="http://schemas.microsoft.com/office/powerpoint/2010/main" val="2853166129"/>
+        <p14:creationId xmlns:p14="http://schemas.microsoft.com/office/powerpoint/2010/main" val="1407950372"/>
       </p:ext>
     </p:extLst>
   </p:cSld>
@@ -824,6 +825,92 @@
 </p:notes>
 </file>
 
+<file path=ppt/notesSlides/notesSlide13.xml><?xml version="1.0" encoding="utf-8"?>
+<p:notes xmlns:a="http://schemas.openxmlformats.org/drawingml/2006/main" xmlns:r="http://schemas.openxmlformats.org/officeDocument/2006/relationships" xmlns:p="http://schemas.openxmlformats.org/presentationml/2006/main">
+  <p:cSld>
+    <p:spTree>
+      <p:nvGrpSpPr>
+        <p:cNvPr id="1" name=""/>
+        <p:cNvGrpSpPr/>
+        <p:nvPr/>
+      </p:nvGrpSpPr>
+      <p:grpSpPr>
+        <a:xfrm>
+          <a:off x="0" y="0"/>
+          <a:ext cx="0" cy="0"/>
+          <a:chOff x="0" y="0"/>
+          <a:chExt cx="0" cy="0"/>
+        </a:xfrm>
+      </p:grpSpPr>
+      <p:sp>
+        <p:nvSpPr>
+          <p:cNvPr id="2" name="Segnaposto immagine diapositiva 1"/>
+          <p:cNvSpPr>
+            <a:spLocks noGrp="1" noRot="1" noChangeAspect="1"/>
+          </p:cNvSpPr>
+          <p:nvPr>
+            <p:ph type="sldImg"/>
+          </p:nvPr>
+        </p:nvSpPr>
+        <p:spPr/>
+      </p:sp>
+      <p:sp>
+        <p:nvSpPr>
+          <p:cNvPr id="3" name="Segnaposto note 2"/>
+          <p:cNvSpPr>
+            <a:spLocks noGrp="1"/>
+          </p:cNvSpPr>
+          <p:nvPr>
+            <p:ph type="body" idx="1"/>
+          </p:nvPr>
+        </p:nvSpPr>
+        <p:spPr/>
+        <p:txBody>
+          <a:bodyPr/>
+          <a:lstStyle/>
+          <a:p>
+            <a:endParaRPr lang="it-IT"/>
+          </a:p>
+        </p:txBody>
+      </p:sp>
+      <p:sp>
+        <p:nvSpPr>
+          <p:cNvPr id="4" name="Segnaposto numero diapositiva 3"/>
+          <p:cNvSpPr>
+            <a:spLocks noGrp="1"/>
+          </p:cNvSpPr>
+          <p:nvPr>
+            <p:ph type="sldNum" sz="quarter" idx="10"/>
+          </p:nvPr>
+        </p:nvSpPr>
+        <p:spPr/>
+        <p:txBody>
+          <a:bodyPr/>
+          <a:lstStyle/>
+          <a:p>
+            <a:pPr rtl="0"/>
+            <a:fld id="{841221E5-7225-48EB-A4EE-420E7BFCF705}" type="slidenum">
+              <a:rPr lang="it-IT" smtClean="0"/>
+              <a:pPr rtl="0"/>
+              <a:t>13</a:t>
+            </a:fld>
+            <a:endParaRPr lang="it-IT" dirty="0"/>
+          </a:p>
+        </p:txBody>
+      </p:sp>
+    </p:spTree>
+    <p:extLst>
+      <p:ext uri="{BB962C8B-B14F-4D97-AF65-F5344CB8AC3E}">
+        <p14:creationId xmlns:p14="http://schemas.microsoft.com/office/powerpoint/2010/main" val="2853166129"/>
+      </p:ext>
+    </p:extLst>
+  </p:cSld>
+  <p:clrMapOvr>
+    <a:masterClrMapping/>
+  </p:clrMapOvr>
+</p:notes>
+</file>
+
 <file path=ppt/notesSlides/notesSlide2.xml><?xml version="1.0" encoding="utf-8"?>
 <p:notes xmlns:a="http://schemas.openxmlformats.org/drawingml/2006/main" xmlns:r="http://schemas.openxmlformats.org/officeDocument/2006/relationships" xmlns:p="http://schemas.openxmlformats.org/presentationml/2006/main">
   <p:cSld>
@@ -1605,7 +1692,7 @@
             <a:fld id="{DA63B92F-6927-4909-8675-8FB028AE3CD8}" type="datetime1">
               <a:rPr lang="it-IT" smtClean="0"/>
               <a:pPr/>
-              <a:t>17/01/2020</a:t>
+              <a:t>31/01/2020</a:t>
             </a:fld>
             <a:endParaRPr lang="it-IT" dirty="0"/>
           </a:p>
@@ -2064,7 +2151,7 @@
             <a:fld id="{E89D5404-FB42-4B9E-BE7A-7821366B0BBC}" type="datetime1">
               <a:rPr lang="it-IT" smtClean="0"/>
               <a:pPr/>
-              <a:t>17/01/2020</a:t>
+              <a:t>31/01/2020</a:t>
             </a:fld>
             <a:endParaRPr lang="it-IT" dirty="0"/>
           </a:p>
@@ -3061,7 +3148,7 @@
             <a:fld id="{982DBDC9-B003-41F0-B8B2-2F0AA2C1B651}" type="datetime1">
               <a:rPr lang="it-IT" smtClean="0"/>
               <a:pPr/>
-              <a:t>17/01/2020</a:t>
+              <a:t>31/01/2020</a:t>
             </a:fld>
             <a:endParaRPr lang="it-IT" dirty="0"/>
           </a:p>
@@ -3292,7 +3379,7 @@
             <a:fld id="{07EF584B-7CE1-48A1-AB7A-1EEAB5F615CD}" type="datetime1">
               <a:rPr lang="it-IT" smtClean="0"/>
               <a:pPr/>
-              <a:t>17/01/2020</a:t>
+              <a:t>31/01/2020</a:t>
             </a:fld>
             <a:endParaRPr lang="it-IT" dirty="0"/>
           </a:p>
@@ -4143,7 +4230,7 @@
             <a:fld id="{62DE71F0-C68A-46D7-94E0-C7A236B6AC63}" type="datetime1">
               <a:rPr lang="it-IT" smtClean="0"/>
               <a:pPr/>
-              <a:t>17/01/2020</a:t>
+              <a:t>31/01/2020</a:t>
             </a:fld>
             <a:endParaRPr lang="it-IT" dirty="0"/>
           </a:p>
@@ -4683,15 +4770,51 @@
             <a:pPr rtl="0"/>
             <a:r>
               <a:rPr lang="it-IT" dirty="0"/>
-              <a:t>Aggiungere un titolo di diapositiva - 3</a:t>
-            </a:r>
-          </a:p>
-        </p:txBody>
-      </p:sp>
+              <a:t>…e confutarne la validità nella pratica</a:t>
+            </a:r>
+          </a:p>
+        </p:txBody>
+      </p:sp>
+      <p:pic>
+        <p:nvPicPr>
+          <p:cNvPr id="4" name="Immagine 3" descr="Immagine che contiene computer, orologio&#10;&#10;Descrizione generata automaticamente">
+            <a:extLst>
+              <a:ext uri="{FF2B5EF4-FFF2-40B4-BE49-F238E27FC236}">
+                <a16:creationId xmlns:a16="http://schemas.microsoft.com/office/drawing/2014/main" id="{464FBAC1-BF0E-49AB-B026-420F691C3394}"/>
+              </a:ext>
+            </a:extLst>
+          </p:cNvPr>
+          <p:cNvPicPr>
+            <a:picLocks noChangeAspect="1"/>
+          </p:cNvPicPr>
+          <p:nvPr/>
+        </p:nvPicPr>
+        <p:blipFill>
+          <a:blip r:embed="rId3">
+            <a:extLst>
+              <a:ext uri="{28A0092B-C50C-407E-A947-70E740481C1C}">
+                <a14:useLocalDpi xmlns:a14="http://schemas.microsoft.com/office/drawing/2010/main" val="0"/>
+              </a:ext>
+            </a:extLst>
+          </a:blip>
+          <a:stretch>
+            <a:fillRect/>
+          </a:stretch>
+        </p:blipFill>
+        <p:spPr>
+          <a:xfrm>
+            <a:off x="1593852" y="1417638"/>
+            <a:ext cx="10043745" cy="5440362"/>
+          </a:xfrm>
+          <a:prstGeom prst="rect">
+            <a:avLst/>
+          </a:prstGeom>
+        </p:spPr>
+      </p:pic>
     </p:spTree>
     <p:extLst>
       <p:ext uri="{BB962C8B-B14F-4D97-AF65-F5344CB8AC3E}">
-        <p14:creationId xmlns:p14="http://schemas.microsoft.com/office/powerpoint/2010/main" val="3558980656"/>
+        <p14:creationId xmlns:p14="http://schemas.microsoft.com/office/powerpoint/2010/main" val="2086658184"/>
       </p:ext>
     </p:extLst>
   </p:cSld>
@@ -4748,11 +4871,361 @@
             <a:pPr rtl="0"/>
             <a:r>
               <a:rPr lang="it-IT" dirty="0"/>
-              <a:t>Aggiungere un titolo di diapositiva - 3</a:t>
-            </a:r>
-          </a:p>
-        </p:txBody>
-      </p:sp>
+              <a:t>Analisi per PWM variabile</a:t>
+            </a:r>
+          </a:p>
+        </p:txBody>
+      </p:sp>
+      <p:sp>
+        <p:nvSpPr>
+          <p:cNvPr id="3" name="CasellaDiTesto 2">
+            <a:extLst>
+              <a:ext uri="{FF2B5EF4-FFF2-40B4-BE49-F238E27FC236}">
+                <a16:creationId xmlns:a16="http://schemas.microsoft.com/office/drawing/2014/main" id="{8054154A-4C8F-41E0-9E6A-3F61C7A59316}"/>
+              </a:ext>
+            </a:extLst>
+          </p:cNvPr>
+          <p:cNvSpPr txBox="1"/>
+          <p:nvPr/>
+        </p:nvSpPr>
+        <p:spPr>
+          <a:xfrm>
+            <a:off x="1696278" y="1537252"/>
+            <a:ext cx="9581322" cy="923330"/>
+          </a:xfrm>
+          <a:prstGeom prst="rect">
+            <a:avLst/>
+          </a:prstGeom>
+          <a:noFill/>
+        </p:spPr>
+        <p:txBody>
+          <a:bodyPr wrap="square" rtlCol="0">
+            <a:spAutoFit/>
+          </a:bodyPr>
+          <a:lstStyle/>
+          <a:p>
+            <a:r>
+              <a:rPr lang="it-IT" dirty="0"/>
+              <a:t>Individuata la funzione di trasferimento tramite un’accelerazione massima seguita da una frenata, abbiamo deciso di applicarla a valori di duty </a:t>
+            </a:r>
+            <a:r>
+              <a:rPr lang="it-IT" dirty="0" err="1"/>
+              <a:t>cycle</a:t>
+            </a:r>
+            <a:r>
+              <a:rPr lang="it-IT" dirty="0"/>
+              <a:t> variabili, poiché il nostro controllo, specie per angoli piccoli, deve spaziare tra tutti i possibili valori (0-255).</a:t>
+            </a:r>
+          </a:p>
+        </p:txBody>
+      </p:sp>
+      <p:sp>
+        <p:nvSpPr>
+          <p:cNvPr id="4" name="CasellaDiTesto 3">
+            <a:extLst>
+              <a:ext uri="{FF2B5EF4-FFF2-40B4-BE49-F238E27FC236}">
+                <a16:creationId xmlns:a16="http://schemas.microsoft.com/office/drawing/2014/main" id="{D7D48930-A71E-42FC-A26E-50D7DF0E34EE}"/>
+              </a:ext>
+            </a:extLst>
+          </p:cNvPr>
+          <p:cNvSpPr txBox="1"/>
+          <p:nvPr/>
+        </p:nvSpPr>
+        <p:spPr>
+          <a:xfrm>
+            <a:off x="1696278" y="2460582"/>
+            <a:ext cx="9785349" cy="1200329"/>
+          </a:xfrm>
+          <a:prstGeom prst="rect">
+            <a:avLst/>
+          </a:prstGeom>
+          <a:noFill/>
+        </p:spPr>
+        <p:txBody>
+          <a:bodyPr wrap="square" rtlCol="0">
+            <a:spAutoFit/>
+          </a:bodyPr>
+          <a:lstStyle/>
+          <a:p>
+            <a:endParaRPr lang="it-IT" dirty="0"/>
+          </a:p>
+          <a:p>
+            <a:r>
+              <a:rPr lang="it-IT" dirty="0"/>
+              <a:t>Come è visibile dalla figura, non solo nel </a:t>
+            </a:r>
+            <a:r>
+              <a:rPr lang="it-IT" b="1" dirty="0"/>
+              <a:t>transitorio</a:t>
+            </a:r>
+            <a:r>
+              <a:rPr lang="it-IT" dirty="0"/>
+              <a:t> non riusciamo a inseguire con la simulazione il valore sperimentale, ma anche </a:t>
+            </a:r>
+            <a:r>
+              <a:rPr lang="it-IT" b="1" dirty="0"/>
+              <a:t>a regime</a:t>
+            </a:r>
+            <a:r>
+              <a:rPr lang="it-IT" dirty="0"/>
+              <a:t>, ad eccezione della velocità massima, siamo lontani dalla realtà fisica.</a:t>
+            </a:r>
+          </a:p>
+        </p:txBody>
+      </p:sp>
+      <p:sp>
+        <p:nvSpPr>
+          <p:cNvPr id="6" name="CasellaDiTesto 5">
+            <a:extLst>
+              <a:ext uri="{FF2B5EF4-FFF2-40B4-BE49-F238E27FC236}">
+                <a16:creationId xmlns:a16="http://schemas.microsoft.com/office/drawing/2014/main" id="{80293F51-A81C-412A-A267-1059DE55C5E2}"/>
+              </a:ext>
+            </a:extLst>
+          </p:cNvPr>
+          <p:cNvSpPr txBox="1"/>
+          <p:nvPr/>
+        </p:nvSpPr>
+        <p:spPr>
+          <a:xfrm>
+            <a:off x="4305473" y="4584241"/>
+            <a:ext cx="4566957" cy="461665"/>
+          </a:xfrm>
+          <a:prstGeom prst="rect">
+            <a:avLst/>
+          </a:prstGeom>
+          <a:noFill/>
+        </p:spPr>
+        <p:txBody>
+          <a:bodyPr wrap="square" rtlCol="0">
+            <a:spAutoFit/>
+          </a:bodyPr>
+          <a:lstStyle/>
+          <a:p>
+            <a:pPr algn="ctr"/>
+            <a:r>
+              <a:rPr lang="it-IT" sz="2400" b="1" dirty="0"/>
+              <a:t>Come mai questa anomalia?</a:t>
+            </a:r>
+          </a:p>
+        </p:txBody>
+      </p:sp>
+    </p:spTree>
+    <p:extLst>
+      <p:ext uri="{BB962C8B-B14F-4D97-AF65-F5344CB8AC3E}">
+        <p14:creationId xmlns:p14="http://schemas.microsoft.com/office/powerpoint/2010/main" val="3558980656"/>
+      </p:ext>
+    </p:extLst>
+  </p:cSld>
+  <p:clrMapOvr>
+    <a:masterClrMapping/>
+  </p:clrMapOvr>
+  <mc:AlternateContent xmlns:mc="http://schemas.openxmlformats.org/markup-compatibility/2006" xmlns:p14="http://schemas.microsoft.com/office/powerpoint/2010/main">
+    <mc:Choice Requires="p14">
+      <p:transition spd="med" p14:dur="700">
+        <p:fade/>
+      </p:transition>
+    </mc:Choice>
+    <mc:Fallback xmlns="">
+      <p:transition spd="med">
+        <p:fade/>
+      </p:transition>
+    </mc:Fallback>
+  </mc:AlternateContent>
+</p:sld>
+</file>
+
+<file path=ppt/slides/slide12.xml><?xml version="1.0" encoding="utf-8"?>
+<p:sld xmlns:a="http://schemas.openxmlformats.org/drawingml/2006/main" xmlns:r="http://schemas.openxmlformats.org/officeDocument/2006/relationships" xmlns:p="http://schemas.openxmlformats.org/presentationml/2006/main">
+  <p:cSld>
+    <p:spTree>
+      <p:nvGrpSpPr>
+        <p:cNvPr id="1" name=""/>
+        <p:cNvGrpSpPr/>
+        <p:nvPr/>
+      </p:nvGrpSpPr>
+      <p:grpSpPr>
+        <a:xfrm>
+          <a:off x="0" y="0"/>
+          <a:ext cx="0" cy="0"/>
+          <a:chOff x="0" y="0"/>
+          <a:chExt cx="0" cy="0"/>
+        </a:xfrm>
+      </p:grpSpPr>
+      <p:sp>
+        <p:nvSpPr>
+          <p:cNvPr id="2" name="Titolo 1"/>
+          <p:cNvSpPr>
+            <a:spLocks noGrp="1"/>
+          </p:cNvSpPr>
+          <p:nvPr>
+            <p:ph type="title"/>
+          </p:nvPr>
+        </p:nvSpPr>
+        <p:spPr/>
+        <p:txBody>
+          <a:bodyPr rtlCol="0"/>
+          <a:lstStyle/>
+          <a:p>
+            <a:pPr rtl="0"/>
+            <a:r>
+              <a:rPr lang="it-IT" dirty="0"/>
+              <a:t>Il Ponte-H</a:t>
+            </a:r>
+          </a:p>
+        </p:txBody>
+      </p:sp>
+      <p:pic>
+        <p:nvPicPr>
+          <p:cNvPr id="6" name="Immagine 5" descr="Immagine che contiene torta, giocattolo, compleanno, circuito&#10;&#10;Descrizione generata automaticamente">
+            <a:extLst>
+              <a:ext uri="{FF2B5EF4-FFF2-40B4-BE49-F238E27FC236}">
+                <a16:creationId xmlns:a16="http://schemas.microsoft.com/office/drawing/2014/main" id="{AB11408A-5632-40F7-AE7C-CAF4C85268DA}"/>
+              </a:ext>
+            </a:extLst>
+          </p:cNvPr>
+          <p:cNvPicPr>
+            <a:picLocks noChangeAspect="1"/>
+          </p:cNvPicPr>
+          <p:nvPr/>
+        </p:nvPicPr>
+        <p:blipFill>
+          <a:blip r:embed="rId3">
+            <a:extLst>
+              <a:ext uri="{28A0092B-C50C-407E-A947-70E740481C1C}">
+                <a14:useLocalDpi xmlns:a14="http://schemas.microsoft.com/office/drawing/2010/main" val="0"/>
+              </a:ext>
+            </a:extLst>
+          </a:blip>
+          <a:stretch>
+            <a:fillRect/>
+          </a:stretch>
+        </p:blipFill>
+        <p:spPr>
+          <a:xfrm>
+            <a:off x="7157099" y="177801"/>
+            <a:ext cx="4222102" cy="3769086"/>
+          </a:xfrm>
+          <a:prstGeom prst="rect">
+            <a:avLst/>
+          </a:prstGeom>
+        </p:spPr>
+      </p:pic>
+      <p:sp>
+        <p:nvSpPr>
+          <p:cNvPr id="7" name="CasellaDiTesto 6">
+            <a:extLst>
+              <a:ext uri="{FF2B5EF4-FFF2-40B4-BE49-F238E27FC236}">
+                <a16:creationId xmlns:a16="http://schemas.microsoft.com/office/drawing/2014/main" id="{3D1FD4A3-A030-49A5-AE33-E59C5C2C1DB9}"/>
+              </a:ext>
+            </a:extLst>
+          </p:cNvPr>
+          <p:cNvSpPr txBox="1"/>
+          <p:nvPr/>
+        </p:nvSpPr>
+        <p:spPr>
+          <a:xfrm>
+            <a:off x="1722782" y="1601959"/>
+            <a:ext cx="5434317" cy="2031325"/>
+          </a:xfrm>
+          <a:prstGeom prst="rect">
+            <a:avLst/>
+          </a:prstGeom>
+          <a:noFill/>
+        </p:spPr>
+        <p:txBody>
+          <a:bodyPr wrap="square" rtlCol="0">
+            <a:spAutoFit/>
+          </a:bodyPr>
+          <a:lstStyle/>
+          <a:p>
+            <a:r>
+              <a:rPr lang="it-IT" dirty="0"/>
+              <a:t>Il funzionamento del Ponte-H è molto semplice: sfruttando </a:t>
+            </a:r>
+            <a:r>
+              <a:rPr lang="it-IT" b="1" dirty="0"/>
+              <a:t>4 transistor </a:t>
+            </a:r>
+            <a:r>
+              <a:rPr lang="it-IT" dirty="0"/>
+              <a:t>sui bracci verticali del circuito in figura, e i </a:t>
+            </a:r>
+            <a:r>
+              <a:rPr lang="it-IT" u="sng" dirty="0"/>
+              <a:t>due ingressi di controllo</a:t>
+            </a:r>
+            <a:r>
+              <a:rPr lang="it-IT" dirty="0"/>
+              <a:t> </a:t>
+            </a:r>
+            <a:r>
+              <a:rPr lang="it-IT" b="1" dirty="0"/>
+              <a:t>A</a:t>
+            </a:r>
+            <a:r>
+              <a:rPr lang="it-IT" dirty="0"/>
+              <a:t> e </a:t>
+            </a:r>
+            <a:r>
+              <a:rPr lang="it-IT" b="1" dirty="0"/>
+              <a:t>B</a:t>
+            </a:r>
+            <a:r>
+              <a:rPr lang="it-IT" dirty="0"/>
+              <a:t>, è possibile </a:t>
+            </a:r>
+            <a:r>
+              <a:rPr lang="it-IT" b="1" u="sng" dirty="0"/>
+              <a:t>invertire</a:t>
+            </a:r>
+            <a:r>
+              <a:rPr lang="it-IT" b="1" dirty="0"/>
+              <a:t> </a:t>
+            </a:r>
+            <a:r>
+              <a:rPr lang="it-IT" dirty="0"/>
+              <a:t>il senso di rotazione del motore elettrico, permettendo quindi di controllare (nel nostro caso) sia il modulo che il verso del vettore di momento angolare.</a:t>
+            </a:r>
+            <a:endParaRPr lang="it-IT" b="1" dirty="0"/>
+          </a:p>
+        </p:txBody>
+      </p:sp>
+      <p:pic>
+        <p:nvPicPr>
+          <p:cNvPr id="9" name="Immagine 8" descr="Immagine che contiene testo&#10;&#10;Descrizione generata automaticamente">
+            <a:extLst>
+              <a:ext uri="{FF2B5EF4-FFF2-40B4-BE49-F238E27FC236}">
+                <a16:creationId xmlns:a16="http://schemas.microsoft.com/office/drawing/2014/main" id="{B0A2A9F5-4FD0-4CE9-9378-E35E6D0A1B76}"/>
+              </a:ext>
+            </a:extLst>
+          </p:cNvPr>
+          <p:cNvPicPr>
+            <a:picLocks noChangeAspect="1"/>
+          </p:cNvPicPr>
+          <p:nvPr/>
+        </p:nvPicPr>
+        <p:blipFill>
+          <a:blip r:embed="rId4">
+            <a:extLst>
+              <a:ext uri="{28A0092B-C50C-407E-A947-70E740481C1C}">
+                <a14:useLocalDpi xmlns:a14="http://schemas.microsoft.com/office/drawing/2010/main" val="0"/>
+              </a:ext>
+            </a:extLst>
+          </a:blip>
+          <a:stretch>
+            <a:fillRect/>
+          </a:stretch>
+        </p:blipFill>
+        <p:spPr>
+          <a:xfrm>
+            <a:off x="2156736" y="3429000"/>
+            <a:ext cx="4566409" cy="3442929"/>
+          </a:xfrm>
+          <a:prstGeom prst="rect">
+            <a:avLst/>
+          </a:prstGeom>
+        </p:spPr>
+      </p:pic>
     </p:spTree>
     <p:extLst>
       <p:ext uri="{BB962C8B-B14F-4D97-AF65-F5344CB8AC3E}">
@@ -4778,7 +5251,7 @@
 </p:sld>
 </file>
 
-<file path=ppt/slides/slide12.xml><?xml version="1.0" encoding="utf-8"?>
+<file path=ppt/slides/slide13.xml><?xml version="1.0" encoding="utf-8"?>
 <p:sld xmlns:a="http://schemas.openxmlformats.org/drawingml/2006/main" xmlns:r="http://schemas.openxmlformats.org/officeDocument/2006/relationships" xmlns:p="http://schemas.openxmlformats.org/presentationml/2006/main">
   <p:cSld>
     <p:spTree>
@@ -8265,8 +8738,8 @@
             </p:nvSpPr>
             <p:spPr>
               <a:xfrm>
-                <a:off x="1749286" y="1616765"/>
-                <a:ext cx="5641011" cy="4247317"/>
+                <a:off x="1749287" y="1616765"/>
+                <a:ext cx="5049078" cy="3693319"/>
               </a:xfrm>
               <a:prstGeom prst="rect">
                 <a:avLst/>
@@ -8342,23 +8815,19 @@
                 </a14:m>
                 <a:r>
                   <a:rPr lang="it-IT" dirty="0"/>
-                  <a:t>del motore adoperato. Per fare ciò, sono stati presi i dati di velocità angolare in funzione dell’ingresso tramite Arduino, e salvati su file .</a:t>
+                  <a:t>del motore adoperato. Per fare ciò, sono stati presi i dati di velocità angolare in funzione dell’ingresso tramite Arduino, e salvati su file </a:t>
                 </a:r>
                 <a:r>
-                  <a:rPr lang="it-IT" dirty="0" err="1"/>
-                  <a:t>txt</a:t>
+                  <a:rPr lang="it-IT" u="sng" dirty="0"/>
+                  <a:t>.txt</a:t>
                 </a:r>
                 <a:r>
                   <a:rPr lang="it-IT" dirty="0"/>
                   <a:t>, sono stati elaborati su MATLAB tramite la funzione </a:t>
                 </a:r>
                 <a:r>
-                  <a:rPr lang="it-IT" b="1" dirty="0" err="1"/>
-                  <a:t>tfest</a:t>
-                </a:r>
-                <a:r>
                   <a:rPr lang="it-IT" b="1" dirty="0"/>
-                  <a:t>()</a:t>
+                  <a:t>tfest()</a:t>
                 </a:r>
                 <a:r>
                   <a:rPr lang="it-IT" dirty="0"/>
@@ -8366,17 +8835,12 @@
                 </a:r>
               </a:p>
               <a:p>
+                <a:endParaRPr lang="it-IT" dirty="0"/>
+              </a:p>
+              <a:p>
                 <a:r>
                   <a:rPr lang="it-IT" dirty="0"/>
-                  <a:t>Fissando il numero di poli e zeri della </a:t>
-                </a:r>
-                <a:r>
-                  <a:rPr lang="it-IT" dirty="0" err="1"/>
-                  <a:t>FdT</a:t>
-                </a:r>
-                <a:r>
-                  <a:rPr lang="it-IT" dirty="0"/>
-                  <a:t> da individuare (adesso noti dalla trattazione teorica), la funzione fornisce una stima dei parametri utilizzando i dati forniti appositamente preparati. Come visibile, il risulto è molto preciso, e confrontando la simulazione ottenuta con i dati raccolti sperimentalmente, è apprezzabile la bontà della stima.</a:t>
+                  <a:t>Fissando il numero di poli e zeri della FdT da individuare (adesso noti dalla trattazione teorica), la funzione fornisce una stima dei parametri utilizzando i dati forniti appositamente preparati.</a:t>
                 </a:r>
                 <a:endParaRPr lang="it-IT" b="1" dirty="0"/>
               </a:p>
@@ -8400,8 +8864,8 @@
             </p:nvSpPr>
             <p:spPr>
               <a:xfrm>
-                <a:off x="1749286" y="1616765"/>
-                <a:ext cx="5641011" cy="4247317"/>
+                <a:off x="1749287" y="1616765"/>
+                <a:ext cx="5049078" cy="3693319"/>
               </a:xfrm>
               <a:prstGeom prst="rect">
                 <a:avLst/>
@@ -8409,7 +8873,7 @@
               <a:blipFill>
                 <a:blip r:embed="rId3"/>
                 <a:stretch>
-                  <a:fillRect l="-973" t="-861" r="-2054" b="-1148"/>
+                  <a:fillRect l="-1087" t="-990" b="-1485"/>
                 </a:stretch>
               </a:blipFill>
             </p:spPr>
@@ -8428,76 +8892,6 @@
           </p:sp>
         </mc:Fallback>
       </mc:AlternateContent>
-      <p:sp>
-        <p:nvSpPr>
-          <p:cNvPr id="7" name="CasellaDiTesto 6">
-            <a:extLst>
-              <a:ext uri="{FF2B5EF4-FFF2-40B4-BE49-F238E27FC236}">
-                <a16:creationId xmlns:a16="http://schemas.microsoft.com/office/drawing/2014/main" id="{DF465FBE-89C7-46C7-B013-FF1C264F75DA}"/>
-              </a:ext>
-            </a:extLst>
-          </p:cNvPr>
-          <p:cNvSpPr txBox="1"/>
-          <p:nvPr/>
-        </p:nvSpPr>
-        <p:spPr>
-          <a:xfrm>
-            <a:off x="8035236" y="3896138"/>
-            <a:ext cx="2875722" cy="923330"/>
-          </a:xfrm>
-          <a:prstGeom prst="rect">
-            <a:avLst/>
-          </a:prstGeom>
-          <a:noFill/>
-        </p:spPr>
-        <p:txBody>
-          <a:bodyPr wrap="square" rtlCol="0">
-            <a:spAutoFit/>
-          </a:bodyPr>
-          <a:lstStyle/>
-          <a:p>
-            <a:r>
-              <a:rPr lang="it-IT" b="1" dirty="0"/>
-              <a:t>AGGIUNGERE IMMAGINE DELLA STIMA DELLA TFEST()</a:t>
-            </a:r>
-          </a:p>
-        </p:txBody>
-      </p:sp>
-      <p:sp>
-        <p:nvSpPr>
-          <p:cNvPr id="8" name="CasellaDiTesto 7">
-            <a:extLst>
-              <a:ext uri="{FF2B5EF4-FFF2-40B4-BE49-F238E27FC236}">
-                <a16:creationId xmlns:a16="http://schemas.microsoft.com/office/drawing/2014/main" id="{0B79B278-3CC3-4E50-A2A3-5DE2BD7007AD}"/>
-              </a:ext>
-            </a:extLst>
-          </p:cNvPr>
-          <p:cNvSpPr txBox="1"/>
-          <p:nvPr/>
-        </p:nvSpPr>
-        <p:spPr>
-          <a:xfrm>
-            <a:off x="7390298" y="5102087"/>
-            <a:ext cx="4165598" cy="1200329"/>
-          </a:xfrm>
-          <a:prstGeom prst="rect">
-            <a:avLst/>
-          </a:prstGeom>
-          <a:noFill/>
-        </p:spPr>
-        <p:txBody>
-          <a:bodyPr wrap="square" rtlCol="0">
-            <a:spAutoFit/>
-          </a:bodyPr>
-          <a:lstStyle/>
-          <a:p>
-            <a:r>
-              <a:rPr lang="it-IT" b="1" dirty="0"/>
-              <a:t>AGGIUNGERE IMMAGINE COMPORTAMENTO STIMA E MOTORE NEL CASO DI ACCELERAZIONE + FRENATA FORZATA</a:t>
-            </a:r>
-          </a:p>
-        </p:txBody>
-      </p:sp>
       <p:pic>
         <p:nvPicPr>
           <p:cNvPr id="10" name="Immagine 9" descr="Immagine che contiene oggetto, orologio&#10;&#10;Descrizione generata automaticamente">
@@ -8526,8 +8920,44 @@
         </p:blipFill>
         <p:spPr>
           <a:xfrm>
-            <a:off x="7390297" y="1969185"/>
-            <a:ext cx="4528892" cy="1130016"/>
+            <a:off x="6950155" y="1616764"/>
+            <a:ext cx="4969034" cy="1239837"/>
+          </a:xfrm>
+          <a:prstGeom prst="rect">
+            <a:avLst/>
+          </a:prstGeom>
+        </p:spPr>
+      </p:pic>
+      <p:pic>
+        <p:nvPicPr>
+          <p:cNvPr id="12" name="Immagine 11" descr="Immagine che contiene computer, sedendo, orologio&#10;&#10;Descrizione generata automaticamente">
+            <a:extLst>
+              <a:ext uri="{FF2B5EF4-FFF2-40B4-BE49-F238E27FC236}">
+                <a16:creationId xmlns:a16="http://schemas.microsoft.com/office/drawing/2014/main" id="{62256E85-F3CC-41A5-8719-F864A86F4493}"/>
+              </a:ext>
+            </a:extLst>
+          </p:cNvPr>
+          <p:cNvPicPr>
+            <a:picLocks noChangeAspect="1"/>
+          </p:cNvPicPr>
+          <p:nvPr/>
+        </p:nvPicPr>
+        <p:blipFill>
+          <a:blip r:embed="rId5">
+            <a:extLst>
+              <a:ext uri="{28A0092B-C50C-407E-A947-70E740481C1C}">
+                <a14:useLocalDpi xmlns:a14="http://schemas.microsoft.com/office/drawing/2010/main" val="0"/>
+              </a:ext>
+            </a:extLst>
+          </a:blip>
+          <a:stretch>
+            <a:fillRect/>
+          </a:stretch>
+        </p:blipFill>
+        <p:spPr>
+          <a:xfrm>
+            <a:off x="6950155" y="4001400"/>
+            <a:ext cx="4751515" cy="1091385"/>
           </a:xfrm>
           <a:prstGeom prst="rect">
             <a:avLst/>
@@ -8594,7 +9024,78 @@
             <a:pPr rtl="0"/>
             <a:r>
               <a:rPr lang="it-IT" dirty="0"/>
-              <a:t>… E confutarne la validità nella pratica</a:t>
+              <a:t>…verificarne la veridicità…</a:t>
+            </a:r>
+          </a:p>
+        </p:txBody>
+      </p:sp>
+      <p:pic>
+        <p:nvPicPr>
+          <p:cNvPr id="3" name="Immagine 2" descr="Immagine che contiene screenshot, microonde&#10;&#10;Descrizione generata automaticamente">
+            <a:extLst>
+              <a:ext uri="{FF2B5EF4-FFF2-40B4-BE49-F238E27FC236}">
+                <a16:creationId xmlns:a16="http://schemas.microsoft.com/office/drawing/2014/main" id="{125518C2-C8D1-4B05-BB5A-B98E39E99608}"/>
+              </a:ext>
+            </a:extLst>
+          </p:cNvPr>
+          <p:cNvPicPr>
+            <a:picLocks noChangeAspect="1"/>
+          </p:cNvPicPr>
+          <p:nvPr/>
+        </p:nvPicPr>
+        <p:blipFill>
+          <a:blip r:embed="rId3">
+            <a:extLst>
+              <a:ext uri="{28A0092B-C50C-407E-A947-70E740481C1C}">
+                <a14:useLocalDpi xmlns:a14="http://schemas.microsoft.com/office/drawing/2010/main" val="0"/>
+              </a:ext>
+            </a:extLst>
+          </a:blip>
+          <a:stretch>
+            <a:fillRect/>
+          </a:stretch>
+        </p:blipFill>
+        <p:spPr>
+          <a:xfrm>
+            <a:off x="5492907" y="1417638"/>
+            <a:ext cx="5886294" cy="5440362"/>
+          </a:xfrm>
+          <a:prstGeom prst="rect">
+            <a:avLst/>
+          </a:prstGeom>
+        </p:spPr>
+      </p:pic>
+      <p:sp>
+        <p:nvSpPr>
+          <p:cNvPr id="4" name="CasellaDiTesto 3">
+            <a:extLst>
+              <a:ext uri="{FF2B5EF4-FFF2-40B4-BE49-F238E27FC236}">
+                <a16:creationId xmlns:a16="http://schemas.microsoft.com/office/drawing/2014/main" id="{8497A958-111D-41C4-AED4-5EB27DA1D7E5}"/>
+              </a:ext>
+            </a:extLst>
+          </p:cNvPr>
+          <p:cNvSpPr txBox="1"/>
+          <p:nvPr/>
+        </p:nvSpPr>
+        <p:spPr>
+          <a:xfrm>
+            <a:off x="1593852" y="2001078"/>
+            <a:ext cx="3229939" cy="2031325"/>
+          </a:xfrm>
+          <a:prstGeom prst="rect">
+            <a:avLst/>
+          </a:prstGeom>
+          <a:noFill/>
+        </p:spPr>
+        <p:txBody>
+          <a:bodyPr wrap="square" rtlCol="0">
+            <a:spAutoFit/>
+          </a:bodyPr>
+          <a:lstStyle/>
+          <a:p>
+            <a:r>
+              <a:rPr lang="it-IT" dirty="0"/>
+              <a:t>Come visibile, il risulto è molto preciso, e confrontando la simulazione ottenuta con i dati raccolti sperimentalmente, è apprezzabile la bontà della stima.</a:t>
             </a:r>
           </a:p>
         </p:txBody>

</xml_diff>

<commit_message>
Dealing with H-Bridge topic.
</commit_message>
<xml_diff>
--- a/00_Relazione/Modello e identificazione di un motore DC/Modello e identificazione di un motore DC.pptx
+++ b/00_Relazione/Modello e identificazione di un motore DC/Modello e identificazione di un motore DC.pptx
@@ -5,7 +5,7 @@
     <p:sldMasterId id="2147483648" r:id="rId1"/>
   </p:sldMasterIdLst>
   <p:notesMasterIdLst>
-    <p:notesMasterId r:id="rId15"/>
+    <p:notesMasterId r:id="rId19"/>
   </p:notesMasterIdLst>
   <p:sldIdLst>
     <p:sldId id="269" r:id="rId2"/>
@@ -21,6 +21,10 @@
     <p:sldId id="278" r:id="rId12"/>
     <p:sldId id="279" r:id="rId13"/>
     <p:sldId id="280" r:id="rId14"/>
+    <p:sldId id="282" r:id="rId15"/>
+    <p:sldId id="284" r:id="rId16"/>
+    <p:sldId id="283" r:id="rId17"/>
+    <p:sldId id="285" r:id="rId18"/>
   </p:sldIdLst>
   <p:sldSz cx="12192000" cy="6858000"/>
   <p:notesSz cx="6858000" cy="9144000"/>
@@ -209,7 +213,7 @@
           <a:p>
             <a:fld id="{2D1A64A2-7D86-439A-A8BC-7FA7B1DBF38C}" type="datetimeFigureOut">
               <a:rPr lang="it-IT" smtClean="0"/>
-              <a:t>31/01/2020</a:t>
+              <a:t>01/02/2020</a:t>
             </a:fld>
             <a:endParaRPr lang="it-IT"/>
           </a:p>
@@ -911,6 +915,350 @@
 </p:notes>
 </file>
 
+<file path=ppt/notesSlides/notesSlide14.xml><?xml version="1.0" encoding="utf-8"?>
+<p:notes xmlns:a="http://schemas.openxmlformats.org/drawingml/2006/main" xmlns:r="http://schemas.openxmlformats.org/officeDocument/2006/relationships" xmlns:p="http://schemas.openxmlformats.org/presentationml/2006/main">
+  <p:cSld>
+    <p:spTree>
+      <p:nvGrpSpPr>
+        <p:cNvPr id="1" name=""/>
+        <p:cNvGrpSpPr/>
+        <p:nvPr/>
+      </p:nvGrpSpPr>
+      <p:grpSpPr>
+        <a:xfrm>
+          <a:off x="0" y="0"/>
+          <a:ext cx="0" cy="0"/>
+          <a:chOff x="0" y="0"/>
+          <a:chExt cx="0" cy="0"/>
+        </a:xfrm>
+      </p:grpSpPr>
+      <p:sp>
+        <p:nvSpPr>
+          <p:cNvPr id="2" name="Segnaposto immagine diapositiva 1"/>
+          <p:cNvSpPr>
+            <a:spLocks noGrp="1" noRot="1" noChangeAspect="1"/>
+          </p:cNvSpPr>
+          <p:nvPr>
+            <p:ph type="sldImg"/>
+          </p:nvPr>
+        </p:nvSpPr>
+        <p:spPr/>
+      </p:sp>
+      <p:sp>
+        <p:nvSpPr>
+          <p:cNvPr id="3" name="Segnaposto note 2"/>
+          <p:cNvSpPr>
+            <a:spLocks noGrp="1"/>
+          </p:cNvSpPr>
+          <p:nvPr>
+            <p:ph type="body" idx="1"/>
+          </p:nvPr>
+        </p:nvSpPr>
+        <p:spPr/>
+        <p:txBody>
+          <a:bodyPr/>
+          <a:lstStyle/>
+          <a:p>
+            <a:endParaRPr lang="it-IT"/>
+          </a:p>
+        </p:txBody>
+      </p:sp>
+      <p:sp>
+        <p:nvSpPr>
+          <p:cNvPr id="4" name="Segnaposto numero diapositiva 3"/>
+          <p:cNvSpPr>
+            <a:spLocks noGrp="1"/>
+          </p:cNvSpPr>
+          <p:nvPr>
+            <p:ph type="sldNum" sz="quarter" idx="10"/>
+          </p:nvPr>
+        </p:nvSpPr>
+        <p:spPr/>
+        <p:txBody>
+          <a:bodyPr/>
+          <a:lstStyle/>
+          <a:p>
+            <a:pPr rtl="0"/>
+            <a:fld id="{841221E5-7225-48EB-A4EE-420E7BFCF705}" type="slidenum">
+              <a:rPr lang="it-IT" smtClean="0"/>
+              <a:pPr rtl="0"/>
+              <a:t>14</a:t>
+            </a:fld>
+            <a:endParaRPr lang="it-IT" dirty="0"/>
+          </a:p>
+        </p:txBody>
+      </p:sp>
+    </p:spTree>
+    <p:extLst>
+      <p:ext uri="{BB962C8B-B14F-4D97-AF65-F5344CB8AC3E}">
+        <p14:creationId xmlns:p14="http://schemas.microsoft.com/office/powerpoint/2010/main" val="1399943643"/>
+      </p:ext>
+    </p:extLst>
+  </p:cSld>
+  <p:clrMapOvr>
+    <a:masterClrMapping/>
+  </p:clrMapOvr>
+</p:notes>
+</file>
+
+<file path=ppt/notesSlides/notesSlide15.xml><?xml version="1.0" encoding="utf-8"?>
+<p:notes xmlns:a="http://schemas.openxmlformats.org/drawingml/2006/main" xmlns:r="http://schemas.openxmlformats.org/officeDocument/2006/relationships" xmlns:p="http://schemas.openxmlformats.org/presentationml/2006/main">
+  <p:cSld>
+    <p:spTree>
+      <p:nvGrpSpPr>
+        <p:cNvPr id="1" name=""/>
+        <p:cNvGrpSpPr/>
+        <p:nvPr/>
+      </p:nvGrpSpPr>
+      <p:grpSpPr>
+        <a:xfrm>
+          <a:off x="0" y="0"/>
+          <a:ext cx="0" cy="0"/>
+          <a:chOff x="0" y="0"/>
+          <a:chExt cx="0" cy="0"/>
+        </a:xfrm>
+      </p:grpSpPr>
+      <p:sp>
+        <p:nvSpPr>
+          <p:cNvPr id="2" name="Segnaposto immagine diapositiva 1"/>
+          <p:cNvSpPr>
+            <a:spLocks noGrp="1" noRot="1" noChangeAspect="1"/>
+          </p:cNvSpPr>
+          <p:nvPr>
+            <p:ph type="sldImg"/>
+          </p:nvPr>
+        </p:nvSpPr>
+        <p:spPr/>
+      </p:sp>
+      <p:sp>
+        <p:nvSpPr>
+          <p:cNvPr id="3" name="Segnaposto note 2"/>
+          <p:cNvSpPr>
+            <a:spLocks noGrp="1"/>
+          </p:cNvSpPr>
+          <p:nvPr>
+            <p:ph type="body" idx="1"/>
+          </p:nvPr>
+        </p:nvSpPr>
+        <p:spPr/>
+        <p:txBody>
+          <a:bodyPr/>
+          <a:lstStyle/>
+          <a:p>
+            <a:endParaRPr lang="it-IT"/>
+          </a:p>
+        </p:txBody>
+      </p:sp>
+      <p:sp>
+        <p:nvSpPr>
+          <p:cNvPr id="4" name="Segnaposto numero diapositiva 3"/>
+          <p:cNvSpPr>
+            <a:spLocks noGrp="1"/>
+          </p:cNvSpPr>
+          <p:nvPr>
+            <p:ph type="sldNum" sz="quarter" idx="10"/>
+          </p:nvPr>
+        </p:nvSpPr>
+        <p:spPr/>
+        <p:txBody>
+          <a:bodyPr/>
+          <a:lstStyle/>
+          <a:p>
+            <a:pPr rtl="0"/>
+            <a:fld id="{841221E5-7225-48EB-A4EE-420E7BFCF705}" type="slidenum">
+              <a:rPr lang="it-IT" smtClean="0"/>
+              <a:pPr rtl="0"/>
+              <a:t>15</a:t>
+            </a:fld>
+            <a:endParaRPr lang="it-IT" dirty="0"/>
+          </a:p>
+        </p:txBody>
+      </p:sp>
+    </p:spTree>
+    <p:extLst>
+      <p:ext uri="{BB962C8B-B14F-4D97-AF65-F5344CB8AC3E}">
+        <p14:creationId xmlns:p14="http://schemas.microsoft.com/office/powerpoint/2010/main" val="828706630"/>
+      </p:ext>
+    </p:extLst>
+  </p:cSld>
+  <p:clrMapOvr>
+    <a:masterClrMapping/>
+  </p:clrMapOvr>
+</p:notes>
+</file>
+
+<file path=ppt/notesSlides/notesSlide16.xml><?xml version="1.0" encoding="utf-8"?>
+<p:notes xmlns:a="http://schemas.openxmlformats.org/drawingml/2006/main" xmlns:r="http://schemas.openxmlformats.org/officeDocument/2006/relationships" xmlns:p="http://schemas.openxmlformats.org/presentationml/2006/main">
+  <p:cSld>
+    <p:spTree>
+      <p:nvGrpSpPr>
+        <p:cNvPr id="1" name=""/>
+        <p:cNvGrpSpPr/>
+        <p:nvPr/>
+      </p:nvGrpSpPr>
+      <p:grpSpPr>
+        <a:xfrm>
+          <a:off x="0" y="0"/>
+          <a:ext cx="0" cy="0"/>
+          <a:chOff x="0" y="0"/>
+          <a:chExt cx="0" cy="0"/>
+        </a:xfrm>
+      </p:grpSpPr>
+      <p:sp>
+        <p:nvSpPr>
+          <p:cNvPr id="2" name="Segnaposto immagine diapositiva 1"/>
+          <p:cNvSpPr>
+            <a:spLocks noGrp="1" noRot="1" noChangeAspect="1"/>
+          </p:cNvSpPr>
+          <p:nvPr>
+            <p:ph type="sldImg"/>
+          </p:nvPr>
+        </p:nvSpPr>
+        <p:spPr/>
+      </p:sp>
+      <p:sp>
+        <p:nvSpPr>
+          <p:cNvPr id="3" name="Segnaposto note 2"/>
+          <p:cNvSpPr>
+            <a:spLocks noGrp="1"/>
+          </p:cNvSpPr>
+          <p:nvPr>
+            <p:ph type="body" idx="1"/>
+          </p:nvPr>
+        </p:nvSpPr>
+        <p:spPr/>
+        <p:txBody>
+          <a:bodyPr/>
+          <a:lstStyle/>
+          <a:p>
+            <a:endParaRPr lang="it-IT"/>
+          </a:p>
+        </p:txBody>
+      </p:sp>
+      <p:sp>
+        <p:nvSpPr>
+          <p:cNvPr id="4" name="Segnaposto numero diapositiva 3"/>
+          <p:cNvSpPr>
+            <a:spLocks noGrp="1"/>
+          </p:cNvSpPr>
+          <p:nvPr>
+            <p:ph type="sldNum" sz="quarter" idx="10"/>
+          </p:nvPr>
+        </p:nvSpPr>
+        <p:spPr/>
+        <p:txBody>
+          <a:bodyPr/>
+          <a:lstStyle/>
+          <a:p>
+            <a:pPr rtl="0"/>
+            <a:fld id="{841221E5-7225-48EB-A4EE-420E7BFCF705}" type="slidenum">
+              <a:rPr lang="it-IT" smtClean="0"/>
+              <a:pPr rtl="0"/>
+              <a:t>16</a:t>
+            </a:fld>
+            <a:endParaRPr lang="it-IT" dirty="0"/>
+          </a:p>
+        </p:txBody>
+      </p:sp>
+    </p:spTree>
+    <p:extLst>
+      <p:ext uri="{BB962C8B-B14F-4D97-AF65-F5344CB8AC3E}">
+        <p14:creationId xmlns:p14="http://schemas.microsoft.com/office/powerpoint/2010/main" val="2136210415"/>
+      </p:ext>
+    </p:extLst>
+  </p:cSld>
+  <p:clrMapOvr>
+    <a:masterClrMapping/>
+  </p:clrMapOvr>
+</p:notes>
+</file>
+
+<file path=ppt/notesSlides/notesSlide17.xml><?xml version="1.0" encoding="utf-8"?>
+<p:notes xmlns:a="http://schemas.openxmlformats.org/drawingml/2006/main" xmlns:r="http://schemas.openxmlformats.org/officeDocument/2006/relationships" xmlns:p="http://schemas.openxmlformats.org/presentationml/2006/main">
+  <p:cSld>
+    <p:spTree>
+      <p:nvGrpSpPr>
+        <p:cNvPr id="1" name=""/>
+        <p:cNvGrpSpPr/>
+        <p:nvPr/>
+      </p:nvGrpSpPr>
+      <p:grpSpPr>
+        <a:xfrm>
+          <a:off x="0" y="0"/>
+          <a:ext cx="0" cy="0"/>
+          <a:chOff x="0" y="0"/>
+          <a:chExt cx="0" cy="0"/>
+        </a:xfrm>
+      </p:grpSpPr>
+      <p:sp>
+        <p:nvSpPr>
+          <p:cNvPr id="2" name="Segnaposto immagine diapositiva 1"/>
+          <p:cNvSpPr>
+            <a:spLocks noGrp="1" noRot="1" noChangeAspect="1"/>
+          </p:cNvSpPr>
+          <p:nvPr>
+            <p:ph type="sldImg"/>
+          </p:nvPr>
+        </p:nvSpPr>
+        <p:spPr/>
+      </p:sp>
+      <p:sp>
+        <p:nvSpPr>
+          <p:cNvPr id="3" name="Segnaposto note 2"/>
+          <p:cNvSpPr>
+            <a:spLocks noGrp="1"/>
+          </p:cNvSpPr>
+          <p:nvPr>
+            <p:ph type="body" idx="1"/>
+          </p:nvPr>
+        </p:nvSpPr>
+        <p:spPr/>
+        <p:txBody>
+          <a:bodyPr/>
+          <a:lstStyle/>
+          <a:p>
+            <a:endParaRPr lang="it-IT"/>
+          </a:p>
+        </p:txBody>
+      </p:sp>
+      <p:sp>
+        <p:nvSpPr>
+          <p:cNvPr id="4" name="Segnaposto numero diapositiva 3"/>
+          <p:cNvSpPr>
+            <a:spLocks noGrp="1"/>
+          </p:cNvSpPr>
+          <p:nvPr>
+            <p:ph type="sldNum" sz="quarter" idx="10"/>
+          </p:nvPr>
+        </p:nvSpPr>
+        <p:spPr/>
+        <p:txBody>
+          <a:bodyPr/>
+          <a:lstStyle/>
+          <a:p>
+            <a:pPr rtl="0"/>
+            <a:fld id="{841221E5-7225-48EB-A4EE-420E7BFCF705}" type="slidenum">
+              <a:rPr lang="it-IT" smtClean="0"/>
+              <a:pPr rtl="0"/>
+              <a:t>17</a:t>
+            </a:fld>
+            <a:endParaRPr lang="it-IT" dirty="0"/>
+          </a:p>
+        </p:txBody>
+      </p:sp>
+    </p:spTree>
+    <p:extLst>
+      <p:ext uri="{BB962C8B-B14F-4D97-AF65-F5344CB8AC3E}">
+        <p14:creationId xmlns:p14="http://schemas.microsoft.com/office/powerpoint/2010/main" val="2042151364"/>
+      </p:ext>
+    </p:extLst>
+  </p:cSld>
+  <p:clrMapOvr>
+    <a:masterClrMapping/>
+  </p:clrMapOvr>
+</p:notes>
+</file>
+
 <file path=ppt/notesSlides/notesSlide2.xml><?xml version="1.0" encoding="utf-8"?>
 <p:notes xmlns:a="http://schemas.openxmlformats.org/drawingml/2006/main" xmlns:r="http://schemas.openxmlformats.org/officeDocument/2006/relationships" xmlns:p="http://schemas.openxmlformats.org/presentationml/2006/main">
   <p:cSld>
@@ -1692,7 +2040,7 @@
             <a:fld id="{DA63B92F-6927-4909-8675-8FB028AE3CD8}" type="datetime1">
               <a:rPr lang="it-IT" smtClean="0"/>
               <a:pPr/>
-              <a:t>31/01/2020</a:t>
+              <a:t>01/02/2020</a:t>
             </a:fld>
             <a:endParaRPr lang="it-IT" dirty="0"/>
           </a:p>
@@ -2151,7 +2499,7 @@
             <a:fld id="{E89D5404-FB42-4B9E-BE7A-7821366B0BBC}" type="datetime1">
               <a:rPr lang="it-IT" smtClean="0"/>
               <a:pPr/>
-              <a:t>31/01/2020</a:t>
+              <a:t>01/02/2020</a:t>
             </a:fld>
             <a:endParaRPr lang="it-IT" dirty="0"/>
           </a:p>
@@ -3148,7 +3496,7 @@
             <a:fld id="{982DBDC9-B003-41F0-B8B2-2F0AA2C1B651}" type="datetime1">
               <a:rPr lang="it-IT" smtClean="0"/>
               <a:pPr/>
-              <a:t>31/01/2020</a:t>
+              <a:t>01/02/2020</a:t>
             </a:fld>
             <a:endParaRPr lang="it-IT" dirty="0"/>
           </a:p>
@@ -3379,7 +3727,7 @@
             <a:fld id="{07EF584B-7CE1-48A1-AB7A-1EEAB5F615CD}" type="datetime1">
               <a:rPr lang="it-IT" smtClean="0"/>
               <a:pPr/>
-              <a:t>31/01/2020</a:t>
+              <a:t>01/02/2020</a:t>
             </a:fld>
             <a:endParaRPr lang="it-IT" dirty="0"/>
           </a:p>
@@ -4230,7 +4578,7 @@
             <a:fld id="{62DE71F0-C68A-46D7-94E0-C7A236B6AC63}" type="datetime1">
               <a:rPr lang="it-IT" smtClean="0"/>
               <a:pPr/>
-              <a:t>31/01/2020</a:t>
+              <a:t>01/02/2020</a:t>
             </a:fld>
             <a:endParaRPr lang="it-IT" dirty="0"/>
           </a:p>
@@ -5286,7 +5634,248 @@
             <a:pPr rtl="0"/>
             <a:r>
               <a:rPr lang="it-IT" dirty="0"/>
-              <a:t>Aggiungere un titolo di diapositiva - 3</a:t>
+              <a:t>Funzionamento Ponte-H</a:t>
+            </a:r>
+          </a:p>
+        </p:txBody>
+      </p:sp>
+      <p:sp>
+        <p:nvSpPr>
+          <p:cNvPr id="3" name="CasellaDiTesto 2">
+            <a:extLst>
+              <a:ext uri="{FF2B5EF4-FFF2-40B4-BE49-F238E27FC236}">
+                <a16:creationId xmlns:a16="http://schemas.microsoft.com/office/drawing/2014/main" id="{8CFE6072-C7E9-42CD-BBDC-28F56725D52F}"/>
+              </a:ext>
+            </a:extLst>
+          </p:cNvPr>
+          <p:cNvSpPr txBox="1"/>
+          <p:nvPr/>
+        </p:nvSpPr>
+        <p:spPr>
+          <a:xfrm>
+            <a:off x="1593852" y="1417638"/>
+            <a:ext cx="4790247" cy="3139321"/>
+          </a:xfrm>
+          <a:prstGeom prst="rect">
+            <a:avLst/>
+          </a:prstGeom>
+          <a:noFill/>
+        </p:spPr>
+        <p:txBody>
+          <a:bodyPr wrap="square" rtlCol="0">
+            <a:spAutoFit/>
+          </a:bodyPr>
+          <a:lstStyle/>
+          <a:p>
+            <a:r>
+              <a:rPr lang="it-IT" dirty="0"/>
+              <a:t>Grazie agli ingressi di controllo, possono verificarsi le tre situazioni in figura:</a:t>
+            </a:r>
+          </a:p>
+          <a:p>
+            <a:pPr marL="342900" indent="-342900">
+              <a:buFont typeface="+mj-lt"/>
+              <a:buAutoNum type="alphaLcParenR"/>
+            </a:pPr>
+            <a:r>
+              <a:rPr lang="it-IT" dirty="0"/>
+              <a:t>Entrambi gli ingressi hanno l’</a:t>
+            </a:r>
+            <a:r>
+              <a:rPr lang="it-IT" b="1" dirty="0"/>
+              <a:t>enabler</a:t>
+            </a:r>
+            <a:r>
+              <a:rPr lang="it-IT" dirty="0"/>
+              <a:t> a </a:t>
+            </a:r>
+            <a:r>
+              <a:rPr lang="it-IT" b="1" dirty="0"/>
+              <a:t>zero</a:t>
+            </a:r>
+            <a:r>
+              <a:rPr lang="it-IT" dirty="0"/>
+              <a:t>, per cui il motore si trova in </a:t>
+            </a:r>
+            <a:r>
+              <a:rPr lang="it-IT" u="sng" dirty="0"/>
+              <a:t>libera evoluzione meccanica</a:t>
+            </a:r>
+            <a:r>
+              <a:rPr lang="it-IT" dirty="0"/>
+              <a:t>.</a:t>
+            </a:r>
+          </a:p>
+          <a:p>
+            <a:pPr marL="342900" indent="-342900">
+              <a:buFont typeface="+mj-lt"/>
+              <a:buAutoNum type="alphaLcParenR"/>
+            </a:pPr>
+            <a:r>
+              <a:rPr lang="it-IT" dirty="0"/>
+              <a:t>L’ingresso A si trova a una tensione sufficiente a chiudere il transistor PNP, mentre per il B è tale da chiudere NPN.</a:t>
+            </a:r>
+          </a:p>
+          <a:p>
+            <a:pPr marL="342900" indent="-342900">
+              <a:buFont typeface="+mj-lt"/>
+              <a:buAutoNum type="alphaLcParenR"/>
+            </a:pPr>
+            <a:r>
+              <a:rPr lang="it-IT" dirty="0"/>
+              <a:t>L’ingresso A ha una tensione maggiore e chiude NPN, mentre per il B diminuisce la tensione e chiude PNP.</a:t>
+            </a:r>
+          </a:p>
+        </p:txBody>
+      </p:sp>
+      <p:pic>
+        <p:nvPicPr>
+          <p:cNvPr id="5" name="Immagine 4" descr="Immagine che contiene stella, orologio&#10;&#10;Descrizione generata automaticamente">
+            <a:extLst>
+              <a:ext uri="{FF2B5EF4-FFF2-40B4-BE49-F238E27FC236}">
+                <a16:creationId xmlns:a16="http://schemas.microsoft.com/office/drawing/2014/main" id="{D71A48FD-33E4-495C-9C07-630CFD7164E5}"/>
+              </a:ext>
+            </a:extLst>
+          </p:cNvPr>
+          <p:cNvPicPr>
+            <a:picLocks noChangeAspect="1"/>
+          </p:cNvPicPr>
+          <p:nvPr/>
+        </p:nvPicPr>
+        <p:blipFill>
+          <a:blip r:embed="rId3">
+            <a:extLst>
+              <a:ext uri="{28A0092B-C50C-407E-A947-70E740481C1C}">
+                <a14:useLocalDpi xmlns:a14="http://schemas.microsoft.com/office/drawing/2010/main" val="0"/>
+              </a:ext>
+            </a:extLst>
+          </a:blip>
+          <a:stretch>
+            <a:fillRect/>
+          </a:stretch>
+        </p:blipFill>
+        <p:spPr>
+          <a:xfrm>
+            <a:off x="6486525" y="1417638"/>
+            <a:ext cx="5229560" cy="2836310"/>
+          </a:xfrm>
+          <a:prstGeom prst="rect">
+            <a:avLst/>
+          </a:prstGeom>
+        </p:spPr>
+      </p:pic>
+      <p:sp>
+        <p:nvSpPr>
+          <p:cNvPr id="6" name="CasellaDiTesto 5">
+            <a:extLst>
+              <a:ext uri="{FF2B5EF4-FFF2-40B4-BE49-F238E27FC236}">
+                <a16:creationId xmlns:a16="http://schemas.microsoft.com/office/drawing/2014/main" id="{156A5FAD-CD88-424F-8900-4D27F99028B6}"/>
+              </a:ext>
+            </a:extLst>
+          </p:cNvPr>
+          <p:cNvSpPr txBox="1"/>
+          <p:nvPr/>
+        </p:nvSpPr>
+        <p:spPr>
+          <a:xfrm>
+            <a:off x="1593852" y="4556959"/>
+            <a:ext cx="9785349" cy="1200329"/>
+          </a:xfrm>
+          <a:prstGeom prst="rect">
+            <a:avLst/>
+          </a:prstGeom>
+          <a:noFill/>
+        </p:spPr>
+        <p:txBody>
+          <a:bodyPr wrap="square" rtlCol="0">
+            <a:spAutoFit/>
+          </a:bodyPr>
+          <a:lstStyle/>
+          <a:p>
+            <a:r>
+              <a:rPr lang="it-IT" b="1" dirty="0"/>
+              <a:t>Vantaggi del Ponte-H?</a:t>
+            </a:r>
+          </a:p>
+          <a:p>
+            <a:pPr marL="285750" indent="-285750">
+              <a:buFont typeface="Arial" panose="020B0604020202020204" pitchFamily="34" charset="0"/>
+              <a:buChar char="•"/>
+            </a:pPr>
+            <a:r>
+              <a:rPr lang="it-IT" dirty="0"/>
+              <a:t>Semplicità di utilizzo e basso costo</a:t>
+            </a:r>
+          </a:p>
+          <a:p>
+            <a:pPr marL="285750" indent="-285750">
+              <a:buFont typeface="Arial" panose="020B0604020202020204" pitchFamily="34" charset="0"/>
+              <a:buChar char="•"/>
+            </a:pPr>
+            <a:r>
+              <a:rPr lang="it-IT" dirty="0"/>
+              <a:t>L’uso dell’</a:t>
+            </a:r>
+            <a:r>
+              <a:rPr lang="it-IT" b="1" dirty="0"/>
+              <a:t>enabler</a:t>
+            </a:r>
+            <a:r>
+              <a:rPr lang="it-IT" dirty="0"/>
+              <a:t> permette di ridurre il consumo di energia ed allungare la vita dei componenti, non scorrendo corrente.</a:t>
+            </a:r>
+          </a:p>
+        </p:txBody>
+      </p:sp>
+      <p:sp>
+        <p:nvSpPr>
+          <p:cNvPr id="7" name="CasellaDiTesto 6">
+            <a:extLst>
+              <a:ext uri="{FF2B5EF4-FFF2-40B4-BE49-F238E27FC236}">
+                <a16:creationId xmlns:a16="http://schemas.microsoft.com/office/drawing/2014/main" id="{653EF75F-00FF-44FC-BD06-DDF49DFE9875}"/>
+              </a:ext>
+            </a:extLst>
+          </p:cNvPr>
+          <p:cNvSpPr txBox="1"/>
+          <p:nvPr/>
+        </p:nvSpPr>
+        <p:spPr>
+          <a:xfrm>
+            <a:off x="1593852" y="5796796"/>
+            <a:ext cx="9785349" cy="646331"/>
+          </a:xfrm>
+          <a:prstGeom prst="rect">
+            <a:avLst/>
+          </a:prstGeom>
+          <a:noFill/>
+        </p:spPr>
+        <p:txBody>
+          <a:bodyPr wrap="square" rtlCol="0">
+            <a:spAutoFit/>
+          </a:bodyPr>
+          <a:lstStyle/>
+          <a:p>
+            <a:r>
+              <a:rPr lang="it-IT" b="1" dirty="0"/>
+              <a:t>Svantaggi del Ponte-H?</a:t>
+            </a:r>
+          </a:p>
+          <a:p>
+            <a:pPr marL="285750" indent="-285750">
+              <a:buFont typeface="Arial" panose="020B0604020202020204" pitchFamily="34" charset="0"/>
+              <a:buChar char="•"/>
+            </a:pPr>
+            <a:r>
+              <a:rPr lang="it-IT" dirty="0"/>
+              <a:t>Per il controllo, proprio l’</a:t>
+            </a:r>
+            <a:r>
+              <a:rPr lang="it-IT" b="1" dirty="0"/>
+              <a:t>enabler</a:t>
+            </a:r>
+            <a:r>
+              <a:rPr lang="it-IT" dirty="0"/>
+              <a:t>!</a:t>
             </a:r>
           </a:p>
         </p:txBody>
@@ -5295,6 +5884,769 @@
     <p:extLst>
       <p:ext uri="{BB962C8B-B14F-4D97-AF65-F5344CB8AC3E}">
         <p14:creationId xmlns:p14="http://schemas.microsoft.com/office/powerpoint/2010/main" val="94855224"/>
+      </p:ext>
+    </p:extLst>
+  </p:cSld>
+  <p:clrMapOvr>
+    <a:masterClrMapping/>
+  </p:clrMapOvr>
+  <mc:AlternateContent xmlns:mc="http://schemas.openxmlformats.org/markup-compatibility/2006" xmlns:p14="http://schemas.microsoft.com/office/powerpoint/2010/main">
+    <mc:Choice Requires="p14">
+      <p:transition spd="med" p14:dur="700">
+        <p:fade/>
+      </p:transition>
+    </mc:Choice>
+    <mc:Fallback xmlns="">
+      <p:transition spd="med">
+        <p:fade/>
+      </p:transition>
+    </mc:Fallback>
+  </mc:AlternateContent>
+</p:sld>
+</file>
+
+<file path=ppt/slides/slide14.xml><?xml version="1.0" encoding="utf-8"?>
+<p:sld xmlns:a="http://schemas.openxmlformats.org/drawingml/2006/main" xmlns:r="http://schemas.openxmlformats.org/officeDocument/2006/relationships" xmlns:p="http://schemas.openxmlformats.org/presentationml/2006/main">
+  <p:cSld>
+    <p:spTree>
+      <p:nvGrpSpPr>
+        <p:cNvPr id="1" name=""/>
+        <p:cNvGrpSpPr/>
+        <p:nvPr/>
+      </p:nvGrpSpPr>
+      <p:grpSpPr>
+        <a:xfrm>
+          <a:off x="0" y="0"/>
+          <a:ext cx="0" cy="0"/>
+          <a:chOff x="0" y="0"/>
+          <a:chExt cx="0" cy="0"/>
+        </a:xfrm>
+      </p:grpSpPr>
+      <p:sp>
+        <p:nvSpPr>
+          <p:cNvPr id="2" name="Titolo 1"/>
+          <p:cNvSpPr>
+            <a:spLocks noGrp="1"/>
+          </p:cNvSpPr>
+          <p:nvPr>
+            <p:ph type="title"/>
+          </p:nvPr>
+        </p:nvSpPr>
+        <p:spPr/>
+        <p:txBody>
+          <a:bodyPr rtlCol="0"/>
+          <a:lstStyle/>
+          <a:p>
+            <a:pPr rtl="0"/>
+            <a:r>
+              <a:rPr lang="it-IT" dirty="0"/>
+              <a:t>Funzionamento Ponte-H</a:t>
+            </a:r>
+          </a:p>
+        </p:txBody>
+      </p:sp>
+      <p:sp>
+        <p:nvSpPr>
+          <p:cNvPr id="3" name="CasellaDiTesto 2">
+            <a:extLst>
+              <a:ext uri="{FF2B5EF4-FFF2-40B4-BE49-F238E27FC236}">
+                <a16:creationId xmlns:a16="http://schemas.microsoft.com/office/drawing/2014/main" id="{5FDCBA2A-3307-47A1-B698-A7AF2940FFB7}"/>
+              </a:ext>
+            </a:extLst>
+          </p:cNvPr>
+          <p:cNvSpPr txBox="1"/>
+          <p:nvPr/>
+        </p:nvSpPr>
+        <p:spPr>
+          <a:xfrm>
+            <a:off x="1696278" y="1417638"/>
+            <a:ext cx="5162746" cy="3416320"/>
+          </a:xfrm>
+          <a:prstGeom prst="rect">
+            <a:avLst/>
+          </a:prstGeom>
+          <a:noFill/>
+        </p:spPr>
+        <p:txBody>
+          <a:bodyPr wrap="square" rtlCol="0">
+            <a:spAutoFit/>
+          </a:bodyPr>
+          <a:lstStyle/>
+          <a:p>
+            <a:r>
+              <a:rPr lang="it-IT" dirty="0"/>
+              <a:t>Il motore ha un comportamento lineare finché rimane nella situazione evidenziata in figura (a), ovvero il circuito elettrico rimane </a:t>
+            </a:r>
+            <a:r>
+              <a:rPr lang="it-IT" b="1" dirty="0"/>
+              <a:t>chiuso</a:t>
+            </a:r>
+            <a:r>
+              <a:rPr lang="it-IT" dirty="0"/>
+              <a:t>, e al massimo il generatore di corrente ha una </a:t>
+            </a:r>
+            <a:r>
+              <a:rPr lang="it-IT" b="1" dirty="0"/>
+              <a:t>forza elettromotrice nulla</a:t>
+            </a:r>
+            <a:r>
+              <a:rPr lang="it-IT" dirty="0"/>
+              <a:t>.</a:t>
+            </a:r>
+          </a:p>
+          <a:p>
+            <a:r>
+              <a:rPr lang="it-IT" dirty="0"/>
+              <a:t>In questa situazione (b), il motore diventa un generatore cinetico di </a:t>
+            </a:r>
+            <a:r>
+              <a:rPr lang="it-IT" b="1" dirty="0" err="1"/>
+              <a:t>ddp</a:t>
+            </a:r>
+            <a:r>
+              <a:rPr lang="it-IT" dirty="0"/>
+              <a:t> ed esaurisce la sua velocità </a:t>
+            </a:r>
+            <a:r>
+              <a:rPr lang="it-IT" b="1" u="sng" dirty="0"/>
+              <a:t>quasi</a:t>
+            </a:r>
+            <a:r>
+              <a:rPr lang="it-IT" dirty="0"/>
+              <a:t> soltanto grazie alla corrente che rientra nel motore stesso.</a:t>
+            </a:r>
+          </a:p>
+          <a:p>
+            <a:r>
+              <a:rPr lang="it-IT" dirty="0"/>
+              <a:t>Questa situazione si verifica nel caso di una </a:t>
+            </a:r>
+            <a:r>
+              <a:rPr lang="it-IT" u="sng" dirty="0"/>
+              <a:t>frenata forzata</a:t>
+            </a:r>
+            <a:r>
+              <a:rPr lang="it-IT" dirty="0"/>
+              <a:t>, ed è in accordo con quanto trovato nella stima del modello teorico.</a:t>
+            </a:r>
+          </a:p>
+        </p:txBody>
+      </p:sp>
+      <p:pic>
+        <p:nvPicPr>
+          <p:cNvPr id="7" name="Immagine 6" descr="Immagine che contiene orologio&#10;&#10;Descrizione generata automaticamente">
+            <a:extLst>
+              <a:ext uri="{FF2B5EF4-FFF2-40B4-BE49-F238E27FC236}">
+                <a16:creationId xmlns:a16="http://schemas.microsoft.com/office/drawing/2014/main" id="{310BE63E-2483-4A03-8F6A-BE7657D6392D}"/>
+              </a:ext>
+            </a:extLst>
+          </p:cNvPr>
+          <p:cNvPicPr>
+            <a:picLocks noChangeAspect="1"/>
+          </p:cNvPicPr>
+          <p:nvPr/>
+        </p:nvPicPr>
+        <p:blipFill>
+          <a:blip r:embed="rId3">
+            <a:extLst>
+              <a:ext uri="{28A0092B-C50C-407E-A947-70E740481C1C}">
+                <a14:useLocalDpi xmlns:a14="http://schemas.microsoft.com/office/drawing/2010/main" val="0"/>
+              </a:ext>
+            </a:extLst>
+          </a:blip>
+          <a:stretch>
+            <a:fillRect/>
+          </a:stretch>
+        </p:blipFill>
+        <p:spPr>
+          <a:xfrm>
+            <a:off x="7223619" y="177801"/>
+            <a:ext cx="4520177" cy="5664383"/>
+          </a:xfrm>
+          <a:prstGeom prst="rect">
+            <a:avLst/>
+          </a:prstGeom>
+        </p:spPr>
+      </p:pic>
+    </p:spTree>
+    <p:extLst>
+      <p:ext uri="{BB962C8B-B14F-4D97-AF65-F5344CB8AC3E}">
+        <p14:creationId xmlns:p14="http://schemas.microsoft.com/office/powerpoint/2010/main" val="2501830720"/>
+      </p:ext>
+    </p:extLst>
+  </p:cSld>
+  <p:clrMapOvr>
+    <a:masterClrMapping/>
+  </p:clrMapOvr>
+  <mc:AlternateContent xmlns:mc="http://schemas.openxmlformats.org/markup-compatibility/2006" xmlns:p14="http://schemas.microsoft.com/office/powerpoint/2010/main">
+    <mc:Choice Requires="p14">
+      <p:transition spd="med" p14:dur="700">
+        <p:fade/>
+      </p:transition>
+    </mc:Choice>
+    <mc:Fallback xmlns="">
+      <p:transition spd="med">
+        <p:fade/>
+      </p:transition>
+    </mc:Fallback>
+  </mc:AlternateContent>
+</p:sld>
+</file>
+
+<file path=ppt/slides/slide15.xml><?xml version="1.0" encoding="utf-8"?>
+<p:sld xmlns:a="http://schemas.openxmlformats.org/drawingml/2006/main" xmlns:r="http://schemas.openxmlformats.org/officeDocument/2006/relationships" xmlns:p="http://schemas.openxmlformats.org/presentationml/2006/main">
+  <p:cSld>
+    <p:spTree>
+      <p:nvGrpSpPr>
+        <p:cNvPr id="1" name=""/>
+        <p:cNvGrpSpPr/>
+        <p:nvPr/>
+      </p:nvGrpSpPr>
+      <p:grpSpPr>
+        <a:xfrm>
+          <a:off x="0" y="0"/>
+          <a:ext cx="0" cy="0"/>
+          <a:chOff x="0" y="0"/>
+          <a:chExt cx="0" cy="0"/>
+        </a:xfrm>
+      </p:grpSpPr>
+      <p:sp>
+        <p:nvSpPr>
+          <p:cNvPr id="2" name="Titolo 1"/>
+          <p:cNvSpPr>
+            <a:spLocks noGrp="1"/>
+          </p:cNvSpPr>
+          <p:nvPr>
+            <p:ph type="title"/>
+          </p:nvPr>
+        </p:nvSpPr>
+        <p:spPr/>
+        <p:txBody>
+          <a:bodyPr rtlCol="0"/>
+          <a:lstStyle/>
+          <a:p>
+            <a:pPr rtl="0"/>
+            <a:r>
+              <a:rPr lang="it-IT" dirty="0"/>
+              <a:t>Funzionamento Ponte-H</a:t>
+            </a:r>
+          </a:p>
+        </p:txBody>
+      </p:sp>
+      <p:sp>
+        <p:nvSpPr>
+          <p:cNvPr id="3" name="CasellaDiTesto 2">
+            <a:extLst>
+              <a:ext uri="{FF2B5EF4-FFF2-40B4-BE49-F238E27FC236}">
+                <a16:creationId xmlns:a16="http://schemas.microsoft.com/office/drawing/2014/main" id="{5FDCBA2A-3307-47A1-B698-A7AF2940FFB7}"/>
+              </a:ext>
+            </a:extLst>
+          </p:cNvPr>
+          <p:cNvSpPr txBox="1"/>
+          <p:nvPr/>
+        </p:nvSpPr>
+        <p:spPr>
+          <a:xfrm>
+            <a:off x="1593850" y="1417638"/>
+            <a:ext cx="5647281" cy="4247317"/>
+          </a:xfrm>
+          <a:prstGeom prst="rect">
+            <a:avLst/>
+          </a:prstGeom>
+          <a:noFill/>
+        </p:spPr>
+        <p:txBody>
+          <a:bodyPr wrap="square" rtlCol="0">
+            <a:spAutoFit/>
+          </a:bodyPr>
+          <a:lstStyle/>
+          <a:p>
+            <a:r>
+              <a:rPr lang="it-IT" b="1" dirty="0"/>
+              <a:t>NON</a:t>
+            </a:r>
+            <a:r>
+              <a:rPr lang="it-IT" dirty="0"/>
+              <a:t> si verifica la situazione precedentemente descritta a causa del controllo fatto in PWM con l’Arduino.</a:t>
+            </a:r>
+          </a:p>
+          <a:p>
+            <a:r>
+              <a:rPr lang="it-IT" dirty="0"/>
+              <a:t>Infatti, controllando la percentuale del </a:t>
+            </a:r>
+            <a:r>
+              <a:rPr lang="it-IT" u="sng" dirty="0"/>
+              <a:t>Duty Cycle</a:t>
+            </a:r>
+            <a:r>
+              <a:rPr lang="it-IT" dirty="0"/>
+              <a:t>, otterremmo un valore medio di tensione equivalente, dato il comportamento da filtro passa-basso del motore.</a:t>
+            </a:r>
+          </a:p>
+          <a:p>
+            <a:r>
+              <a:rPr lang="it-IT" dirty="0"/>
+              <a:t>Poiché il PWM è impostato sul pin </a:t>
+            </a:r>
+            <a:r>
+              <a:rPr lang="it-IT" b="1" dirty="0" err="1"/>
+              <a:t>Enable</a:t>
+            </a:r>
+            <a:r>
+              <a:rPr lang="it-IT" dirty="0"/>
+              <a:t> del L298N, il motore si ritrova nella situazione di una semplice massa posta in rotazione, che esaurisce la propria energia cinetica </a:t>
+            </a:r>
+            <a:r>
+              <a:rPr lang="it-IT" b="1" dirty="0"/>
+              <a:t>solo </a:t>
+            </a:r>
+            <a:r>
+              <a:rPr lang="it-IT" dirty="0"/>
+              <a:t>tramite </a:t>
+            </a:r>
+            <a:r>
+              <a:rPr lang="it-IT" b="1" dirty="0"/>
+              <a:t>attrito</a:t>
+            </a:r>
+            <a:r>
+              <a:rPr lang="it-IT" dirty="0"/>
+              <a:t>.</a:t>
+            </a:r>
+          </a:p>
+          <a:p>
+            <a:r>
+              <a:rPr lang="it-IT" dirty="0"/>
+              <a:t>Da ciò si comprende come mai la simulazione (in giallo) sia estremamente più rapida del comportamento reale (in blu), non tenendo conto di questo fenomeno </a:t>
+            </a:r>
+            <a:r>
+              <a:rPr lang="it-IT" u="sng" dirty="0"/>
+              <a:t>inevitabile</a:t>
+            </a:r>
+            <a:r>
+              <a:rPr lang="it-IT" dirty="0"/>
+              <a:t>.</a:t>
+            </a:r>
+          </a:p>
+        </p:txBody>
+      </p:sp>
+      <p:pic>
+        <p:nvPicPr>
+          <p:cNvPr id="5" name="Immagine 4" descr="Immagine che contiene testo&#10;&#10;Descrizione generata automaticamente">
+            <a:extLst>
+              <a:ext uri="{FF2B5EF4-FFF2-40B4-BE49-F238E27FC236}">
+                <a16:creationId xmlns:a16="http://schemas.microsoft.com/office/drawing/2014/main" id="{6E2AD8DF-8404-4AC5-A890-E2D0F1D49FC1}"/>
+              </a:ext>
+            </a:extLst>
+          </p:cNvPr>
+          <p:cNvPicPr>
+            <a:picLocks noChangeAspect="1"/>
+          </p:cNvPicPr>
+          <p:nvPr/>
+        </p:nvPicPr>
+        <p:blipFill>
+          <a:blip r:embed="rId3">
+            <a:extLst>
+              <a:ext uri="{28A0092B-C50C-407E-A947-70E740481C1C}">
+                <a14:useLocalDpi xmlns:a14="http://schemas.microsoft.com/office/drawing/2010/main" val="0"/>
+              </a:ext>
+            </a:extLst>
+          </a:blip>
+          <a:stretch>
+            <a:fillRect/>
+          </a:stretch>
+        </p:blipFill>
+        <p:spPr>
+          <a:xfrm>
+            <a:off x="7572436" y="797719"/>
+            <a:ext cx="4138070" cy="3310456"/>
+          </a:xfrm>
+          <a:prstGeom prst="rect">
+            <a:avLst/>
+          </a:prstGeom>
+        </p:spPr>
+      </p:pic>
+      <p:pic>
+        <p:nvPicPr>
+          <p:cNvPr id="10" name="Immagine 9" descr="Immagine che contiene screenshot, monitor, schermo&#10;&#10;Descrizione generata automaticamente">
+            <a:extLst>
+              <a:ext uri="{FF2B5EF4-FFF2-40B4-BE49-F238E27FC236}">
+                <a16:creationId xmlns:a16="http://schemas.microsoft.com/office/drawing/2014/main" id="{CEC8E07A-28DB-4017-A1BD-0DBFCBB9CBCF}"/>
+              </a:ext>
+            </a:extLst>
+          </p:cNvPr>
+          <p:cNvPicPr>
+            <a:picLocks noChangeAspect="1"/>
+          </p:cNvPicPr>
+          <p:nvPr/>
+        </p:nvPicPr>
+        <p:blipFill>
+          <a:blip r:embed="rId4">
+            <a:extLst>
+              <a:ext uri="{28A0092B-C50C-407E-A947-70E740481C1C}">
+                <a14:useLocalDpi xmlns:a14="http://schemas.microsoft.com/office/drawing/2010/main" val="0"/>
+              </a:ext>
+            </a:extLst>
+          </a:blip>
+          <a:stretch>
+            <a:fillRect/>
+          </a:stretch>
+        </p:blipFill>
+        <p:spPr>
+          <a:xfrm>
+            <a:off x="8434244" y="4108175"/>
+            <a:ext cx="2414454" cy="2704563"/>
+          </a:xfrm>
+          <a:prstGeom prst="rect">
+            <a:avLst/>
+          </a:prstGeom>
+        </p:spPr>
+      </p:pic>
+      <p:sp>
+        <p:nvSpPr>
+          <p:cNvPr id="11" name="CasellaDiTesto 10">
+            <a:extLst>
+              <a:ext uri="{FF2B5EF4-FFF2-40B4-BE49-F238E27FC236}">
+                <a16:creationId xmlns:a16="http://schemas.microsoft.com/office/drawing/2014/main" id="{2AB98A6A-7982-4CFB-BB1F-A1D4E602778A}"/>
+              </a:ext>
+            </a:extLst>
+          </p:cNvPr>
+          <p:cNvSpPr txBox="1"/>
+          <p:nvPr/>
+        </p:nvSpPr>
+        <p:spPr>
+          <a:xfrm>
+            <a:off x="1593850" y="5664955"/>
+            <a:ext cx="6794776" cy="369332"/>
+          </a:xfrm>
+          <a:prstGeom prst="rect">
+            <a:avLst/>
+          </a:prstGeom>
+          <a:noFill/>
+        </p:spPr>
+        <p:txBody>
+          <a:bodyPr wrap="square" rtlCol="0">
+            <a:spAutoFit/>
+          </a:bodyPr>
+          <a:lstStyle/>
+          <a:p>
+            <a:r>
+              <a:rPr lang="it-IT" b="1" dirty="0"/>
+              <a:t>Perché non ce ne accorgiamo in piena accelerazione da fermi?</a:t>
+            </a:r>
+          </a:p>
+        </p:txBody>
+      </p:sp>
+      <p:sp>
+        <p:nvSpPr>
+          <p:cNvPr id="12" name="CasellaDiTesto 11">
+            <a:extLst>
+              <a:ext uri="{FF2B5EF4-FFF2-40B4-BE49-F238E27FC236}">
+                <a16:creationId xmlns:a16="http://schemas.microsoft.com/office/drawing/2014/main" id="{E5B7ABB5-DDBB-40E5-9130-8BD2BC2E3D50}"/>
+              </a:ext>
+            </a:extLst>
+          </p:cNvPr>
+          <p:cNvSpPr txBox="1"/>
+          <p:nvPr/>
+        </p:nvSpPr>
+        <p:spPr>
+          <a:xfrm>
+            <a:off x="1593850" y="6034287"/>
+            <a:ext cx="6794776" cy="646331"/>
+          </a:xfrm>
+          <a:prstGeom prst="rect">
+            <a:avLst/>
+          </a:prstGeom>
+          <a:noFill/>
+        </p:spPr>
+        <p:txBody>
+          <a:bodyPr wrap="square" rtlCol="0">
+            <a:spAutoFit/>
+          </a:bodyPr>
+          <a:lstStyle/>
+          <a:p>
+            <a:r>
+              <a:rPr lang="it-IT" dirty="0"/>
+              <a:t>Perché in quel caso passiamo da 0 a 5 Volt senza mai avere un effettivo Duty Cycle!</a:t>
+            </a:r>
+          </a:p>
+        </p:txBody>
+      </p:sp>
+    </p:spTree>
+    <p:extLst>
+      <p:ext uri="{BB962C8B-B14F-4D97-AF65-F5344CB8AC3E}">
+        <p14:creationId xmlns:p14="http://schemas.microsoft.com/office/powerpoint/2010/main" val="3444663663"/>
+      </p:ext>
+    </p:extLst>
+  </p:cSld>
+  <p:clrMapOvr>
+    <a:masterClrMapping/>
+  </p:clrMapOvr>
+  <mc:AlternateContent xmlns:mc="http://schemas.openxmlformats.org/markup-compatibility/2006" xmlns:p14="http://schemas.microsoft.com/office/powerpoint/2010/main">
+    <mc:Choice Requires="p14">
+      <p:transition spd="med" p14:dur="700">
+        <p:fade/>
+      </p:transition>
+    </mc:Choice>
+    <mc:Fallback xmlns="">
+      <p:transition spd="med">
+        <p:fade/>
+      </p:transition>
+    </mc:Fallback>
+  </mc:AlternateContent>
+</p:sld>
+</file>
+
+<file path=ppt/slides/slide16.xml><?xml version="1.0" encoding="utf-8"?>
+<p:sld xmlns:a="http://schemas.openxmlformats.org/drawingml/2006/main" xmlns:r="http://schemas.openxmlformats.org/officeDocument/2006/relationships" xmlns:p="http://schemas.openxmlformats.org/presentationml/2006/main">
+  <p:cSld>
+    <p:spTree>
+      <p:nvGrpSpPr>
+        <p:cNvPr id="1" name=""/>
+        <p:cNvGrpSpPr/>
+        <p:nvPr/>
+      </p:nvGrpSpPr>
+      <p:grpSpPr>
+        <a:xfrm>
+          <a:off x="0" y="0"/>
+          <a:ext cx="0" cy="0"/>
+          <a:chOff x="0" y="0"/>
+          <a:chExt cx="0" cy="0"/>
+        </a:xfrm>
+      </p:grpSpPr>
+      <p:sp>
+        <p:nvSpPr>
+          <p:cNvPr id="2" name="Titolo 1"/>
+          <p:cNvSpPr>
+            <a:spLocks noGrp="1"/>
+          </p:cNvSpPr>
+          <p:nvPr>
+            <p:ph type="title"/>
+          </p:nvPr>
+        </p:nvSpPr>
+        <p:spPr/>
+        <p:txBody>
+          <a:bodyPr rtlCol="0"/>
+          <a:lstStyle/>
+          <a:p>
+            <a:pPr rtl="0"/>
+            <a:r>
+              <a:rPr lang="it-IT" dirty="0"/>
+              <a:t>Migliorare la stima del modello</a:t>
+            </a:r>
+          </a:p>
+        </p:txBody>
+      </p:sp>
+      <p:sp>
+        <p:nvSpPr>
+          <p:cNvPr id="3" name="CasellaDiTesto 2">
+            <a:extLst>
+              <a:ext uri="{FF2B5EF4-FFF2-40B4-BE49-F238E27FC236}">
+                <a16:creationId xmlns:a16="http://schemas.microsoft.com/office/drawing/2014/main" id="{132064AA-E794-43CC-8E2D-31CAF09D8C7A}"/>
+              </a:ext>
+            </a:extLst>
+          </p:cNvPr>
+          <p:cNvSpPr txBox="1"/>
+          <p:nvPr/>
+        </p:nvSpPr>
+        <p:spPr>
+          <a:xfrm>
+            <a:off x="1593852" y="1524000"/>
+            <a:ext cx="9656418" cy="923330"/>
+          </a:xfrm>
+          <a:prstGeom prst="rect">
+            <a:avLst/>
+          </a:prstGeom>
+          <a:noFill/>
+        </p:spPr>
+        <p:txBody>
+          <a:bodyPr wrap="square" rtlCol="0">
+            <a:spAutoFit/>
+          </a:bodyPr>
+          <a:lstStyle/>
+          <a:p>
+            <a:r>
+              <a:rPr lang="it-IT" dirty="0"/>
+              <a:t>Il lavoro fatto di stima del modello non è tuttavia inutile!</a:t>
+            </a:r>
+          </a:p>
+          <a:p>
+            <a:r>
+              <a:rPr lang="it-IT" dirty="0"/>
+              <a:t>Esso è infatti quello del motore quando sottoposto a una differenza di potenziale qualsiasi, ovvero se l’</a:t>
+            </a:r>
+            <a:r>
+              <a:rPr lang="it-IT" b="1" dirty="0" err="1"/>
+              <a:t>enable</a:t>
+            </a:r>
+            <a:r>
+              <a:rPr lang="it-IT" dirty="0"/>
+              <a:t> non disattiva il collegamento elettrico.</a:t>
+            </a:r>
+          </a:p>
+        </p:txBody>
+      </p:sp>
+      <p:sp>
+        <p:nvSpPr>
+          <p:cNvPr id="4" name="CasellaDiTesto 3">
+            <a:extLst>
+              <a:ext uri="{FF2B5EF4-FFF2-40B4-BE49-F238E27FC236}">
+                <a16:creationId xmlns:a16="http://schemas.microsoft.com/office/drawing/2014/main" id="{485A82ED-59B9-423B-8A76-183E055D77F0}"/>
+              </a:ext>
+            </a:extLst>
+          </p:cNvPr>
+          <p:cNvSpPr txBox="1"/>
+          <p:nvPr/>
+        </p:nvSpPr>
+        <p:spPr>
+          <a:xfrm>
+            <a:off x="1593852" y="2447330"/>
+            <a:ext cx="1321626" cy="369332"/>
+          </a:xfrm>
+          <a:prstGeom prst="rect">
+            <a:avLst/>
+          </a:prstGeom>
+          <a:noFill/>
+        </p:spPr>
+        <p:txBody>
+          <a:bodyPr wrap="square" rtlCol="0">
+            <a:spAutoFit/>
+          </a:bodyPr>
+          <a:lstStyle/>
+          <a:p>
+            <a:r>
+              <a:rPr lang="it-IT" b="1" dirty="0"/>
+              <a:t>Strategia:</a:t>
+            </a:r>
+          </a:p>
+        </p:txBody>
+      </p:sp>
+      <p:sp>
+        <p:nvSpPr>
+          <p:cNvPr id="5" name="CasellaDiTesto 4">
+            <a:extLst>
+              <a:ext uri="{FF2B5EF4-FFF2-40B4-BE49-F238E27FC236}">
+                <a16:creationId xmlns:a16="http://schemas.microsoft.com/office/drawing/2014/main" id="{52EDE1EE-FC53-427C-923D-1D03B789B2B0}"/>
+              </a:ext>
+            </a:extLst>
+          </p:cNvPr>
+          <p:cNvSpPr txBox="1"/>
+          <p:nvPr/>
+        </p:nvSpPr>
+        <p:spPr>
+          <a:xfrm>
+            <a:off x="1696278" y="2816662"/>
+            <a:ext cx="6599583" cy="1200329"/>
+          </a:xfrm>
+          <a:prstGeom prst="rect">
+            <a:avLst/>
+          </a:prstGeom>
+          <a:noFill/>
+        </p:spPr>
+        <p:txBody>
+          <a:bodyPr wrap="square" rtlCol="0">
+            <a:spAutoFit/>
+          </a:bodyPr>
+          <a:lstStyle/>
+          <a:p>
+            <a:pPr marL="342900" indent="-342900">
+              <a:buFont typeface="+mj-lt"/>
+              <a:buAutoNum type="arabicPeriod"/>
+            </a:pPr>
+            <a:r>
+              <a:rPr lang="it-IT" dirty="0"/>
+              <a:t>Individuare il </a:t>
+            </a:r>
+            <a:r>
+              <a:rPr lang="it-IT" b="1" dirty="0"/>
+              <a:t>polo dissipativo meccanico</a:t>
+            </a:r>
+            <a:r>
+              <a:rPr lang="it-IT" dirty="0"/>
+              <a:t> del motore, ovvero il suo attrito coulombiano.</a:t>
+            </a:r>
+          </a:p>
+          <a:p>
+            <a:pPr marL="342900" indent="-342900">
+              <a:buFont typeface="+mj-lt"/>
+              <a:buAutoNum type="arabicPeriod"/>
+            </a:pPr>
+            <a:r>
+              <a:rPr lang="it-IT" dirty="0"/>
+              <a:t>Aggiungere la nuova stima al precedente modello, considerando la somma di tali esponenziali </a:t>
+            </a:r>
+          </a:p>
+        </p:txBody>
+      </p:sp>
+    </p:spTree>
+    <p:extLst>
+      <p:ext uri="{BB962C8B-B14F-4D97-AF65-F5344CB8AC3E}">
+        <p14:creationId xmlns:p14="http://schemas.microsoft.com/office/powerpoint/2010/main" val="450307063"/>
+      </p:ext>
+    </p:extLst>
+  </p:cSld>
+  <p:clrMapOvr>
+    <a:masterClrMapping/>
+  </p:clrMapOvr>
+  <mc:AlternateContent xmlns:mc="http://schemas.openxmlformats.org/markup-compatibility/2006" xmlns:p14="http://schemas.microsoft.com/office/powerpoint/2010/main">
+    <mc:Choice Requires="p14">
+      <p:transition spd="med" p14:dur="700">
+        <p:fade/>
+      </p:transition>
+    </mc:Choice>
+    <mc:Fallback xmlns="">
+      <p:transition spd="med">
+        <p:fade/>
+      </p:transition>
+    </mc:Fallback>
+  </mc:AlternateContent>
+</p:sld>
+</file>
+
+<file path=ppt/slides/slide17.xml><?xml version="1.0" encoding="utf-8"?>
+<p:sld xmlns:a="http://schemas.openxmlformats.org/drawingml/2006/main" xmlns:r="http://schemas.openxmlformats.org/officeDocument/2006/relationships" xmlns:p="http://schemas.openxmlformats.org/presentationml/2006/main">
+  <p:cSld>
+    <p:spTree>
+      <p:nvGrpSpPr>
+        <p:cNvPr id="1" name=""/>
+        <p:cNvGrpSpPr/>
+        <p:nvPr/>
+      </p:nvGrpSpPr>
+      <p:grpSpPr>
+        <a:xfrm>
+          <a:off x="0" y="0"/>
+          <a:ext cx="0" cy="0"/>
+          <a:chOff x="0" y="0"/>
+          <a:chExt cx="0" cy="0"/>
+        </a:xfrm>
+      </p:grpSpPr>
+      <p:sp>
+        <p:nvSpPr>
+          <p:cNvPr id="2" name="Titolo 1"/>
+          <p:cNvSpPr>
+            <a:spLocks noGrp="1"/>
+          </p:cNvSpPr>
+          <p:nvPr>
+            <p:ph type="title"/>
+          </p:nvPr>
+        </p:nvSpPr>
+        <p:spPr/>
+        <p:txBody>
+          <a:bodyPr rtlCol="0"/>
+          <a:lstStyle/>
+          <a:p>
+            <a:pPr rtl="0"/>
+            <a:r>
+              <a:rPr lang="it-IT" dirty="0"/>
+              <a:t>Aggiungere un titolo di diapositiva - 3</a:t>
+            </a:r>
+          </a:p>
+        </p:txBody>
+      </p:sp>
+    </p:spTree>
+    <p:extLst>
+      <p:ext uri="{BB962C8B-B14F-4D97-AF65-F5344CB8AC3E}">
+        <p14:creationId xmlns:p14="http://schemas.microsoft.com/office/powerpoint/2010/main" val="3805607596"/>
       </p:ext>
     </p:extLst>
   </p:cSld>

</xml_diff>

<commit_message>
Most part of slides finished.
</commit_message>
<xml_diff>
--- a/00_Relazione/Modello e identificazione di un motore DC/Modello e identificazione di un motore DC.pptx
+++ b/00_Relazione/Modello e identificazione di un motore DC/Modello e identificazione di un motore DC.pptx
@@ -5,7 +5,7 @@
     <p:sldMasterId id="2147483648" r:id="rId1"/>
   </p:sldMasterIdLst>
   <p:notesMasterIdLst>
-    <p:notesMasterId r:id="rId19"/>
+    <p:notesMasterId r:id="rId22"/>
   </p:notesMasterIdLst>
   <p:sldIdLst>
     <p:sldId id="269" r:id="rId2"/>
@@ -25,6 +25,9 @@
     <p:sldId id="284" r:id="rId16"/>
     <p:sldId id="283" r:id="rId17"/>
     <p:sldId id="285" r:id="rId18"/>
+    <p:sldId id="288" r:id="rId19"/>
+    <p:sldId id="287" r:id="rId20"/>
+    <p:sldId id="286" r:id="rId21"/>
   </p:sldIdLst>
   <p:sldSz cx="12192000" cy="6858000"/>
   <p:notesSz cx="6858000" cy="9144000"/>
@@ -129,6 +132,18 @@
     </p:ext>
   </p:extLst>
 </p:presentation>
+</file>
+
+<file path=ppt/commentAuthors.xml><?xml version="1.0" encoding="utf-8"?>
+<p:cmAuthorLst xmlns:a="http://schemas.openxmlformats.org/drawingml/2006/main" xmlns:r="http://schemas.openxmlformats.org/officeDocument/2006/relationships" xmlns:p="http://schemas.openxmlformats.org/presentationml/2006/main">
+  <p:cmAuthor id="1" name="filippo badalamenti" initials="fb" lastIdx="1" clrIdx="0">
+    <p:extLst>
+      <p:ext uri="{19B8F6BF-5375-455C-9EA6-DF929625EA0E}">
+        <p15:presenceInfo xmlns:p15="http://schemas.microsoft.com/office/powerpoint/2012/main" userId="S::filippo.badalamenti@alumni.uniroma2.eu::1e238e60-90f2-431b-a353-0d0232855f72" providerId="AD"/>
+      </p:ext>
+    </p:extLst>
+  </p:cmAuthor>
+</p:cmAuthorLst>
 </file>
 
 <file path=ppt/notesMasters/notesMaster1.xml><?xml version="1.0" encoding="utf-8"?>
@@ -1259,6 +1274,178 @@
 </p:notes>
 </file>
 
+<file path=ppt/notesSlides/notesSlide18.xml><?xml version="1.0" encoding="utf-8"?>
+<p:notes xmlns:a="http://schemas.openxmlformats.org/drawingml/2006/main" xmlns:r="http://schemas.openxmlformats.org/officeDocument/2006/relationships" xmlns:p="http://schemas.openxmlformats.org/presentationml/2006/main">
+  <p:cSld>
+    <p:spTree>
+      <p:nvGrpSpPr>
+        <p:cNvPr id="1" name=""/>
+        <p:cNvGrpSpPr/>
+        <p:nvPr/>
+      </p:nvGrpSpPr>
+      <p:grpSpPr>
+        <a:xfrm>
+          <a:off x="0" y="0"/>
+          <a:ext cx="0" cy="0"/>
+          <a:chOff x="0" y="0"/>
+          <a:chExt cx="0" cy="0"/>
+        </a:xfrm>
+      </p:grpSpPr>
+      <p:sp>
+        <p:nvSpPr>
+          <p:cNvPr id="2" name="Segnaposto immagine diapositiva 1"/>
+          <p:cNvSpPr>
+            <a:spLocks noGrp="1" noRot="1" noChangeAspect="1"/>
+          </p:cNvSpPr>
+          <p:nvPr>
+            <p:ph type="sldImg"/>
+          </p:nvPr>
+        </p:nvSpPr>
+        <p:spPr/>
+      </p:sp>
+      <p:sp>
+        <p:nvSpPr>
+          <p:cNvPr id="3" name="Segnaposto note 2"/>
+          <p:cNvSpPr>
+            <a:spLocks noGrp="1"/>
+          </p:cNvSpPr>
+          <p:nvPr>
+            <p:ph type="body" idx="1"/>
+          </p:nvPr>
+        </p:nvSpPr>
+        <p:spPr/>
+        <p:txBody>
+          <a:bodyPr/>
+          <a:lstStyle/>
+          <a:p>
+            <a:endParaRPr lang="it-IT"/>
+          </a:p>
+        </p:txBody>
+      </p:sp>
+      <p:sp>
+        <p:nvSpPr>
+          <p:cNvPr id="4" name="Segnaposto numero diapositiva 3"/>
+          <p:cNvSpPr>
+            <a:spLocks noGrp="1"/>
+          </p:cNvSpPr>
+          <p:nvPr>
+            <p:ph type="sldNum" sz="quarter" idx="10"/>
+          </p:nvPr>
+        </p:nvSpPr>
+        <p:spPr/>
+        <p:txBody>
+          <a:bodyPr/>
+          <a:lstStyle/>
+          <a:p>
+            <a:pPr rtl="0"/>
+            <a:fld id="{841221E5-7225-48EB-A4EE-420E7BFCF705}" type="slidenum">
+              <a:rPr lang="it-IT" smtClean="0"/>
+              <a:pPr rtl="0"/>
+              <a:t>18</a:t>
+            </a:fld>
+            <a:endParaRPr lang="it-IT" dirty="0"/>
+          </a:p>
+        </p:txBody>
+      </p:sp>
+    </p:spTree>
+    <p:extLst>
+      <p:ext uri="{BB962C8B-B14F-4D97-AF65-F5344CB8AC3E}">
+        <p14:creationId xmlns:p14="http://schemas.microsoft.com/office/powerpoint/2010/main" val="2475987569"/>
+      </p:ext>
+    </p:extLst>
+  </p:cSld>
+  <p:clrMapOvr>
+    <a:masterClrMapping/>
+  </p:clrMapOvr>
+</p:notes>
+</file>
+
+<file path=ppt/notesSlides/notesSlide19.xml><?xml version="1.0" encoding="utf-8"?>
+<p:notes xmlns:a="http://schemas.openxmlformats.org/drawingml/2006/main" xmlns:r="http://schemas.openxmlformats.org/officeDocument/2006/relationships" xmlns:p="http://schemas.openxmlformats.org/presentationml/2006/main">
+  <p:cSld>
+    <p:spTree>
+      <p:nvGrpSpPr>
+        <p:cNvPr id="1" name=""/>
+        <p:cNvGrpSpPr/>
+        <p:nvPr/>
+      </p:nvGrpSpPr>
+      <p:grpSpPr>
+        <a:xfrm>
+          <a:off x="0" y="0"/>
+          <a:ext cx="0" cy="0"/>
+          <a:chOff x="0" y="0"/>
+          <a:chExt cx="0" cy="0"/>
+        </a:xfrm>
+      </p:grpSpPr>
+      <p:sp>
+        <p:nvSpPr>
+          <p:cNvPr id="2" name="Segnaposto immagine diapositiva 1"/>
+          <p:cNvSpPr>
+            <a:spLocks noGrp="1" noRot="1" noChangeAspect="1"/>
+          </p:cNvSpPr>
+          <p:nvPr>
+            <p:ph type="sldImg"/>
+          </p:nvPr>
+        </p:nvSpPr>
+        <p:spPr/>
+      </p:sp>
+      <p:sp>
+        <p:nvSpPr>
+          <p:cNvPr id="3" name="Segnaposto note 2"/>
+          <p:cNvSpPr>
+            <a:spLocks noGrp="1"/>
+          </p:cNvSpPr>
+          <p:nvPr>
+            <p:ph type="body" idx="1"/>
+          </p:nvPr>
+        </p:nvSpPr>
+        <p:spPr/>
+        <p:txBody>
+          <a:bodyPr/>
+          <a:lstStyle/>
+          <a:p>
+            <a:endParaRPr lang="it-IT"/>
+          </a:p>
+        </p:txBody>
+      </p:sp>
+      <p:sp>
+        <p:nvSpPr>
+          <p:cNvPr id="4" name="Segnaposto numero diapositiva 3"/>
+          <p:cNvSpPr>
+            <a:spLocks noGrp="1"/>
+          </p:cNvSpPr>
+          <p:nvPr>
+            <p:ph type="sldNum" sz="quarter" idx="10"/>
+          </p:nvPr>
+        </p:nvSpPr>
+        <p:spPr/>
+        <p:txBody>
+          <a:bodyPr/>
+          <a:lstStyle/>
+          <a:p>
+            <a:pPr rtl="0"/>
+            <a:fld id="{841221E5-7225-48EB-A4EE-420E7BFCF705}" type="slidenum">
+              <a:rPr lang="it-IT" smtClean="0"/>
+              <a:pPr rtl="0"/>
+              <a:t>19</a:t>
+            </a:fld>
+            <a:endParaRPr lang="it-IT" dirty="0"/>
+          </a:p>
+        </p:txBody>
+      </p:sp>
+    </p:spTree>
+    <p:extLst>
+      <p:ext uri="{BB962C8B-B14F-4D97-AF65-F5344CB8AC3E}">
+        <p14:creationId xmlns:p14="http://schemas.microsoft.com/office/powerpoint/2010/main" val="598210150"/>
+      </p:ext>
+    </p:extLst>
+  </p:cSld>
+  <p:clrMapOvr>
+    <a:masterClrMapping/>
+  </p:clrMapOvr>
+</p:notes>
+</file>
+
 <file path=ppt/notesSlides/notesSlide2.xml><?xml version="1.0" encoding="utf-8"?>
 <p:notes xmlns:a="http://schemas.openxmlformats.org/drawingml/2006/main" xmlns:r="http://schemas.openxmlformats.org/officeDocument/2006/relationships" xmlns:p="http://schemas.openxmlformats.org/presentationml/2006/main">
   <p:cSld>
@@ -1341,6 +1528,92 @@
     <p:extLst>
       <p:ext uri="{BB962C8B-B14F-4D97-AF65-F5344CB8AC3E}">
         <p14:creationId xmlns:p14="http://schemas.microsoft.com/office/powerpoint/2010/main" val="1222149080"/>
+      </p:ext>
+    </p:extLst>
+  </p:cSld>
+  <p:clrMapOvr>
+    <a:masterClrMapping/>
+  </p:clrMapOvr>
+</p:notes>
+</file>
+
+<file path=ppt/notesSlides/notesSlide20.xml><?xml version="1.0" encoding="utf-8"?>
+<p:notes xmlns:a="http://schemas.openxmlformats.org/drawingml/2006/main" xmlns:r="http://schemas.openxmlformats.org/officeDocument/2006/relationships" xmlns:p="http://schemas.openxmlformats.org/presentationml/2006/main">
+  <p:cSld>
+    <p:spTree>
+      <p:nvGrpSpPr>
+        <p:cNvPr id="1" name=""/>
+        <p:cNvGrpSpPr/>
+        <p:nvPr/>
+      </p:nvGrpSpPr>
+      <p:grpSpPr>
+        <a:xfrm>
+          <a:off x="0" y="0"/>
+          <a:ext cx="0" cy="0"/>
+          <a:chOff x="0" y="0"/>
+          <a:chExt cx="0" cy="0"/>
+        </a:xfrm>
+      </p:grpSpPr>
+      <p:sp>
+        <p:nvSpPr>
+          <p:cNvPr id="2" name="Segnaposto immagine diapositiva 1"/>
+          <p:cNvSpPr>
+            <a:spLocks noGrp="1" noRot="1" noChangeAspect="1"/>
+          </p:cNvSpPr>
+          <p:nvPr>
+            <p:ph type="sldImg"/>
+          </p:nvPr>
+        </p:nvSpPr>
+        <p:spPr/>
+      </p:sp>
+      <p:sp>
+        <p:nvSpPr>
+          <p:cNvPr id="3" name="Segnaposto note 2"/>
+          <p:cNvSpPr>
+            <a:spLocks noGrp="1"/>
+          </p:cNvSpPr>
+          <p:nvPr>
+            <p:ph type="body" idx="1"/>
+          </p:nvPr>
+        </p:nvSpPr>
+        <p:spPr/>
+        <p:txBody>
+          <a:bodyPr/>
+          <a:lstStyle/>
+          <a:p>
+            <a:endParaRPr lang="it-IT"/>
+          </a:p>
+        </p:txBody>
+      </p:sp>
+      <p:sp>
+        <p:nvSpPr>
+          <p:cNvPr id="4" name="Segnaposto numero diapositiva 3"/>
+          <p:cNvSpPr>
+            <a:spLocks noGrp="1"/>
+          </p:cNvSpPr>
+          <p:nvPr>
+            <p:ph type="sldNum" sz="quarter" idx="10"/>
+          </p:nvPr>
+        </p:nvSpPr>
+        <p:spPr/>
+        <p:txBody>
+          <a:bodyPr/>
+          <a:lstStyle/>
+          <a:p>
+            <a:pPr rtl="0"/>
+            <a:fld id="{841221E5-7225-48EB-A4EE-420E7BFCF705}" type="slidenum">
+              <a:rPr lang="it-IT" smtClean="0"/>
+              <a:pPr rtl="0"/>
+              <a:t>20</a:t>
+            </a:fld>
+            <a:endParaRPr lang="it-IT" dirty="0"/>
+          </a:p>
+        </p:txBody>
+      </p:sp>
+    </p:spTree>
+    <p:extLst>
+      <p:ext uri="{BB962C8B-B14F-4D97-AF65-F5344CB8AC3E}">
+        <p14:creationId xmlns:p14="http://schemas.microsoft.com/office/powerpoint/2010/main" val="1141469329"/>
       </p:ext>
     </p:extLst>
   </p:cSld>
@@ -6535,8 +6808,8 @@
         </p:nvSpPr>
         <p:spPr>
           <a:xfrm>
-            <a:off x="1696278" y="2816662"/>
-            <a:ext cx="6599583" cy="1200329"/>
+            <a:off x="1593852" y="2816662"/>
+            <a:ext cx="5469557" cy="2031325"/>
           </a:xfrm>
           <a:prstGeom prst="rect">
             <a:avLst/>
@@ -6573,8 +6846,121 @@
             </a:pPr>
             <a:r>
               <a:rPr lang="it-IT" dirty="0"/>
-              <a:t>Aggiungere la nuova stima al precedente modello, considerando la somma di tali esponenziali </a:t>
-            </a:r>
+              <a:t>Aggiungere la nuova stima al precedente modello, considerando il moto adesso come somma di esponenziali.</a:t>
+            </a:r>
+          </a:p>
+          <a:p>
+            <a:pPr marL="342900" indent="-342900">
+              <a:buFont typeface="+mj-lt"/>
+              <a:buAutoNum type="arabicPeriod"/>
+            </a:pPr>
+            <a:r>
+              <a:rPr lang="it-IT" dirty="0"/>
+              <a:t>Aggiungere un termine costante per approssimare la </a:t>
+            </a:r>
+            <a:r>
+              <a:rPr lang="it-IT" b="1" dirty="0"/>
+              <a:t>Curva di </a:t>
+            </a:r>
+            <a:r>
+              <a:rPr lang="it-IT" b="1" dirty="0" err="1"/>
+              <a:t>Stribeck</a:t>
+            </a:r>
+            <a:r>
+              <a:rPr lang="it-IT" b="1" dirty="0"/>
+              <a:t>.</a:t>
+            </a:r>
+          </a:p>
+        </p:txBody>
+      </p:sp>
+      <p:pic>
+        <p:nvPicPr>
+          <p:cNvPr id="7" name="Immagine 6" descr="Immagine che contiene testo&#10;&#10;Descrizione generata automaticamente">
+            <a:extLst>
+              <a:ext uri="{FF2B5EF4-FFF2-40B4-BE49-F238E27FC236}">
+                <a16:creationId xmlns:a16="http://schemas.microsoft.com/office/drawing/2014/main" id="{EFAD17FA-16FC-4E03-9A34-A9CF13CC81BB}"/>
+              </a:ext>
+            </a:extLst>
+          </p:cNvPr>
+          <p:cNvPicPr>
+            <a:picLocks noChangeAspect="1"/>
+          </p:cNvPicPr>
+          <p:nvPr/>
+        </p:nvPicPr>
+        <p:blipFill>
+          <a:blip r:embed="rId3">
+            <a:extLst>
+              <a:ext uri="{28A0092B-C50C-407E-A947-70E740481C1C}">
+                <a14:useLocalDpi xmlns:a14="http://schemas.microsoft.com/office/drawing/2010/main" val="0"/>
+              </a:ext>
+            </a:extLst>
+          </a:blip>
+          <a:stretch>
+            <a:fillRect/>
+          </a:stretch>
+        </p:blipFill>
+        <p:spPr>
+          <a:xfrm>
+            <a:off x="7058518" y="2816661"/>
+            <a:ext cx="4320683" cy="2629981"/>
+          </a:xfrm>
+          <a:prstGeom prst="rect">
+            <a:avLst/>
+          </a:prstGeom>
+        </p:spPr>
+      </p:pic>
+      <p:sp>
+        <p:nvSpPr>
+          <p:cNvPr id="8" name="CasellaDiTesto 7">
+            <a:extLst>
+              <a:ext uri="{FF2B5EF4-FFF2-40B4-BE49-F238E27FC236}">
+                <a16:creationId xmlns:a16="http://schemas.microsoft.com/office/drawing/2014/main" id="{66DD04B7-612D-4AC5-BDA2-866336F873A3}"/>
+              </a:ext>
+            </a:extLst>
+          </p:cNvPr>
+          <p:cNvSpPr txBox="1"/>
+          <p:nvPr/>
+        </p:nvSpPr>
+        <p:spPr>
+          <a:xfrm>
+            <a:off x="1593852" y="4847987"/>
+            <a:ext cx="5464666" cy="1754326"/>
+          </a:xfrm>
+          <a:prstGeom prst="rect">
+            <a:avLst/>
+          </a:prstGeom>
+          <a:noFill/>
+        </p:spPr>
+        <p:txBody>
+          <a:bodyPr wrap="square" rtlCol="0">
+            <a:spAutoFit/>
+          </a:bodyPr>
+          <a:lstStyle/>
+          <a:p>
+            <a:endParaRPr lang="it-IT" dirty="0"/>
+          </a:p>
+          <a:p>
+            <a:r>
+              <a:rPr lang="it-IT" dirty="0"/>
+              <a:t>Con tali accorgimenti, ed utilizzando una funzione custom di </a:t>
+            </a:r>
+            <a:r>
+              <a:rPr lang="it-IT" dirty="0" err="1"/>
+              <a:t>fit</a:t>
+            </a:r>
+            <a:r>
+              <a:rPr lang="it-IT" dirty="0"/>
+              <a:t> della curva su MATLAB, si possono trovare i coefficienti particolari del motore, che ci permettono di descrivere </a:t>
+            </a:r>
+            <a:r>
+              <a:rPr lang="it-IT" b="1" dirty="0"/>
+              <a:t>bene </a:t>
+            </a:r>
+            <a:r>
+              <a:rPr lang="it-IT" dirty="0"/>
+              <a:t>il suo comportamento.</a:t>
+            </a:r>
+            <a:endParaRPr lang="it-IT" b="1" dirty="0"/>
           </a:p>
         </p:txBody>
       </p:sp>
@@ -6638,15 +7024,214 @@
             <a:pPr rtl="0"/>
             <a:r>
               <a:rPr lang="it-IT" dirty="0"/>
-              <a:t>Aggiungere un titolo di diapositiva - 3</a:t>
-            </a:r>
-          </a:p>
-        </p:txBody>
-      </p:sp>
+              <a:t>Miglioramenti conseguiti</a:t>
+            </a:r>
+          </a:p>
+        </p:txBody>
+      </p:sp>
+      <p:pic>
+        <p:nvPicPr>
+          <p:cNvPr id="4" name="Immagine 3" descr="Immagine che contiene orologio&#10;&#10;Descrizione generata automaticamente">
+            <a:extLst>
+              <a:ext uri="{FF2B5EF4-FFF2-40B4-BE49-F238E27FC236}">
+                <a16:creationId xmlns:a16="http://schemas.microsoft.com/office/drawing/2014/main" id="{C53DEF92-BE9F-4CBA-8175-6A8EEA3B987B}"/>
+              </a:ext>
+            </a:extLst>
+          </p:cNvPr>
+          <p:cNvPicPr>
+            <a:picLocks noChangeAspect="1"/>
+          </p:cNvPicPr>
+          <p:nvPr/>
+        </p:nvPicPr>
+        <p:blipFill>
+          <a:blip r:embed="rId3">
+            <a:extLst>
+              <a:ext uri="{28A0092B-C50C-407E-A947-70E740481C1C}">
+                <a14:useLocalDpi xmlns:a14="http://schemas.microsoft.com/office/drawing/2010/main" val="0"/>
+              </a:ext>
+            </a:extLst>
+          </a:blip>
+          <a:stretch>
+            <a:fillRect/>
+          </a:stretch>
+        </p:blipFill>
+        <p:spPr>
+          <a:xfrm>
+            <a:off x="1593852" y="1417638"/>
+            <a:ext cx="10043746" cy="5440362"/>
+          </a:xfrm>
+          <a:prstGeom prst="rect">
+            <a:avLst/>
+          </a:prstGeom>
+        </p:spPr>
+      </p:pic>
     </p:spTree>
     <p:extLst>
       <p:ext uri="{BB962C8B-B14F-4D97-AF65-F5344CB8AC3E}">
         <p14:creationId xmlns:p14="http://schemas.microsoft.com/office/powerpoint/2010/main" val="3805607596"/>
+      </p:ext>
+    </p:extLst>
+  </p:cSld>
+  <p:clrMapOvr>
+    <a:masterClrMapping/>
+  </p:clrMapOvr>
+  <mc:AlternateContent xmlns:mc="http://schemas.openxmlformats.org/markup-compatibility/2006" xmlns:p14="http://schemas.microsoft.com/office/powerpoint/2010/main">
+    <mc:Choice Requires="p14">
+      <p:transition spd="med" p14:dur="700">
+        <p:fade/>
+      </p:transition>
+    </mc:Choice>
+    <mc:Fallback xmlns="">
+      <p:transition spd="med">
+        <p:fade/>
+      </p:transition>
+    </mc:Fallback>
+  </mc:AlternateContent>
+</p:sld>
+</file>
+
+<file path=ppt/slides/slide18.xml><?xml version="1.0" encoding="utf-8"?>
+<p:sld xmlns:a="http://schemas.openxmlformats.org/drawingml/2006/main" xmlns:r="http://schemas.openxmlformats.org/officeDocument/2006/relationships" xmlns:p="http://schemas.openxmlformats.org/presentationml/2006/main">
+  <p:cSld>
+    <p:spTree>
+      <p:nvGrpSpPr>
+        <p:cNvPr id="1" name=""/>
+        <p:cNvGrpSpPr/>
+        <p:nvPr/>
+      </p:nvGrpSpPr>
+      <p:grpSpPr>
+        <a:xfrm>
+          <a:off x="0" y="0"/>
+          <a:ext cx="0" cy="0"/>
+          <a:chOff x="0" y="0"/>
+          <a:chExt cx="0" cy="0"/>
+        </a:xfrm>
+      </p:grpSpPr>
+      <p:sp>
+        <p:nvSpPr>
+          <p:cNvPr id="2" name="Titolo 1"/>
+          <p:cNvSpPr>
+            <a:spLocks noGrp="1"/>
+          </p:cNvSpPr>
+          <p:nvPr>
+            <p:ph type="title"/>
+          </p:nvPr>
+        </p:nvSpPr>
+        <p:spPr/>
+        <p:txBody>
+          <a:bodyPr rtlCol="0"/>
+          <a:lstStyle/>
+          <a:p>
+            <a:pPr rtl="0"/>
+            <a:r>
+              <a:rPr lang="it-IT" dirty="0"/>
+              <a:t>Miglioramenti conseguiti</a:t>
+            </a:r>
+          </a:p>
+        </p:txBody>
+      </p:sp>
+      <p:pic>
+        <p:nvPicPr>
+          <p:cNvPr id="5" name="Immagine 4" descr="Immagine che contiene orologio, piccolo, sedendo, nero&#10;&#10;Descrizione generata automaticamente">
+            <a:extLst>
+              <a:ext uri="{FF2B5EF4-FFF2-40B4-BE49-F238E27FC236}">
+                <a16:creationId xmlns:a16="http://schemas.microsoft.com/office/drawing/2014/main" id="{999FEACF-51C0-4A6A-91C0-F983D43E1B12}"/>
+              </a:ext>
+            </a:extLst>
+          </p:cNvPr>
+          <p:cNvPicPr>
+            <a:picLocks noChangeAspect="1"/>
+          </p:cNvPicPr>
+          <p:nvPr/>
+        </p:nvPicPr>
+        <p:blipFill>
+          <a:blip r:embed="rId3">
+            <a:extLst>
+              <a:ext uri="{28A0092B-C50C-407E-A947-70E740481C1C}">
+                <a14:useLocalDpi xmlns:a14="http://schemas.microsoft.com/office/drawing/2010/main" val="0"/>
+              </a:ext>
+            </a:extLst>
+          </a:blip>
+          <a:stretch>
+            <a:fillRect/>
+          </a:stretch>
+        </p:blipFill>
+        <p:spPr>
+          <a:xfrm>
+            <a:off x="1593852" y="1417638"/>
+            <a:ext cx="10043746" cy="5440362"/>
+          </a:xfrm>
+          <a:prstGeom prst="rect">
+            <a:avLst/>
+          </a:prstGeom>
+        </p:spPr>
+      </p:pic>
+    </p:spTree>
+    <p:extLst>
+      <p:ext uri="{BB962C8B-B14F-4D97-AF65-F5344CB8AC3E}">
+        <p14:creationId xmlns:p14="http://schemas.microsoft.com/office/powerpoint/2010/main" val="979047167"/>
+      </p:ext>
+    </p:extLst>
+  </p:cSld>
+  <p:clrMapOvr>
+    <a:masterClrMapping/>
+  </p:clrMapOvr>
+  <mc:AlternateContent xmlns:mc="http://schemas.openxmlformats.org/markup-compatibility/2006" xmlns:p14="http://schemas.microsoft.com/office/powerpoint/2010/main">
+    <mc:Choice Requires="p14">
+      <p:transition spd="med" p14:dur="700">
+        <p:fade/>
+      </p:transition>
+    </mc:Choice>
+    <mc:Fallback xmlns="">
+      <p:transition spd="med">
+        <p:fade/>
+      </p:transition>
+    </mc:Fallback>
+  </mc:AlternateContent>
+</p:sld>
+</file>
+
+<file path=ppt/slides/slide19.xml><?xml version="1.0" encoding="utf-8"?>
+<p:sld xmlns:a="http://schemas.openxmlformats.org/drawingml/2006/main" xmlns:r="http://schemas.openxmlformats.org/officeDocument/2006/relationships" xmlns:p="http://schemas.openxmlformats.org/presentationml/2006/main">
+  <p:cSld>
+    <p:spTree>
+      <p:nvGrpSpPr>
+        <p:cNvPr id="1" name=""/>
+        <p:cNvGrpSpPr/>
+        <p:nvPr/>
+      </p:nvGrpSpPr>
+      <p:grpSpPr>
+        <a:xfrm>
+          <a:off x="0" y="0"/>
+          <a:ext cx="0" cy="0"/>
+          <a:chOff x="0" y="0"/>
+          <a:chExt cx="0" cy="0"/>
+        </a:xfrm>
+      </p:grpSpPr>
+      <p:sp>
+        <p:nvSpPr>
+          <p:cNvPr id="2" name="Titolo 1"/>
+          <p:cNvSpPr>
+            <a:spLocks noGrp="1"/>
+          </p:cNvSpPr>
+          <p:nvPr>
+            <p:ph type="title"/>
+          </p:nvPr>
+        </p:nvSpPr>
+        <p:spPr/>
+        <p:txBody>
+          <a:bodyPr rtlCol="0"/>
+          <a:lstStyle/>
+          <a:p>
+            <a:pPr rtl="0"/>
+            <a:endParaRPr lang="it-IT" dirty="0"/>
+          </a:p>
+        </p:txBody>
+      </p:sp>
+    </p:spTree>
+    <p:extLst>
+      <p:ext uri="{BB962C8B-B14F-4D97-AF65-F5344CB8AC3E}">
+        <p14:creationId xmlns:p14="http://schemas.microsoft.com/office/powerpoint/2010/main" val="305355239"/>
       </p:ext>
     </p:extLst>
   </p:cSld>
@@ -7043,6 +7628,68 @@
     <p:extLst>
       <p:ext uri="{BB962C8B-B14F-4D97-AF65-F5344CB8AC3E}">
         <p14:creationId xmlns:p14="http://schemas.microsoft.com/office/powerpoint/2010/main" val="1011132439"/>
+      </p:ext>
+    </p:extLst>
+  </p:cSld>
+  <p:clrMapOvr>
+    <a:masterClrMapping/>
+  </p:clrMapOvr>
+  <mc:AlternateContent xmlns:mc="http://schemas.openxmlformats.org/markup-compatibility/2006" xmlns:p14="http://schemas.microsoft.com/office/powerpoint/2010/main">
+    <mc:Choice Requires="p14">
+      <p:transition spd="med" p14:dur="700">
+        <p:fade/>
+      </p:transition>
+    </mc:Choice>
+    <mc:Fallback xmlns="">
+      <p:transition spd="med">
+        <p:fade/>
+      </p:transition>
+    </mc:Fallback>
+  </mc:AlternateContent>
+</p:sld>
+</file>
+
+<file path=ppt/slides/slide20.xml><?xml version="1.0" encoding="utf-8"?>
+<p:sld xmlns:a="http://schemas.openxmlformats.org/drawingml/2006/main" xmlns:r="http://schemas.openxmlformats.org/officeDocument/2006/relationships" xmlns:p="http://schemas.openxmlformats.org/presentationml/2006/main">
+  <p:cSld>
+    <p:spTree>
+      <p:nvGrpSpPr>
+        <p:cNvPr id="1" name=""/>
+        <p:cNvGrpSpPr/>
+        <p:nvPr/>
+      </p:nvGrpSpPr>
+      <p:grpSpPr>
+        <a:xfrm>
+          <a:off x="0" y="0"/>
+          <a:ext cx="0" cy="0"/>
+          <a:chOff x="0" y="0"/>
+          <a:chExt cx="0" cy="0"/>
+        </a:xfrm>
+      </p:grpSpPr>
+      <p:sp>
+        <p:nvSpPr>
+          <p:cNvPr id="2" name="Titolo 1"/>
+          <p:cNvSpPr>
+            <a:spLocks noGrp="1"/>
+          </p:cNvSpPr>
+          <p:nvPr>
+            <p:ph type="title"/>
+          </p:nvPr>
+        </p:nvSpPr>
+        <p:spPr/>
+        <p:txBody>
+          <a:bodyPr rtlCol="0"/>
+          <a:lstStyle/>
+          <a:p>
+            <a:pPr rtl="0"/>
+            <a:endParaRPr lang="it-IT" dirty="0"/>
+          </a:p>
+        </p:txBody>
+      </p:sp>
+    </p:spTree>
+    <p:extLst>
+      <p:ext uri="{BB962C8B-B14F-4D97-AF65-F5344CB8AC3E}">
+        <p14:creationId xmlns:p14="http://schemas.microsoft.com/office/powerpoint/2010/main" val="828108982"/>
       </p:ext>
     </p:extLst>
   </p:cSld>

</xml_diff>